<commit_message>
Using the save_model and removing results from .gitignore
</commit_message>
<xml_diff>
--- a/g2_presentation.pptx
+++ b/g2_presentation.pptx
@@ -4,6 +4,9 @@
   <p:sldMasterIdLst>
     <p:sldMasterId id="2147483648" r:id="rId1"/>
   </p:sldMasterIdLst>
+  <p:notesMasterIdLst>
+    <p:notesMasterId r:id="rId10"/>
+  </p:notesMasterIdLst>
   <p:sldIdLst>
     <p:sldId id="256" r:id="rId2"/>
     <p:sldId id="257" r:id="rId3"/>
@@ -4157,6 +4160,466 @@
 </cs:chartStyle>
 </file>
 
+<file path=ppt/notesMasters/notesMaster1.xml><?xml version="1.0" encoding="utf-8"?>
+<p:notesMaster xmlns:a="http://schemas.openxmlformats.org/drawingml/2006/main" xmlns:r="http://schemas.openxmlformats.org/officeDocument/2006/relationships" xmlns:p="http://schemas.openxmlformats.org/presentationml/2006/main">
+  <p:cSld>
+    <p:bg>
+      <p:bgRef idx="1001">
+        <a:schemeClr val="bg1"/>
+      </p:bgRef>
+    </p:bg>
+    <p:spTree>
+      <p:nvGrpSpPr>
+        <p:cNvPr id="1" name=""/>
+        <p:cNvGrpSpPr/>
+        <p:nvPr/>
+      </p:nvGrpSpPr>
+      <p:grpSpPr>
+        <a:xfrm>
+          <a:off x="0" y="0"/>
+          <a:ext cx="0" cy="0"/>
+          <a:chOff x="0" y="0"/>
+          <a:chExt cx="0" cy="0"/>
+        </a:xfrm>
+      </p:grpSpPr>
+      <p:sp>
+        <p:nvSpPr>
+          <p:cNvPr id="2" name="Header Placeholder 1"/>
+          <p:cNvSpPr>
+            <a:spLocks noGrp="1"/>
+          </p:cNvSpPr>
+          <p:nvPr>
+            <p:ph type="hdr" sz="quarter"/>
+          </p:nvPr>
+        </p:nvSpPr>
+        <p:spPr>
+          <a:xfrm>
+            <a:off x="0" y="0"/>
+            <a:ext cx="2971800" cy="458788"/>
+          </a:xfrm>
+          <a:prstGeom prst="rect">
+            <a:avLst/>
+          </a:prstGeom>
+        </p:spPr>
+        <p:txBody>
+          <a:bodyPr vert="horz" lIns="91440" tIns="45720" rIns="91440" bIns="45720" rtlCol="0"/>
+          <a:lstStyle>
+            <a:lvl1pPr algn="l">
+              <a:defRPr sz="1200"/>
+            </a:lvl1pPr>
+          </a:lstStyle>
+          <a:p>
+            <a:endParaRPr lang="en-US"/>
+          </a:p>
+        </p:txBody>
+      </p:sp>
+      <p:sp>
+        <p:nvSpPr>
+          <p:cNvPr id="3" name="Date Placeholder 2"/>
+          <p:cNvSpPr>
+            <a:spLocks noGrp="1"/>
+          </p:cNvSpPr>
+          <p:nvPr>
+            <p:ph type="dt" idx="1"/>
+          </p:nvPr>
+        </p:nvSpPr>
+        <p:spPr>
+          <a:xfrm>
+            <a:off x="3884613" y="0"/>
+            <a:ext cx="2971800" cy="458788"/>
+          </a:xfrm>
+          <a:prstGeom prst="rect">
+            <a:avLst/>
+          </a:prstGeom>
+        </p:spPr>
+        <p:txBody>
+          <a:bodyPr vert="horz" lIns="91440" tIns="45720" rIns="91440" bIns="45720" rtlCol="0"/>
+          <a:lstStyle>
+            <a:lvl1pPr algn="r">
+              <a:defRPr sz="1200"/>
+            </a:lvl1pPr>
+          </a:lstStyle>
+          <a:p>
+            <a:fld id="{B1E5340B-A185-9840-A330-97877DFCEF3C}" type="datetimeFigureOut">
+              <a:rPr lang="en-US" smtClean="0"/>
+              <a:t>5/29/25</a:t>
+            </a:fld>
+            <a:endParaRPr lang="en-US"/>
+          </a:p>
+        </p:txBody>
+      </p:sp>
+      <p:sp>
+        <p:nvSpPr>
+          <p:cNvPr id="4" name="Slide Image Placeholder 3"/>
+          <p:cNvSpPr>
+            <a:spLocks noGrp="1" noRot="1" noChangeAspect="1"/>
+          </p:cNvSpPr>
+          <p:nvPr>
+            <p:ph type="sldImg" idx="2"/>
+          </p:nvPr>
+        </p:nvSpPr>
+        <p:spPr>
+          <a:xfrm>
+            <a:off x="685800" y="1143000"/>
+            <a:ext cx="5486400" cy="3086100"/>
+          </a:xfrm>
+          <a:prstGeom prst="rect">
+            <a:avLst/>
+          </a:prstGeom>
+          <a:noFill/>
+          <a:ln w="12700">
+            <a:solidFill>
+              <a:prstClr val="black"/>
+            </a:solidFill>
+          </a:ln>
+        </p:spPr>
+        <p:txBody>
+          <a:bodyPr vert="horz" lIns="91440" tIns="45720" rIns="91440" bIns="45720" rtlCol="0" anchor="ctr"/>
+          <a:lstStyle/>
+          <a:p>
+            <a:endParaRPr lang="en-US"/>
+          </a:p>
+        </p:txBody>
+      </p:sp>
+      <p:sp>
+        <p:nvSpPr>
+          <p:cNvPr id="5" name="Notes Placeholder 4"/>
+          <p:cNvSpPr>
+            <a:spLocks noGrp="1"/>
+          </p:cNvSpPr>
+          <p:nvPr>
+            <p:ph type="body" sz="quarter" idx="3"/>
+          </p:nvPr>
+        </p:nvSpPr>
+        <p:spPr>
+          <a:xfrm>
+            <a:off x="685800" y="4400550"/>
+            <a:ext cx="5486400" cy="3600450"/>
+          </a:xfrm>
+          <a:prstGeom prst="rect">
+            <a:avLst/>
+          </a:prstGeom>
+        </p:spPr>
+        <p:txBody>
+          <a:bodyPr vert="horz" lIns="91440" tIns="45720" rIns="91440" bIns="45720" rtlCol="0"/>
+          <a:lstStyle/>
+          <a:p>
+            <a:pPr lvl="0"/>
+            <a:r>
+              <a:rPr lang="en-US"/>
+              <a:t>Click to edit Master text styles</a:t>
+            </a:r>
+          </a:p>
+          <a:p>
+            <a:pPr lvl="1"/>
+            <a:r>
+              <a:rPr lang="en-US"/>
+              <a:t>Second level</a:t>
+            </a:r>
+          </a:p>
+          <a:p>
+            <a:pPr lvl="2"/>
+            <a:r>
+              <a:rPr lang="en-US"/>
+              <a:t>Third level</a:t>
+            </a:r>
+          </a:p>
+          <a:p>
+            <a:pPr lvl="3"/>
+            <a:r>
+              <a:rPr lang="en-US"/>
+              <a:t>Fourth level</a:t>
+            </a:r>
+          </a:p>
+          <a:p>
+            <a:pPr lvl="4"/>
+            <a:r>
+              <a:rPr lang="en-US"/>
+              <a:t>Fifth level</a:t>
+            </a:r>
+          </a:p>
+        </p:txBody>
+      </p:sp>
+      <p:sp>
+        <p:nvSpPr>
+          <p:cNvPr id="6" name="Footer Placeholder 5"/>
+          <p:cNvSpPr>
+            <a:spLocks noGrp="1"/>
+          </p:cNvSpPr>
+          <p:nvPr>
+            <p:ph type="ftr" sz="quarter" idx="4"/>
+          </p:nvPr>
+        </p:nvSpPr>
+        <p:spPr>
+          <a:xfrm>
+            <a:off x="0" y="8685213"/>
+            <a:ext cx="2971800" cy="458787"/>
+          </a:xfrm>
+          <a:prstGeom prst="rect">
+            <a:avLst/>
+          </a:prstGeom>
+        </p:spPr>
+        <p:txBody>
+          <a:bodyPr vert="horz" lIns="91440" tIns="45720" rIns="91440" bIns="45720" rtlCol="0" anchor="b"/>
+          <a:lstStyle>
+            <a:lvl1pPr algn="l">
+              <a:defRPr sz="1200"/>
+            </a:lvl1pPr>
+          </a:lstStyle>
+          <a:p>
+            <a:endParaRPr lang="en-US"/>
+          </a:p>
+        </p:txBody>
+      </p:sp>
+      <p:sp>
+        <p:nvSpPr>
+          <p:cNvPr id="7" name="Slide Number Placeholder 6"/>
+          <p:cNvSpPr>
+            <a:spLocks noGrp="1"/>
+          </p:cNvSpPr>
+          <p:nvPr>
+            <p:ph type="sldNum" sz="quarter" idx="5"/>
+          </p:nvPr>
+        </p:nvSpPr>
+        <p:spPr>
+          <a:xfrm>
+            <a:off x="3884613" y="8685213"/>
+            <a:ext cx="2971800" cy="458787"/>
+          </a:xfrm>
+          <a:prstGeom prst="rect">
+            <a:avLst/>
+          </a:prstGeom>
+        </p:spPr>
+        <p:txBody>
+          <a:bodyPr vert="horz" lIns="91440" tIns="45720" rIns="91440" bIns="45720" rtlCol="0" anchor="b"/>
+          <a:lstStyle>
+            <a:lvl1pPr algn="r">
+              <a:defRPr sz="1200"/>
+            </a:lvl1pPr>
+          </a:lstStyle>
+          <a:p>
+            <a:fld id="{171632A9-F944-274E-8DDC-519AD0441DB0}" type="slidenum">
+              <a:rPr lang="en-US" smtClean="0"/>
+              <a:t>‹#›</a:t>
+            </a:fld>
+            <a:endParaRPr lang="en-US"/>
+          </a:p>
+        </p:txBody>
+      </p:sp>
+    </p:spTree>
+    <p:extLst>
+      <p:ext uri="{BB962C8B-B14F-4D97-AF65-F5344CB8AC3E}">
+        <p14:creationId xmlns:p14="http://schemas.microsoft.com/office/powerpoint/2010/main" val="1505867365"/>
+      </p:ext>
+    </p:extLst>
+  </p:cSld>
+  <p:clrMap bg1="lt1" tx1="dk1" bg2="lt2" tx2="dk2" accent1="accent1" accent2="accent2" accent3="accent3" accent4="accent4" accent5="accent5" accent6="accent6" hlink="hlink" folHlink="folHlink"/>
+  <p:notesStyle>
+    <a:lvl1pPr marL="0" algn="l" defTabSz="914400" rtl="0" eaLnBrk="1" latinLnBrk="0" hangingPunct="1">
+      <a:defRPr sz="1200" kern="1200">
+        <a:solidFill>
+          <a:schemeClr val="tx1"/>
+        </a:solidFill>
+        <a:latin typeface="+mn-lt"/>
+        <a:ea typeface="+mn-ea"/>
+        <a:cs typeface="+mn-cs"/>
+      </a:defRPr>
+    </a:lvl1pPr>
+    <a:lvl2pPr marL="457200" algn="l" defTabSz="914400" rtl="0" eaLnBrk="1" latinLnBrk="0" hangingPunct="1">
+      <a:defRPr sz="1200" kern="1200">
+        <a:solidFill>
+          <a:schemeClr val="tx1"/>
+        </a:solidFill>
+        <a:latin typeface="+mn-lt"/>
+        <a:ea typeface="+mn-ea"/>
+        <a:cs typeface="+mn-cs"/>
+      </a:defRPr>
+    </a:lvl2pPr>
+    <a:lvl3pPr marL="914400" algn="l" defTabSz="914400" rtl="0" eaLnBrk="1" latinLnBrk="0" hangingPunct="1">
+      <a:defRPr sz="1200" kern="1200">
+        <a:solidFill>
+          <a:schemeClr val="tx1"/>
+        </a:solidFill>
+        <a:latin typeface="+mn-lt"/>
+        <a:ea typeface="+mn-ea"/>
+        <a:cs typeface="+mn-cs"/>
+      </a:defRPr>
+    </a:lvl3pPr>
+    <a:lvl4pPr marL="1371600" algn="l" defTabSz="914400" rtl="0" eaLnBrk="1" latinLnBrk="0" hangingPunct="1">
+      <a:defRPr sz="1200" kern="1200">
+        <a:solidFill>
+          <a:schemeClr val="tx1"/>
+        </a:solidFill>
+        <a:latin typeface="+mn-lt"/>
+        <a:ea typeface="+mn-ea"/>
+        <a:cs typeface="+mn-cs"/>
+      </a:defRPr>
+    </a:lvl4pPr>
+    <a:lvl5pPr marL="1828800" algn="l" defTabSz="914400" rtl="0" eaLnBrk="1" latinLnBrk="0" hangingPunct="1">
+      <a:defRPr sz="1200" kern="1200">
+        <a:solidFill>
+          <a:schemeClr val="tx1"/>
+        </a:solidFill>
+        <a:latin typeface="+mn-lt"/>
+        <a:ea typeface="+mn-ea"/>
+        <a:cs typeface="+mn-cs"/>
+      </a:defRPr>
+    </a:lvl5pPr>
+    <a:lvl6pPr marL="2286000" algn="l" defTabSz="914400" rtl="0" eaLnBrk="1" latinLnBrk="0" hangingPunct="1">
+      <a:defRPr sz="1200" kern="1200">
+        <a:solidFill>
+          <a:schemeClr val="tx1"/>
+        </a:solidFill>
+        <a:latin typeface="+mn-lt"/>
+        <a:ea typeface="+mn-ea"/>
+        <a:cs typeface="+mn-cs"/>
+      </a:defRPr>
+    </a:lvl6pPr>
+    <a:lvl7pPr marL="2743200" algn="l" defTabSz="914400" rtl="0" eaLnBrk="1" latinLnBrk="0" hangingPunct="1">
+      <a:defRPr sz="1200" kern="1200">
+        <a:solidFill>
+          <a:schemeClr val="tx1"/>
+        </a:solidFill>
+        <a:latin typeface="+mn-lt"/>
+        <a:ea typeface="+mn-ea"/>
+        <a:cs typeface="+mn-cs"/>
+      </a:defRPr>
+    </a:lvl7pPr>
+    <a:lvl8pPr marL="3200400" algn="l" defTabSz="914400" rtl="0" eaLnBrk="1" latinLnBrk="0" hangingPunct="1">
+      <a:defRPr sz="1200" kern="1200">
+        <a:solidFill>
+          <a:schemeClr val="tx1"/>
+        </a:solidFill>
+        <a:latin typeface="+mn-lt"/>
+        <a:ea typeface="+mn-ea"/>
+        <a:cs typeface="+mn-cs"/>
+      </a:defRPr>
+    </a:lvl8pPr>
+    <a:lvl9pPr marL="3657600" algn="l" defTabSz="914400" rtl="0" eaLnBrk="1" latinLnBrk="0" hangingPunct="1">
+      <a:defRPr sz="1200" kern="1200">
+        <a:solidFill>
+          <a:schemeClr val="tx1"/>
+        </a:solidFill>
+        <a:latin typeface="+mn-lt"/>
+        <a:ea typeface="+mn-ea"/>
+        <a:cs typeface="+mn-cs"/>
+      </a:defRPr>
+    </a:lvl9pPr>
+  </p:notesStyle>
+</p:notesMaster>
+</file>
+
+<file path=ppt/notesSlides/notesSlide1.xml><?xml version="1.0" encoding="utf-8"?>
+<p:notes xmlns:a="http://schemas.openxmlformats.org/drawingml/2006/main" xmlns:r="http://schemas.openxmlformats.org/officeDocument/2006/relationships" xmlns:p="http://schemas.openxmlformats.org/presentationml/2006/main">
+  <p:cSld>
+    <p:spTree>
+      <p:nvGrpSpPr>
+        <p:cNvPr id="1" name=""/>
+        <p:cNvGrpSpPr/>
+        <p:nvPr/>
+      </p:nvGrpSpPr>
+      <p:grpSpPr>
+        <a:xfrm>
+          <a:off x="0" y="0"/>
+          <a:ext cx="0" cy="0"/>
+          <a:chOff x="0" y="0"/>
+          <a:chExt cx="0" cy="0"/>
+        </a:xfrm>
+      </p:grpSpPr>
+      <p:sp>
+        <p:nvSpPr>
+          <p:cNvPr id="2" name="Slide Image Placeholder 1"/>
+          <p:cNvSpPr>
+            <a:spLocks noGrp="1" noRot="1" noChangeAspect="1"/>
+          </p:cNvSpPr>
+          <p:nvPr>
+            <p:ph type="sldImg"/>
+          </p:nvPr>
+        </p:nvSpPr>
+        <p:spPr/>
+      </p:sp>
+      <p:sp>
+        <p:nvSpPr>
+          <p:cNvPr id="3" name="Notes Placeholder 2"/>
+          <p:cNvSpPr>
+            <a:spLocks noGrp="1"/>
+          </p:cNvSpPr>
+          <p:nvPr>
+            <p:ph type="body" idx="1"/>
+          </p:nvPr>
+        </p:nvSpPr>
+        <p:spPr/>
+        <p:txBody>
+          <a:bodyPr/>
+          <a:lstStyle/>
+          <a:p>
+            <a:pPr marL="171450" indent="-171450">
+              <a:buFontTx/>
+              <a:buChar char="-"/>
+            </a:pPr>
+            <a:r>
+              <a:rPr lang="en-US" dirty="0"/>
+              <a:t> 2 or 3 points</a:t>
+            </a:r>
+          </a:p>
+          <a:p>
+            <a:pPr marL="171450" indent="-171450">
+              <a:buFontTx/>
+              <a:buChar char="-"/>
+            </a:pPr>
+            <a:r>
+              <a:rPr lang="en-US" dirty="0"/>
+              <a:t>One slide on the classical</a:t>
+            </a:r>
+          </a:p>
+          <a:p>
+            <a:pPr marL="171450" indent="-171450">
+              <a:buFontTx/>
+              <a:buChar char="-"/>
+            </a:pPr>
+            <a:r>
+              <a:rPr lang="en-US" dirty="0"/>
+              <a:t>One for the embedded</a:t>
+            </a:r>
+          </a:p>
+        </p:txBody>
+      </p:sp>
+      <p:sp>
+        <p:nvSpPr>
+          <p:cNvPr id="4" name="Slide Number Placeholder 3"/>
+          <p:cNvSpPr>
+            <a:spLocks noGrp="1"/>
+          </p:cNvSpPr>
+          <p:nvPr>
+            <p:ph type="sldNum" sz="quarter" idx="5"/>
+          </p:nvPr>
+        </p:nvSpPr>
+        <p:spPr/>
+        <p:txBody>
+          <a:bodyPr/>
+          <a:lstStyle/>
+          <a:p>
+            <a:fld id="{171632A9-F944-274E-8DDC-519AD0441DB0}" type="slidenum">
+              <a:rPr lang="en-US" smtClean="0"/>
+              <a:t>5</a:t>
+            </a:fld>
+            <a:endParaRPr lang="en-US"/>
+          </a:p>
+        </p:txBody>
+      </p:sp>
+    </p:spTree>
+    <p:extLst>
+      <p:ext uri="{BB962C8B-B14F-4D97-AF65-F5344CB8AC3E}">
+        <p14:creationId xmlns:p14="http://schemas.microsoft.com/office/powerpoint/2010/main" val="417115389"/>
+      </p:ext>
+    </p:extLst>
+  </p:cSld>
+  <p:clrMapOvr>
+    <a:masterClrMapping/>
+  </p:clrMapOvr>
+</p:notes>
+</file>
+
 <file path=ppt/slideLayouts/slideLayout1.xml><?xml version="1.0" encoding="utf-8"?>
 <p:sldLayout xmlns:a="http://schemas.openxmlformats.org/drawingml/2006/main" xmlns:r="http://schemas.openxmlformats.org/officeDocument/2006/relationships" xmlns:p="http://schemas.openxmlformats.org/presentationml/2006/main" type="title" preserve="1">
   <p:cSld name="Title Slide">
@@ -4303,7 +4766,7 @@
           <a:lstStyle/>
           <a:p>
             <a:fld id="{83F8789F-F040-1246-9F38-E63023A0164B}" type="datetimeFigureOut">
-              <a:t>3/13/25</a:t>
+              <a:t>5/29/25</a:t>
             </a:fld>
             <a:endParaRPr lang="en-US"/>
           </a:p>
@@ -4499,7 +4962,7 @@
           <a:lstStyle/>
           <a:p>
             <a:fld id="{83F8789F-F040-1246-9F38-E63023A0164B}" type="datetimeFigureOut">
-              <a:t>3/13/25</a:t>
+              <a:t>5/29/25</a:t>
             </a:fld>
             <a:endParaRPr lang="en-US"/>
           </a:p>
@@ -4705,7 +5168,7 @@
           <a:lstStyle/>
           <a:p>
             <a:fld id="{83F8789F-F040-1246-9F38-E63023A0164B}" type="datetimeFigureOut">
-              <a:t>3/13/25</a:t>
+              <a:t>5/29/25</a:t>
             </a:fld>
             <a:endParaRPr lang="en-US"/>
           </a:p>
@@ -4901,7 +5364,7 @@
           <a:lstStyle/>
           <a:p>
             <a:fld id="{83F8789F-F040-1246-9F38-E63023A0164B}" type="datetimeFigureOut">
-              <a:t>3/13/25</a:t>
+              <a:t>5/29/25</a:t>
             </a:fld>
             <a:endParaRPr lang="en-US"/>
           </a:p>
@@ -5174,7 +5637,7 @@
           <a:lstStyle/>
           <a:p>
             <a:fld id="{83F8789F-F040-1246-9F38-E63023A0164B}" type="datetimeFigureOut">
-              <a:t>3/13/25</a:t>
+              <a:t>5/29/25</a:t>
             </a:fld>
             <a:endParaRPr lang="en-US"/>
           </a:p>
@@ -5437,7 +5900,7 @@
           <a:lstStyle/>
           <a:p>
             <a:fld id="{83F8789F-F040-1246-9F38-E63023A0164B}" type="datetimeFigureOut">
-              <a:t>3/13/25</a:t>
+              <a:t>5/29/25</a:t>
             </a:fld>
             <a:endParaRPr lang="en-US"/>
           </a:p>
@@ -5847,7 +6310,7 @@
           <a:lstStyle/>
           <a:p>
             <a:fld id="{83F8789F-F040-1246-9F38-E63023A0164B}" type="datetimeFigureOut">
-              <a:t>3/13/25</a:t>
+              <a:t>5/29/25</a:t>
             </a:fld>
             <a:endParaRPr lang="en-US"/>
           </a:p>
@@ -5986,7 +6449,7 @@
           <a:lstStyle/>
           <a:p>
             <a:fld id="{83F8789F-F040-1246-9F38-E63023A0164B}" type="datetimeFigureOut">
-              <a:t>3/13/25</a:t>
+              <a:t>5/29/25</a:t>
             </a:fld>
             <a:endParaRPr lang="en-US"/>
           </a:p>
@@ -6097,7 +6560,7 @@
           <a:lstStyle/>
           <a:p>
             <a:fld id="{83F8789F-F040-1246-9F38-E63023A0164B}" type="datetimeFigureOut">
-              <a:t>3/13/25</a:t>
+              <a:t>5/29/25</a:t>
             </a:fld>
             <a:endParaRPr lang="en-US"/>
           </a:p>
@@ -6406,7 +6869,7 @@
           <a:lstStyle/>
           <a:p>
             <a:fld id="{83F8789F-F040-1246-9F38-E63023A0164B}" type="datetimeFigureOut">
-              <a:t>3/13/25</a:t>
+              <a:t>5/29/25</a:t>
             </a:fld>
             <a:endParaRPr lang="en-US"/>
           </a:p>
@@ -6692,7 +7155,7 @@
           <a:lstStyle/>
           <a:p>
             <a:fld id="{83F8789F-F040-1246-9F38-E63023A0164B}" type="datetimeFigureOut">
-              <a:t>3/13/25</a:t>
+              <a:t>5/29/25</a:t>
             </a:fld>
             <a:endParaRPr lang="en-US"/>
           </a:p>
@@ -6931,7 +7394,7 @@
           </a:lstStyle>
           <a:p>
             <a:fld id="{83F8789F-F040-1246-9F38-E63023A0164B}" type="datetimeFigureOut">
-              <a:t>3/13/25</a:t>
+              <a:t>5/29/25</a:t>
             </a:fld>
             <a:endParaRPr lang="en-US"/>
           </a:p>
@@ -7540,6 +8003,41 @@
           </a:graphicData>
         </a:graphic>
       </p:graphicFrame>
+      <p:sp>
+        <p:nvSpPr>
+          <p:cNvPr id="4" name="TextBox 3">
+            <a:extLst>
+              <a:ext uri="{FF2B5EF4-FFF2-40B4-BE49-F238E27FC236}">
+                <a16:creationId xmlns:a16="http://schemas.microsoft.com/office/drawing/2014/main" id="{56D0DD34-45E6-31F1-6E7F-4D77E88C0F6F}"/>
+              </a:ext>
+            </a:extLst>
+          </p:cNvPr>
+          <p:cNvSpPr txBox="1"/>
+          <p:nvPr/>
+        </p:nvSpPr>
+        <p:spPr>
+          <a:xfrm>
+            <a:off x="11258731" y="45522"/>
+            <a:ext cx="933269" cy="369332"/>
+          </a:xfrm>
+          <a:prstGeom prst="rect">
+            <a:avLst/>
+          </a:prstGeom>
+          <a:noFill/>
+        </p:spPr>
+        <p:txBody>
+          <a:bodyPr wrap="none" rtlCol="0">
+            <a:spAutoFit/>
+          </a:bodyPr>
+          <a:lstStyle/>
+          <a:p>
+            <a:r>
+              <a:rPr lang="en-US" dirty="0"/>
+              <a:t>Michael</a:t>
+            </a:r>
+          </a:p>
+        </p:txBody>
+      </p:sp>
     </p:spTree>
     <p:extLst>
       <p:ext uri="{BB962C8B-B14F-4D97-AF65-F5344CB8AC3E}">
@@ -7666,6 +8164,71 @@
           </a:graphicData>
         </a:graphic>
       </p:graphicFrame>
+      <p:pic>
+        <p:nvPicPr>
+          <p:cNvPr id="7" name="Picture 6">
+            <a:extLst>
+              <a:ext uri="{FF2B5EF4-FFF2-40B4-BE49-F238E27FC236}">
+                <a16:creationId xmlns:a16="http://schemas.microsoft.com/office/drawing/2014/main" id="{BF177205-9F68-8819-2262-5F244BF2C3EE}"/>
+              </a:ext>
+            </a:extLst>
+          </p:cNvPr>
+          <p:cNvPicPr>
+            <a:picLocks noChangeAspect="1"/>
+          </p:cNvPicPr>
+          <p:nvPr/>
+        </p:nvPicPr>
+        <p:blipFill>
+          <a:blip r:embed="rId3"/>
+          <a:stretch>
+            <a:fillRect/>
+          </a:stretch>
+        </p:blipFill>
+        <p:spPr>
+          <a:xfrm>
+            <a:off x="4190124" y="2038044"/>
+            <a:ext cx="7772400" cy="3410673"/>
+          </a:xfrm>
+          <a:prstGeom prst="rect">
+            <a:avLst/>
+          </a:prstGeom>
+        </p:spPr>
+      </p:pic>
+      <p:sp>
+        <p:nvSpPr>
+          <p:cNvPr id="8" name="TextBox 7">
+            <a:extLst>
+              <a:ext uri="{FF2B5EF4-FFF2-40B4-BE49-F238E27FC236}">
+                <a16:creationId xmlns:a16="http://schemas.microsoft.com/office/drawing/2014/main" id="{BAAF13D4-4DE7-9366-AD9E-E26E316C285F}"/>
+              </a:ext>
+            </a:extLst>
+          </p:cNvPr>
+          <p:cNvSpPr txBox="1"/>
+          <p:nvPr/>
+        </p:nvSpPr>
+        <p:spPr>
+          <a:xfrm>
+            <a:off x="11258731" y="45522"/>
+            <a:ext cx="775982" cy="369332"/>
+          </a:xfrm>
+          <a:prstGeom prst="rect">
+            <a:avLst/>
+          </a:prstGeom>
+          <a:noFill/>
+        </p:spPr>
+        <p:txBody>
+          <a:bodyPr wrap="none" rtlCol="0">
+            <a:spAutoFit/>
+          </a:bodyPr>
+          <a:lstStyle/>
+          <a:p>
+            <a:r>
+              <a:rPr lang="en-US" dirty="0"/>
+              <a:t>Mercy</a:t>
+            </a:r>
+          </a:p>
+        </p:txBody>
+      </p:sp>
     </p:spTree>
     <p:extLst>
       <p:ext uri="{BB962C8B-B14F-4D97-AF65-F5344CB8AC3E}">
@@ -7782,6 +8345,41 @@
           </a:p>
         </p:txBody>
       </p:sp>
+      <p:sp>
+        <p:nvSpPr>
+          <p:cNvPr id="4" name="TextBox 3">
+            <a:extLst>
+              <a:ext uri="{FF2B5EF4-FFF2-40B4-BE49-F238E27FC236}">
+                <a16:creationId xmlns:a16="http://schemas.microsoft.com/office/drawing/2014/main" id="{270A5073-CEC1-DE0B-844D-D3CCC64066FF}"/>
+              </a:ext>
+            </a:extLst>
+          </p:cNvPr>
+          <p:cNvSpPr txBox="1"/>
+          <p:nvPr/>
+        </p:nvSpPr>
+        <p:spPr>
+          <a:xfrm>
+            <a:off x="11258731" y="45522"/>
+            <a:ext cx="401072" cy="369332"/>
+          </a:xfrm>
+          <a:prstGeom prst="rect">
+            <a:avLst/>
+          </a:prstGeom>
+          <a:noFill/>
+        </p:spPr>
+        <p:txBody>
+          <a:bodyPr wrap="none" rtlCol="0">
+            <a:spAutoFit/>
+          </a:bodyPr>
+          <a:lstStyle/>
+          <a:p>
+            <a:r>
+              <a:rPr lang="en-US" dirty="0"/>
+              <a:t>JD</a:t>
+            </a:r>
+          </a:p>
+        </p:txBody>
+      </p:sp>
     </p:spTree>
     <p:extLst>
       <p:ext uri="{BB962C8B-B14F-4D97-AF65-F5344CB8AC3E}">
@@ -7834,7 +8432,7 @@
           <a:lstStyle/>
           <a:p>
             <a:r>
-              <a:rPr lang="en-US"/>
+              <a:rPr lang="en-US" dirty="0"/>
               <a:t>Methods (models) – 1 or 2 slides</a:t>
             </a:r>
           </a:p>
@@ -7912,10 +8510,45 @@
         </p:xfrm>
         <a:graphic>
           <a:graphicData uri="http://schemas.openxmlformats.org/drawingml/2006/chart">
-            <c:chart xmlns:c="http://schemas.openxmlformats.org/drawingml/2006/chart" xmlns:r="http://schemas.openxmlformats.org/officeDocument/2006/relationships" r:id="rId2"/>
+            <c:chart xmlns:c="http://schemas.openxmlformats.org/drawingml/2006/chart" xmlns:r="http://schemas.openxmlformats.org/officeDocument/2006/relationships" r:id="rId3"/>
           </a:graphicData>
         </a:graphic>
       </p:graphicFrame>
+      <p:sp>
+        <p:nvSpPr>
+          <p:cNvPr id="5" name="TextBox 4">
+            <a:extLst>
+              <a:ext uri="{FF2B5EF4-FFF2-40B4-BE49-F238E27FC236}">
+                <a16:creationId xmlns:a16="http://schemas.microsoft.com/office/drawing/2014/main" id="{9029F6EC-8A9B-5A14-6D5B-D9D053688737}"/>
+              </a:ext>
+            </a:extLst>
+          </p:cNvPr>
+          <p:cNvSpPr txBox="1"/>
+          <p:nvPr/>
+        </p:nvSpPr>
+        <p:spPr>
+          <a:xfrm>
+            <a:off x="11258731" y="45522"/>
+            <a:ext cx="401072" cy="369332"/>
+          </a:xfrm>
+          <a:prstGeom prst="rect">
+            <a:avLst/>
+          </a:prstGeom>
+          <a:noFill/>
+        </p:spPr>
+        <p:txBody>
+          <a:bodyPr wrap="none" rtlCol="0">
+            <a:spAutoFit/>
+          </a:bodyPr>
+          <a:lstStyle/>
+          <a:p>
+            <a:r>
+              <a:rPr lang="en-US" dirty="0"/>
+              <a:t>JD</a:t>
+            </a:r>
+          </a:p>
+        </p:txBody>
+      </p:sp>
     </p:spTree>
     <p:extLst>
       <p:ext uri="{BB962C8B-B14F-4D97-AF65-F5344CB8AC3E}">
@@ -8036,6 +8669,41 @@
           </a:graphicData>
         </a:graphic>
       </p:graphicFrame>
+      <p:sp>
+        <p:nvSpPr>
+          <p:cNvPr id="5" name="TextBox 4">
+            <a:extLst>
+              <a:ext uri="{FF2B5EF4-FFF2-40B4-BE49-F238E27FC236}">
+                <a16:creationId xmlns:a16="http://schemas.microsoft.com/office/drawing/2014/main" id="{0C05A9D7-8C6F-CFC3-0D55-7C1C88740D6F}"/>
+              </a:ext>
+            </a:extLst>
+          </p:cNvPr>
+          <p:cNvSpPr txBox="1"/>
+          <p:nvPr/>
+        </p:nvSpPr>
+        <p:spPr>
+          <a:xfrm>
+            <a:off x="11258731" y="45522"/>
+            <a:ext cx="933269" cy="369332"/>
+          </a:xfrm>
+          <a:prstGeom prst="rect">
+            <a:avLst/>
+          </a:prstGeom>
+          <a:noFill/>
+        </p:spPr>
+        <p:txBody>
+          <a:bodyPr wrap="none" rtlCol="0">
+            <a:spAutoFit/>
+          </a:bodyPr>
+          <a:lstStyle/>
+          <a:p>
+            <a:r>
+              <a:rPr lang="en-US" dirty="0"/>
+              <a:t>Michael</a:t>
+            </a:r>
+          </a:p>
+        </p:txBody>
+      </p:sp>
     </p:spTree>
     <p:extLst>
       <p:ext uri="{BB962C8B-B14F-4D97-AF65-F5344CB8AC3E}">
@@ -8655,4 +9323,319 @@
     </a:ext>
   </a:extLst>
 </a:theme>
+</file>
+
+<file path=ppt/theme/theme2.xml><?xml version="1.0" encoding="utf-8"?>
+<a:theme xmlns:a="http://schemas.openxmlformats.org/drawingml/2006/main" name="Office Theme">
+  <a:themeElements>
+    <a:clrScheme name="Office">
+      <a:dk1>
+        <a:sysClr val="windowText" lastClr="000000"/>
+      </a:dk1>
+      <a:lt1>
+        <a:sysClr val="window" lastClr="FFFFFF"/>
+      </a:lt1>
+      <a:dk2>
+        <a:srgbClr val="0E2841"/>
+      </a:dk2>
+      <a:lt2>
+        <a:srgbClr val="E8E8E8"/>
+      </a:lt2>
+      <a:accent1>
+        <a:srgbClr val="156082"/>
+      </a:accent1>
+      <a:accent2>
+        <a:srgbClr val="E97132"/>
+      </a:accent2>
+      <a:accent3>
+        <a:srgbClr val="196B24"/>
+      </a:accent3>
+      <a:accent4>
+        <a:srgbClr val="0F9ED5"/>
+      </a:accent4>
+      <a:accent5>
+        <a:srgbClr val="A02B93"/>
+      </a:accent5>
+      <a:accent6>
+        <a:srgbClr val="4EA72E"/>
+      </a:accent6>
+      <a:hlink>
+        <a:srgbClr val="467886"/>
+      </a:hlink>
+      <a:folHlink>
+        <a:srgbClr val="96607D"/>
+      </a:folHlink>
+    </a:clrScheme>
+    <a:fontScheme name="Office">
+      <a:majorFont>
+        <a:latin typeface="Aptos Display" panose="02110004020202020204"/>
+        <a:ea typeface=""/>
+        <a:cs typeface=""/>
+        <a:font script="Jpan" typeface="游ゴシック Light"/>
+        <a:font script="Hang" typeface="맑은 고딕"/>
+        <a:font script="Hans" typeface="等线 Light"/>
+        <a:font script="Hant" typeface="新細明體"/>
+        <a:font script="Arab" typeface="Times New Roman"/>
+        <a:font script="Hebr" typeface="Times New Roman"/>
+        <a:font script="Thai" typeface="Angsana New"/>
+        <a:font script="Ethi" typeface="Nyala"/>
+        <a:font script="Beng" typeface="Vrinda"/>
+        <a:font script="Gujr" typeface="Shruti"/>
+        <a:font script="Khmr" typeface="MoolBoran"/>
+        <a:font script="Knda" typeface="Tunga"/>
+        <a:font script="Guru" typeface="Raavi"/>
+        <a:font script="Cans" typeface="Euphemia"/>
+        <a:font script="Cher" typeface="Plantagenet Cherokee"/>
+        <a:font script="Yiii" typeface="Microsoft Yi Baiti"/>
+        <a:font script="Tibt" typeface="Microsoft Himalaya"/>
+        <a:font script="Thaa" typeface="MV Boli"/>
+        <a:font script="Deva" typeface="Mangal"/>
+        <a:font script="Telu" typeface="Gautami"/>
+        <a:font script="Taml" typeface="Latha"/>
+        <a:font script="Syrc" typeface="Estrangelo Edessa"/>
+        <a:font script="Orya" typeface="Kalinga"/>
+        <a:font script="Mlym" typeface="Kartika"/>
+        <a:font script="Laoo" typeface="DokChampa"/>
+        <a:font script="Sinh" typeface="Iskoola Pota"/>
+        <a:font script="Mong" typeface="Mongolian Baiti"/>
+        <a:font script="Viet" typeface="Times New Roman"/>
+        <a:font script="Uigh" typeface="Microsoft Uighur"/>
+        <a:font script="Geor" typeface="Sylfaen"/>
+        <a:font script="Armn" typeface="Arial"/>
+        <a:font script="Bugi" typeface="Leelawadee UI"/>
+        <a:font script="Bopo" typeface="Microsoft JhengHei"/>
+        <a:font script="Java" typeface="Javanese Text"/>
+        <a:font script="Lisu" typeface="Segoe UI"/>
+        <a:font script="Mymr" typeface="Myanmar Text"/>
+        <a:font script="Nkoo" typeface="Ebrima"/>
+        <a:font script="Olck" typeface="Nirmala UI"/>
+        <a:font script="Osma" typeface="Ebrima"/>
+        <a:font script="Phag" typeface="Phagspa"/>
+        <a:font script="Syrn" typeface="Estrangelo Edessa"/>
+        <a:font script="Syrj" typeface="Estrangelo Edessa"/>
+        <a:font script="Syre" typeface="Estrangelo Edessa"/>
+        <a:font script="Sora" typeface="Nirmala UI"/>
+        <a:font script="Tale" typeface="Microsoft Tai Le"/>
+        <a:font script="Talu" typeface="Microsoft New Tai Lue"/>
+        <a:font script="Tfng" typeface="Ebrima"/>
+      </a:majorFont>
+      <a:minorFont>
+        <a:latin typeface="Aptos" panose="02110004020202020204"/>
+        <a:ea typeface=""/>
+        <a:cs typeface=""/>
+        <a:font script="Jpan" typeface="游ゴシック"/>
+        <a:font script="Hang" typeface="맑은 고딕"/>
+        <a:font script="Hans" typeface="等线"/>
+        <a:font script="Hant" typeface="新細明體"/>
+        <a:font script="Arab" typeface="Arial"/>
+        <a:font script="Hebr" typeface="Arial"/>
+        <a:font script="Thai" typeface="Cordia New"/>
+        <a:font script="Ethi" typeface="Nyala"/>
+        <a:font script="Beng" typeface="Vrinda"/>
+        <a:font script="Gujr" typeface="Shruti"/>
+        <a:font script="Khmr" typeface="DaunPenh"/>
+        <a:font script="Knda" typeface="Tunga"/>
+        <a:font script="Guru" typeface="Raavi"/>
+        <a:font script="Cans" typeface="Euphemia"/>
+        <a:font script="Cher" typeface="Plantagenet Cherokee"/>
+        <a:font script="Yiii" typeface="Microsoft Yi Baiti"/>
+        <a:font script="Tibt" typeface="Microsoft Himalaya"/>
+        <a:font script="Thaa" typeface="MV Boli"/>
+        <a:font script="Deva" typeface="Mangal"/>
+        <a:font script="Telu" typeface="Gautami"/>
+        <a:font script="Taml" typeface="Latha"/>
+        <a:font script="Syrc" typeface="Estrangelo Edessa"/>
+        <a:font script="Orya" typeface="Kalinga"/>
+        <a:font script="Mlym" typeface="Kartika"/>
+        <a:font script="Laoo" typeface="DokChampa"/>
+        <a:font script="Sinh" typeface="Iskoola Pota"/>
+        <a:font script="Mong" typeface="Mongolian Baiti"/>
+        <a:font script="Viet" typeface="Arial"/>
+        <a:font script="Uigh" typeface="Microsoft Uighur"/>
+        <a:font script="Geor" typeface="Sylfaen"/>
+        <a:font script="Armn" typeface="Arial"/>
+        <a:font script="Bugi" typeface="Leelawadee UI"/>
+        <a:font script="Bopo" typeface="Microsoft JhengHei"/>
+        <a:font script="Java" typeface="Javanese Text"/>
+        <a:font script="Lisu" typeface="Segoe UI"/>
+        <a:font script="Mymr" typeface="Myanmar Text"/>
+        <a:font script="Nkoo" typeface="Ebrima"/>
+        <a:font script="Olck" typeface="Nirmala UI"/>
+        <a:font script="Osma" typeface="Ebrima"/>
+        <a:font script="Phag" typeface="Phagspa"/>
+        <a:font script="Syrn" typeface="Estrangelo Edessa"/>
+        <a:font script="Syrj" typeface="Estrangelo Edessa"/>
+        <a:font script="Syre" typeface="Estrangelo Edessa"/>
+        <a:font script="Sora" typeface="Nirmala UI"/>
+        <a:font script="Tale" typeface="Microsoft Tai Le"/>
+        <a:font script="Talu" typeface="Microsoft New Tai Lue"/>
+        <a:font script="Tfng" typeface="Ebrima"/>
+      </a:minorFont>
+    </a:fontScheme>
+    <a:fmtScheme name="Office">
+      <a:fillStyleLst>
+        <a:solidFill>
+          <a:schemeClr val="phClr"/>
+        </a:solidFill>
+        <a:gradFill rotWithShape="1">
+          <a:gsLst>
+            <a:gs pos="0">
+              <a:schemeClr val="phClr">
+                <a:lumMod val="110000"/>
+                <a:satMod val="105000"/>
+                <a:tint val="67000"/>
+              </a:schemeClr>
+            </a:gs>
+            <a:gs pos="50000">
+              <a:schemeClr val="phClr">
+                <a:lumMod val="105000"/>
+                <a:satMod val="103000"/>
+                <a:tint val="73000"/>
+              </a:schemeClr>
+            </a:gs>
+            <a:gs pos="100000">
+              <a:schemeClr val="phClr">
+                <a:lumMod val="105000"/>
+                <a:satMod val="109000"/>
+                <a:tint val="81000"/>
+              </a:schemeClr>
+            </a:gs>
+          </a:gsLst>
+          <a:lin ang="5400000" scaled="0"/>
+        </a:gradFill>
+        <a:gradFill rotWithShape="1">
+          <a:gsLst>
+            <a:gs pos="0">
+              <a:schemeClr val="phClr">
+                <a:satMod val="103000"/>
+                <a:lumMod val="102000"/>
+                <a:tint val="94000"/>
+              </a:schemeClr>
+            </a:gs>
+            <a:gs pos="50000">
+              <a:schemeClr val="phClr">
+                <a:satMod val="110000"/>
+                <a:lumMod val="100000"/>
+                <a:shade val="100000"/>
+              </a:schemeClr>
+            </a:gs>
+            <a:gs pos="100000">
+              <a:schemeClr val="phClr">
+                <a:lumMod val="99000"/>
+                <a:satMod val="120000"/>
+                <a:shade val="78000"/>
+              </a:schemeClr>
+            </a:gs>
+          </a:gsLst>
+          <a:lin ang="5400000" scaled="0"/>
+        </a:gradFill>
+      </a:fillStyleLst>
+      <a:lnStyleLst>
+        <a:ln w="12700" cap="flat" cmpd="sng" algn="ctr">
+          <a:solidFill>
+            <a:schemeClr val="phClr"/>
+          </a:solidFill>
+          <a:prstDash val="solid"/>
+          <a:miter lim="800000"/>
+        </a:ln>
+        <a:ln w="19050" cap="flat" cmpd="sng" algn="ctr">
+          <a:solidFill>
+            <a:schemeClr val="phClr"/>
+          </a:solidFill>
+          <a:prstDash val="solid"/>
+          <a:miter lim="800000"/>
+        </a:ln>
+        <a:ln w="25400" cap="flat" cmpd="sng" algn="ctr">
+          <a:solidFill>
+            <a:schemeClr val="phClr"/>
+          </a:solidFill>
+          <a:prstDash val="solid"/>
+          <a:miter lim="800000"/>
+        </a:ln>
+      </a:lnStyleLst>
+      <a:effectStyleLst>
+        <a:effectStyle>
+          <a:effectLst/>
+        </a:effectStyle>
+        <a:effectStyle>
+          <a:effectLst/>
+        </a:effectStyle>
+        <a:effectStyle>
+          <a:effectLst>
+            <a:outerShdw blurRad="57150" dist="19050" dir="5400000" algn="ctr" rotWithShape="0">
+              <a:srgbClr val="000000">
+                <a:alpha val="63000"/>
+              </a:srgbClr>
+            </a:outerShdw>
+          </a:effectLst>
+        </a:effectStyle>
+      </a:effectStyleLst>
+      <a:bgFillStyleLst>
+        <a:solidFill>
+          <a:schemeClr val="phClr"/>
+        </a:solidFill>
+        <a:solidFill>
+          <a:schemeClr val="phClr">
+            <a:tint val="95000"/>
+            <a:satMod val="170000"/>
+          </a:schemeClr>
+        </a:solidFill>
+        <a:gradFill rotWithShape="1">
+          <a:gsLst>
+            <a:gs pos="0">
+              <a:schemeClr val="phClr">
+                <a:tint val="93000"/>
+                <a:satMod val="150000"/>
+                <a:shade val="98000"/>
+                <a:lumMod val="102000"/>
+              </a:schemeClr>
+            </a:gs>
+            <a:gs pos="50000">
+              <a:schemeClr val="phClr">
+                <a:tint val="98000"/>
+                <a:satMod val="130000"/>
+                <a:shade val="90000"/>
+                <a:lumMod val="103000"/>
+              </a:schemeClr>
+            </a:gs>
+            <a:gs pos="100000">
+              <a:schemeClr val="phClr">
+                <a:shade val="63000"/>
+                <a:satMod val="120000"/>
+              </a:schemeClr>
+            </a:gs>
+          </a:gsLst>
+          <a:lin ang="5400000" scaled="0"/>
+        </a:gradFill>
+      </a:bgFillStyleLst>
+    </a:fmtScheme>
+  </a:themeElements>
+  <a:objectDefaults>
+    <a:lnDef>
+      <a:spPr/>
+      <a:bodyPr/>
+      <a:lstStyle/>
+      <a:style>
+        <a:lnRef idx="2">
+          <a:schemeClr val="accent1"/>
+        </a:lnRef>
+        <a:fillRef idx="0">
+          <a:schemeClr val="accent1"/>
+        </a:fillRef>
+        <a:effectRef idx="1">
+          <a:schemeClr val="accent1"/>
+        </a:effectRef>
+        <a:fontRef idx="minor">
+          <a:schemeClr val="tx1"/>
+        </a:fontRef>
+      </a:style>
+    </a:lnDef>
+  </a:objectDefaults>
+  <a:extraClrSchemeLst/>
+  <a:extLst>
+    <a:ext uri="{05A4C25C-085E-4340-85A3-A5531E510DB2}">
+      <thm15:themeFamily xmlns:thm15="http://schemas.microsoft.com/office/thememl/2012/main" name="Office Theme" id="{2E142A2C-CD16-42D6-873A-C26D2A0506FA}" vid="{1BDDFF52-6CD6-40A5-AB3C-68EB2F1E4D0A}"/>
+    </a:ext>
+  </a:extLst>
+</a:theme>
 </file>
</xml_diff>

<commit_message>
Update presentation slides with latest project findings and enhancements
</commit_message>
<xml_diff>
--- a/g2_presentation.pptx
+++ b/g2_presentation.pptx
@@ -5,17 +5,18 @@
     <p:sldMasterId id="2147483648" r:id="rId1"/>
   </p:sldMasterIdLst>
   <p:notesMasterIdLst>
-    <p:notesMasterId r:id="rId10"/>
+    <p:notesMasterId r:id="rId11"/>
   </p:notesMasterIdLst>
   <p:sldIdLst>
     <p:sldId id="256" r:id="rId2"/>
     <p:sldId id="257" r:id="rId3"/>
-    <p:sldId id="258" r:id="rId4"/>
-    <p:sldId id="263" r:id="rId5"/>
-    <p:sldId id="259" r:id="rId6"/>
-    <p:sldId id="260" r:id="rId7"/>
-    <p:sldId id="261" r:id="rId8"/>
-    <p:sldId id="262" r:id="rId9"/>
+    <p:sldId id="265" r:id="rId4"/>
+    <p:sldId id="264" r:id="rId5"/>
+    <p:sldId id="266" r:id="rId6"/>
+    <p:sldId id="259" r:id="rId7"/>
+    <p:sldId id="260" r:id="rId8"/>
+    <p:sldId id="267" r:id="rId9"/>
+    <p:sldId id="262" r:id="rId10"/>
   </p:sldIdLst>
   <p:sldSz cx="12192000" cy="6858000"/>
   <p:notesSz cx="6858000" cy="9144000"/>
@@ -125,7 +126,7 @@
 <file path=ppt/charts/chart1.xml><?xml version="1.0" encoding="utf-8"?>
 <c:chartSpace xmlns:c="http://schemas.openxmlformats.org/drawingml/2006/chart" xmlns:a="http://schemas.openxmlformats.org/drawingml/2006/main" xmlns:r="http://schemas.openxmlformats.org/officeDocument/2006/relationships" xmlns:c16r2="http://schemas.microsoft.com/office/drawing/2015/06/chart">
   <c:date1904 val="0"/>
-  <c:lang val="en-US"/>
+  <c:lang val="fr-FR"/>
   <c:roundedCorners val="0"/>
   <mc:AlternateContent xmlns:mc="http://schemas.openxmlformats.org/markup-compatibility/2006">
     <mc:Choice xmlns:c14="http://schemas.microsoft.com/office/drawing/2007/8/2/chart" Requires="c14">
@@ -540,496 +541,7 @@
 <file path=ppt/charts/chart2.xml><?xml version="1.0" encoding="utf-8"?>
 <c:chartSpace xmlns:c="http://schemas.openxmlformats.org/drawingml/2006/chart" xmlns:a="http://schemas.openxmlformats.org/drawingml/2006/main" xmlns:r="http://schemas.openxmlformats.org/officeDocument/2006/relationships" xmlns:c16r2="http://schemas.microsoft.com/office/drawing/2015/06/chart">
   <c:date1904 val="0"/>
-  <c:lang val="en-US"/>
-  <c:roundedCorners val="0"/>
-  <mc:AlternateContent xmlns:mc="http://schemas.openxmlformats.org/markup-compatibility/2006">
-    <mc:Choice xmlns:c14="http://schemas.microsoft.com/office/drawing/2007/8/2/chart" Requires="c14">
-      <c14:style val="102"/>
-    </mc:Choice>
-    <mc:Fallback>
-      <c:style val="2"/>
-    </mc:Fallback>
-  </mc:AlternateContent>
-  <c:chart>
-    <c:title>
-      <c:tx>
-        <c:rich>
-          <a:bodyPr rot="0" spcFirstLastPara="1" vertOverflow="ellipsis" vert="horz" wrap="square" anchor="ctr" anchorCtr="1"/>
-          <a:lstStyle/>
-          <a:p>
-            <a:pPr>
-              <a:defRPr sz="1862" b="0" i="0" u="none" strike="noStrike" kern="1200" spc="0" baseline="0">
-                <a:solidFill>
-                  <a:schemeClr val="tx1">
-                    <a:lumMod val="65000"/>
-                    <a:lumOff val="35000"/>
-                  </a:schemeClr>
-                </a:solidFill>
-                <a:latin typeface="+mn-lt"/>
-                <a:ea typeface="+mn-ea"/>
-                <a:cs typeface="+mn-cs"/>
-              </a:defRPr>
-            </a:pPr>
-            <a:r>
-              <a:rPr lang="en-US"/>
-              <a:t>Preprocessing techniques</a:t>
-            </a:r>
-          </a:p>
-        </c:rich>
-      </c:tx>
-      <c:overlay val="0"/>
-      <c:spPr>
-        <a:noFill/>
-        <a:ln>
-          <a:noFill/>
-        </a:ln>
-        <a:effectLst/>
-      </c:spPr>
-      <c:txPr>
-        <a:bodyPr rot="0" spcFirstLastPara="1" vertOverflow="ellipsis" vert="horz" wrap="square" anchor="ctr" anchorCtr="1"/>
-        <a:lstStyle/>
-        <a:p>
-          <a:pPr>
-            <a:defRPr sz="1862" b="0" i="0" u="none" strike="noStrike" kern="1200" spc="0" baseline="0">
-              <a:solidFill>
-                <a:schemeClr val="tx1">
-                  <a:lumMod val="65000"/>
-                  <a:lumOff val="35000"/>
-                </a:schemeClr>
-              </a:solidFill>
-              <a:latin typeface="+mn-lt"/>
-              <a:ea typeface="+mn-ea"/>
-              <a:cs typeface="+mn-cs"/>
-            </a:defRPr>
-          </a:pPr>
-          <a:endParaRPr lang="en-US"/>
-        </a:p>
-      </c:txPr>
-    </c:title>
-    <c:autoTitleDeleted val="0"/>
-    <c:plotArea>
-      <c:layout/>
-      <c:lineChart>
-        <c:grouping val="standard"/>
-        <c:varyColors val="0"/>
-        <c:ser>
-          <c:idx val="0"/>
-          <c:order val="0"/>
-          <c:tx>
-            <c:strRef>
-              <c:f>Sheet1!$B$1</c:f>
-              <c:strCache>
-                <c:ptCount val="1"/>
-                <c:pt idx="0">
-                  <c:v>Model A</c:v>
-                </c:pt>
-              </c:strCache>
-            </c:strRef>
-          </c:tx>
-          <c:spPr>
-            <a:ln w="28575" cap="rnd">
-              <a:solidFill>
-                <a:schemeClr val="accent1"/>
-              </a:solidFill>
-              <a:round/>
-            </a:ln>
-            <a:effectLst/>
-          </c:spPr>
-          <c:marker>
-            <c:symbol val="none"/>
-          </c:marker>
-          <c:cat>
-            <c:strRef>
-              <c:f>Sheet1!$A$2:$A$5</c:f>
-              <c:strCache>
-                <c:ptCount val="4"/>
-                <c:pt idx="0">
-                  <c:v>No preprocessing</c:v>
-                </c:pt>
-                <c:pt idx="1">
-                  <c:v>Tokenization</c:v>
-                </c:pt>
-                <c:pt idx="2">
-                  <c:v>Stemming</c:v>
-                </c:pt>
-                <c:pt idx="3">
-                  <c:v>Lemmatization</c:v>
-                </c:pt>
-              </c:strCache>
-            </c:strRef>
-          </c:cat>
-          <c:val>
-            <c:numRef>
-              <c:f>Sheet1!$B$2:$B$5</c:f>
-              <c:numCache>
-                <c:formatCode>General</c:formatCode>
-                <c:ptCount val="4"/>
-                <c:pt idx="0">
-                  <c:v>75</c:v>
-                </c:pt>
-                <c:pt idx="1">
-                  <c:v>70</c:v>
-                </c:pt>
-                <c:pt idx="2">
-                  <c:v>80</c:v>
-                </c:pt>
-                <c:pt idx="3">
-                  <c:v>84</c:v>
-                </c:pt>
-              </c:numCache>
-            </c:numRef>
-          </c:val>
-          <c:smooth val="0"/>
-          <c:extLst>
-            <c:ext xmlns:c16="http://schemas.microsoft.com/office/drawing/2014/chart" uri="{C3380CC4-5D6E-409C-BE32-E72D297353CC}">
-              <c16:uniqueId val="{00000000-4D92-8543-80F9-E273A3A8231D}"/>
-            </c:ext>
-          </c:extLst>
-        </c:ser>
-        <c:ser>
-          <c:idx val="1"/>
-          <c:order val="1"/>
-          <c:tx>
-            <c:strRef>
-              <c:f>Sheet1!$C$1</c:f>
-              <c:strCache>
-                <c:ptCount val="1"/>
-                <c:pt idx="0">
-                  <c:v>Model B</c:v>
-                </c:pt>
-              </c:strCache>
-            </c:strRef>
-          </c:tx>
-          <c:spPr>
-            <a:ln w="28575" cap="rnd">
-              <a:solidFill>
-                <a:schemeClr val="accent2"/>
-              </a:solidFill>
-              <a:round/>
-            </a:ln>
-            <a:effectLst/>
-          </c:spPr>
-          <c:marker>
-            <c:symbol val="none"/>
-          </c:marker>
-          <c:cat>
-            <c:strRef>
-              <c:f>Sheet1!$A$2:$A$5</c:f>
-              <c:strCache>
-                <c:ptCount val="4"/>
-                <c:pt idx="0">
-                  <c:v>No preprocessing</c:v>
-                </c:pt>
-                <c:pt idx="1">
-                  <c:v>Tokenization</c:v>
-                </c:pt>
-                <c:pt idx="2">
-                  <c:v>Stemming</c:v>
-                </c:pt>
-                <c:pt idx="3">
-                  <c:v>Lemmatization</c:v>
-                </c:pt>
-              </c:strCache>
-            </c:strRef>
-          </c:cat>
-          <c:val>
-            <c:numRef>
-              <c:f>Sheet1!$C$2:$C$5</c:f>
-              <c:numCache>
-                <c:formatCode>General</c:formatCode>
-                <c:ptCount val="4"/>
-                <c:pt idx="0">
-                  <c:v>85</c:v>
-                </c:pt>
-                <c:pt idx="1">
-                  <c:v>93</c:v>
-                </c:pt>
-                <c:pt idx="2">
-                  <c:v>98</c:v>
-                </c:pt>
-                <c:pt idx="3">
-                  <c:v>99</c:v>
-                </c:pt>
-              </c:numCache>
-            </c:numRef>
-          </c:val>
-          <c:smooth val="0"/>
-          <c:extLst>
-            <c:ext xmlns:c16="http://schemas.microsoft.com/office/drawing/2014/chart" uri="{C3380CC4-5D6E-409C-BE32-E72D297353CC}">
-              <c16:uniqueId val="{00000001-4D92-8543-80F9-E273A3A8231D}"/>
-            </c:ext>
-          </c:extLst>
-        </c:ser>
-        <c:ser>
-          <c:idx val="2"/>
-          <c:order val="2"/>
-          <c:tx>
-            <c:strRef>
-              <c:f>Sheet1!$D$1</c:f>
-              <c:strCache>
-                <c:ptCount val="1"/>
-                <c:pt idx="0">
-                  <c:v>Model C</c:v>
-                </c:pt>
-              </c:strCache>
-            </c:strRef>
-          </c:tx>
-          <c:spPr>
-            <a:ln w="28575" cap="rnd">
-              <a:solidFill>
-                <a:schemeClr val="accent3"/>
-              </a:solidFill>
-              <a:round/>
-            </a:ln>
-            <a:effectLst/>
-          </c:spPr>
-          <c:marker>
-            <c:symbol val="none"/>
-          </c:marker>
-          <c:cat>
-            <c:strRef>
-              <c:f>Sheet1!$A$2:$A$5</c:f>
-              <c:strCache>
-                <c:ptCount val="4"/>
-                <c:pt idx="0">
-                  <c:v>No preprocessing</c:v>
-                </c:pt>
-                <c:pt idx="1">
-                  <c:v>Tokenization</c:v>
-                </c:pt>
-                <c:pt idx="2">
-                  <c:v>Stemming</c:v>
-                </c:pt>
-                <c:pt idx="3">
-                  <c:v>Lemmatization</c:v>
-                </c:pt>
-              </c:strCache>
-            </c:strRef>
-          </c:cat>
-          <c:val>
-            <c:numRef>
-              <c:f>Sheet1!$D$2:$D$5</c:f>
-              <c:numCache>
-                <c:formatCode>General</c:formatCode>
-                <c:ptCount val="4"/>
-                <c:pt idx="0">
-                  <c:v>88</c:v>
-                </c:pt>
-                <c:pt idx="1">
-                  <c:v>85</c:v>
-                </c:pt>
-                <c:pt idx="2">
-                  <c:v>99</c:v>
-                </c:pt>
-                <c:pt idx="3">
-                  <c:v>99</c:v>
-                </c:pt>
-              </c:numCache>
-            </c:numRef>
-          </c:val>
-          <c:smooth val="0"/>
-          <c:extLst>
-            <c:ext xmlns:c16="http://schemas.microsoft.com/office/drawing/2014/chart" uri="{C3380CC4-5D6E-409C-BE32-E72D297353CC}">
-              <c16:uniqueId val="{00000002-4D92-8543-80F9-E273A3A8231D}"/>
-            </c:ext>
-          </c:extLst>
-        </c:ser>
-        <c:dLbls>
-          <c:showLegendKey val="0"/>
-          <c:showVal val="0"/>
-          <c:showCatName val="0"/>
-          <c:showSerName val="0"/>
-          <c:showPercent val="0"/>
-          <c:showBubbleSize val="0"/>
-        </c:dLbls>
-        <c:smooth val="0"/>
-        <c:axId val="109254431"/>
-        <c:axId val="109778767"/>
-      </c:lineChart>
-      <c:catAx>
-        <c:axId val="109254431"/>
-        <c:scaling>
-          <c:orientation val="minMax"/>
-        </c:scaling>
-        <c:delete val="0"/>
-        <c:axPos val="b"/>
-        <c:numFmt formatCode="General" sourceLinked="1"/>
-        <c:majorTickMark val="none"/>
-        <c:minorTickMark val="none"/>
-        <c:tickLblPos val="nextTo"/>
-        <c:spPr>
-          <a:noFill/>
-          <a:ln w="9525" cap="flat" cmpd="sng" algn="ctr">
-            <a:solidFill>
-              <a:schemeClr val="tx1">
-                <a:lumMod val="15000"/>
-                <a:lumOff val="85000"/>
-              </a:schemeClr>
-            </a:solidFill>
-            <a:round/>
-          </a:ln>
-          <a:effectLst/>
-        </c:spPr>
-        <c:txPr>
-          <a:bodyPr rot="-60000000" spcFirstLastPara="1" vertOverflow="ellipsis" vert="horz" wrap="square" anchor="ctr" anchorCtr="1"/>
-          <a:lstStyle/>
-          <a:p>
-            <a:pPr>
-              <a:defRPr sz="1197" b="0" i="0" u="none" strike="noStrike" kern="1200" baseline="0">
-                <a:solidFill>
-                  <a:schemeClr val="tx1">
-                    <a:lumMod val="65000"/>
-                    <a:lumOff val="35000"/>
-                  </a:schemeClr>
-                </a:solidFill>
-                <a:latin typeface="+mn-lt"/>
-                <a:ea typeface="+mn-ea"/>
-                <a:cs typeface="+mn-cs"/>
-              </a:defRPr>
-            </a:pPr>
-            <a:endParaRPr lang="en-US"/>
-          </a:p>
-        </c:txPr>
-        <c:crossAx val="109778767"/>
-        <c:crosses val="autoZero"/>
-        <c:auto val="1"/>
-        <c:lblAlgn val="ctr"/>
-        <c:lblOffset val="100"/>
-        <c:noMultiLvlLbl val="0"/>
-      </c:catAx>
-      <c:valAx>
-        <c:axId val="109778767"/>
-        <c:scaling>
-          <c:orientation val="minMax"/>
-        </c:scaling>
-        <c:delete val="0"/>
-        <c:axPos val="l"/>
-        <c:majorGridlines>
-          <c:spPr>
-            <a:ln w="9525" cap="flat" cmpd="sng" algn="ctr">
-              <a:solidFill>
-                <a:schemeClr val="tx1">
-                  <a:lumMod val="15000"/>
-                  <a:lumOff val="85000"/>
-                </a:schemeClr>
-              </a:solidFill>
-              <a:round/>
-            </a:ln>
-            <a:effectLst/>
-          </c:spPr>
-        </c:majorGridlines>
-        <c:numFmt formatCode="General" sourceLinked="1"/>
-        <c:majorTickMark val="none"/>
-        <c:minorTickMark val="none"/>
-        <c:tickLblPos val="nextTo"/>
-        <c:spPr>
-          <a:noFill/>
-          <a:ln>
-            <a:noFill/>
-          </a:ln>
-          <a:effectLst/>
-        </c:spPr>
-        <c:txPr>
-          <a:bodyPr rot="-60000000" spcFirstLastPara="1" vertOverflow="ellipsis" vert="horz" wrap="square" anchor="ctr" anchorCtr="1"/>
-          <a:lstStyle/>
-          <a:p>
-            <a:pPr>
-              <a:defRPr sz="1197" b="0" i="0" u="none" strike="noStrike" kern="1200" baseline="0">
-                <a:solidFill>
-                  <a:schemeClr val="tx1">
-                    <a:lumMod val="65000"/>
-                    <a:lumOff val="35000"/>
-                  </a:schemeClr>
-                </a:solidFill>
-                <a:latin typeface="+mn-lt"/>
-                <a:ea typeface="+mn-ea"/>
-                <a:cs typeface="+mn-cs"/>
-              </a:defRPr>
-            </a:pPr>
-            <a:endParaRPr lang="en-US"/>
-          </a:p>
-        </c:txPr>
-        <c:crossAx val="109254431"/>
-        <c:crosses val="autoZero"/>
-        <c:crossBetween val="between"/>
-      </c:valAx>
-      <c:spPr>
-        <a:noFill/>
-        <a:ln>
-          <a:noFill/>
-        </a:ln>
-        <a:effectLst/>
-      </c:spPr>
-    </c:plotArea>
-    <c:legend>
-      <c:legendPos val="b"/>
-      <c:overlay val="0"/>
-      <c:spPr>
-        <a:noFill/>
-        <a:ln>
-          <a:noFill/>
-        </a:ln>
-        <a:effectLst/>
-      </c:spPr>
-      <c:txPr>
-        <a:bodyPr rot="0" spcFirstLastPara="1" vertOverflow="ellipsis" vert="horz" wrap="square" anchor="ctr" anchorCtr="1"/>
-        <a:lstStyle/>
-        <a:p>
-          <a:pPr>
-            <a:defRPr sz="1197" b="0" i="0" u="none" strike="noStrike" kern="1200" baseline="0">
-              <a:solidFill>
-                <a:schemeClr val="tx1">
-                  <a:lumMod val="65000"/>
-                  <a:lumOff val="35000"/>
-                </a:schemeClr>
-              </a:solidFill>
-              <a:latin typeface="+mn-lt"/>
-              <a:ea typeface="+mn-ea"/>
-              <a:cs typeface="+mn-cs"/>
-            </a:defRPr>
-          </a:pPr>
-          <a:endParaRPr lang="en-US"/>
-        </a:p>
-      </c:txPr>
-    </c:legend>
-    <c:plotVisOnly val="1"/>
-    <c:dispBlanksAs val="gap"/>
-    <c:extLst>
-      <c:ext xmlns:c16r3="http://schemas.microsoft.com/office/drawing/2017/03/chart" uri="{56B9EC1D-385E-4148-901F-78D8002777C0}">
-        <c16r3:dataDisplayOptions16>
-          <c16r3:dispNaAsBlank val="1"/>
-        </c16r3:dataDisplayOptions16>
-      </c:ext>
-    </c:extLst>
-    <c:showDLblsOverMax val="0"/>
-  </c:chart>
-  <c:spPr>
-    <a:noFill/>
-    <a:ln>
-      <a:noFill/>
-    </a:ln>
-    <a:effectLst/>
-  </c:spPr>
-  <c:txPr>
-    <a:bodyPr/>
-    <a:lstStyle/>
-    <a:p>
-      <a:pPr>
-        <a:defRPr/>
-      </a:pPr>
-      <a:endParaRPr lang="en-US"/>
-    </a:p>
-  </c:txPr>
-  <c:externalData r:id="rId3">
-    <c:autoUpdate val="0"/>
-  </c:externalData>
-</c:chartSpace>
-</file>
-
-<file path=ppt/charts/chart3.xml><?xml version="1.0" encoding="utf-8"?>
-<c:chartSpace xmlns:c="http://schemas.openxmlformats.org/drawingml/2006/chart" xmlns:a="http://schemas.openxmlformats.org/drawingml/2006/main" xmlns:r="http://schemas.openxmlformats.org/officeDocument/2006/relationships" xmlns:c16r2="http://schemas.microsoft.com/office/drawing/2015/06/chart">
-  <c:date1904 val="0"/>
-  <c:lang val="en-US"/>
+  <c:lang val="fr-FR"/>
   <c:roundedCorners val="0"/>
   <mc:AlternateContent xmlns:mc="http://schemas.openxmlformats.org/markup-compatibility/2006">
     <mc:Choice xmlns:c14="http://schemas.microsoft.com/office/drawing/2007/8/2/chart" Requires="c14">
@@ -1507,10 +1019,10 @@
 </c:chartSpace>
 </file>
 
-<file path=ppt/charts/chart4.xml><?xml version="1.0" encoding="utf-8"?>
+<file path=ppt/charts/chart3.xml><?xml version="1.0" encoding="utf-8"?>
 <c:chartSpace xmlns:c="http://schemas.openxmlformats.org/drawingml/2006/chart" xmlns:a="http://schemas.openxmlformats.org/drawingml/2006/main" xmlns:r="http://schemas.openxmlformats.org/officeDocument/2006/relationships" xmlns:c16r2="http://schemas.microsoft.com/office/drawing/2015/06/chart">
   <c:date1904 val="0"/>
-  <c:lang val="en-US"/>
+  <c:lang val="fr-FR"/>
   <c:roundedCorners val="0"/>
   <mc:AlternateContent xmlns:mc="http://schemas.openxmlformats.org/markup-compatibility/2006">
     <mc:Choice xmlns:c14="http://schemas.microsoft.com/office/drawing/2007/8/2/chart" Requires="c14">
@@ -2017,46 +1529,6 @@
 </file>
 
 <file path=ppt/charts/colors3.xml><?xml version="1.0" encoding="utf-8"?>
-<cs:colorStyle xmlns:cs="http://schemas.microsoft.com/office/drawing/2012/chartStyle" xmlns:a="http://schemas.openxmlformats.org/drawingml/2006/main" meth="cycle" id="10">
-  <a:schemeClr val="accent1"/>
-  <a:schemeClr val="accent2"/>
-  <a:schemeClr val="accent3"/>
-  <a:schemeClr val="accent4"/>
-  <a:schemeClr val="accent5"/>
-  <a:schemeClr val="accent6"/>
-  <cs:variation/>
-  <cs:variation>
-    <a:lumMod val="60000"/>
-  </cs:variation>
-  <cs:variation>
-    <a:lumMod val="80000"/>
-    <a:lumOff val="20000"/>
-  </cs:variation>
-  <cs:variation>
-    <a:lumMod val="80000"/>
-  </cs:variation>
-  <cs:variation>
-    <a:lumMod val="60000"/>
-    <a:lumOff val="40000"/>
-  </cs:variation>
-  <cs:variation>
-    <a:lumMod val="50000"/>
-  </cs:variation>
-  <cs:variation>
-    <a:lumMod val="70000"/>
-    <a:lumOff val="30000"/>
-  </cs:variation>
-  <cs:variation>
-    <a:lumMod val="70000"/>
-  </cs:variation>
-  <cs:variation>
-    <a:lumMod val="50000"/>
-    <a:lumOff val="50000"/>
-  </cs:variation>
-</cs:colorStyle>
-</file>
-
-<file path=ppt/charts/colors4.xml><?xml version="1.0" encoding="utf-8"?>
 <cs:colorStyle xmlns:cs="http://schemas.microsoft.com/office/drawing/2012/chartStyle" xmlns:a="http://schemas.openxmlformats.org/drawingml/2006/main" meth="cycle" id="10">
   <a:schemeClr val="accent1"/>
   <a:schemeClr val="accent2"/>
@@ -3644,522 +3116,6 @@
 </cs:chartStyle>
 </file>
 
-<file path=ppt/charts/style4.xml><?xml version="1.0" encoding="utf-8"?>
-<cs:chartStyle xmlns:cs="http://schemas.microsoft.com/office/drawing/2012/chartStyle" xmlns:a="http://schemas.openxmlformats.org/drawingml/2006/main" id="227">
-  <cs:axisTitle>
-    <cs:lnRef idx="0"/>
-    <cs:fillRef idx="0"/>
-    <cs:effectRef idx="0"/>
-    <cs:fontRef idx="minor">
-      <a:schemeClr val="tx1">
-        <a:lumMod val="65000"/>
-        <a:lumOff val="35000"/>
-      </a:schemeClr>
-    </cs:fontRef>
-    <cs:defRPr sz="1330" kern="1200"/>
-  </cs:axisTitle>
-  <cs:categoryAxis>
-    <cs:lnRef idx="0"/>
-    <cs:fillRef idx="0"/>
-    <cs:effectRef idx="0"/>
-    <cs:fontRef idx="minor">
-      <a:schemeClr val="tx1">
-        <a:lumMod val="65000"/>
-        <a:lumOff val="35000"/>
-      </a:schemeClr>
-    </cs:fontRef>
-    <cs:spPr>
-      <a:ln w="9525" cap="flat" cmpd="sng" algn="ctr">
-        <a:solidFill>
-          <a:schemeClr val="tx1">
-            <a:lumMod val="15000"/>
-            <a:lumOff val="85000"/>
-          </a:schemeClr>
-        </a:solidFill>
-        <a:round/>
-      </a:ln>
-    </cs:spPr>
-    <cs:defRPr sz="1197" kern="1200"/>
-  </cs:categoryAxis>
-  <cs:chartArea mods="allowNoFillOverride allowNoLineOverride">
-    <cs:lnRef idx="0"/>
-    <cs:fillRef idx="0"/>
-    <cs:effectRef idx="0"/>
-    <cs:fontRef idx="minor">
-      <a:schemeClr val="tx1"/>
-    </cs:fontRef>
-    <cs:spPr>
-      <a:solidFill>
-        <a:schemeClr val="bg1"/>
-      </a:solidFill>
-      <a:ln w="9525" cap="flat" cmpd="sng" algn="ctr">
-        <a:solidFill>
-          <a:schemeClr val="tx1">
-            <a:lumMod val="15000"/>
-            <a:lumOff val="85000"/>
-          </a:schemeClr>
-        </a:solidFill>
-        <a:round/>
-      </a:ln>
-    </cs:spPr>
-    <cs:defRPr sz="1330" kern="1200"/>
-  </cs:chartArea>
-  <cs:dataLabel>
-    <cs:lnRef idx="0"/>
-    <cs:fillRef idx="0"/>
-    <cs:effectRef idx="0"/>
-    <cs:fontRef idx="minor">
-      <a:schemeClr val="tx1">
-        <a:lumMod val="75000"/>
-        <a:lumOff val="25000"/>
-      </a:schemeClr>
-    </cs:fontRef>
-    <cs:defRPr sz="1197" kern="1200"/>
-  </cs:dataLabel>
-  <cs:dataLabelCallout>
-    <cs:lnRef idx="0"/>
-    <cs:fillRef idx="0"/>
-    <cs:effectRef idx="0"/>
-    <cs:fontRef idx="minor">
-      <a:schemeClr val="dk1">
-        <a:lumMod val="65000"/>
-        <a:lumOff val="35000"/>
-      </a:schemeClr>
-    </cs:fontRef>
-    <cs:spPr>
-      <a:solidFill>
-        <a:schemeClr val="lt1"/>
-      </a:solidFill>
-      <a:ln>
-        <a:solidFill>
-          <a:schemeClr val="dk1">
-            <a:lumMod val="25000"/>
-            <a:lumOff val="75000"/>
-          </a:schemeClr>
-        </a:solidFill>
-      </a:ln>
-    </cs:spPr>
-    <cs:defRPr sz="1197" kern="1200"/>
-    <cs:bodyPr rot="0" spcFirstLastPara="1" vertOverflow="clip" horzOverflow="clip" vert="horz" wrap="square" lIns="36576" tIns="18288" rIns="36576" bIns="18288" anchor="ctr" anchorCtr="1">
-      <a:spAutoFit/>
-    </cs:bodyPr>
-  </cs:dataLabelCallout>
-  <cs:dataPoint>
-    <cs:lnRef idx="0"/>
-    <cs:fillRef idx="1">
-      <cs:styleClr val="auto"/>
-    </cs:fillRef>
-    <cs:effectRef idx="0"/>
-    <cs:fontRef idx="minor">
-      <a:schemeClr val="tx1"/>
-    </cs:fontRef>
-    <cs:spPr>
-      <a:solidFill>
-        <a:schemeClr val="phClr"/>
-      </a:solidFill>
-    </cs:spPr>
-  </cs:dataPoint>
-  <cs:dataPoint3D>
-    <cs:lnRef idx="0"/>
-    <cs:fillRef idx="1">
-      <cs:styleClr val="auto"/>
-    </cs:fillRef>
-    <cs:effectRef idx="0"/>
-    <cs:fontRef idx="minor">
-      <a:schemeClr val="tx1"/>
-    </cs:fontRef>
-    <cs:spPr>
-      <a:solidFill>
-        <a:schemeClr val="phClr"/>
-      </a:solidFill>
-    </cs:spPr>
-  </cs:dataPoint3D>
-  <cs:dataPointLine>
-    <cs:lnRef idx="0">
-      <cs:styleClr val="auto"/>
-    </cs:lnRef>
-    <cs:fillRef idx="1"/>
-    <cs:effectRef idx="0"/>
-    <cs:fontRef idx="minor">
-      <a:schemeClr val="tx1"/>
-    </cs:fontRef>
-    <cs:spPr>
-      <a:ln w="28575" cap="rnd">
-        <a:solidFill>
-          <a:schemeClr val="phClr"/>
-        </a:solidFill>
-        <a:round/>
-      </a:ln>
-    </cs:spPr>
-  </cs:dataPointLine>
-  <cs:dataPointMarker>
-    <cs:lnRef idx="0">
-      <cs:styleClr val="auto"/>
-    </cs:lnRef>
-    <cs:fillRef idx="1">
-      <cs:styleClr val="auto"/>
-    </cs:fillRef>
-    <cs:effectRef idx="0"/>
-    <cs:fontRef idx="minor">
-      <a:schemeClr val="tx1"/>
-    </cs:fontRef>
-    <cs:spPr>
-      <a:solidFill>
-        <a:schemeClr val="phClr"/>
-      </a:solidFill>
-      <a:ln w="9525">
-        <a:solidFill>
-          <a:schemeClr val="phClr"/>
-        </a:solidFill>
-      </a:ln>
-    </cs:spPr>
-  </cs:dataPointMarker>
-  <cs:dataPointMarkerLayout symbol="circle" size="5"/>
-  <cs:dataPointWireframe>
-    <cs:lnRef idx="0">
-      <cs:styleClr val="auto"/>
-    </cs:lnRef>
-    <cs:fillRef idx="1"/>
-    <cs:effectRef idx="0"/>
-    <cs:fontRef idx="minor">
-      <a:schemeClr val="tx1"/>
-    </cs:fontRef>
-    <cs:spPr>
-      <a:ln w="9525" cap="rnd">
-        <a:solidFill>
-          <a:schemeClr val="phClr"/>
-        </a:solidFill>
-        <a:round/>
-      </a:ln>
-    </cs:spPr>
-  </cs:dataPointWireframe>
-  <cs:dataTable>
-    <cs:lnRef idx="0"/>
-    <cs:fillRef idx="0"/>
-    <cs:effectRef idx="0"/>
-    <cs:fontRef idx="minor">
-      <a:schemeClr val="tx1">
-        <a:lumMod val="65000"/>
-        <a:lumOff val="35000"/>
-      </a:schemeClr>
-    </cs:fontRef>
-    <cs:spPr>
-      <a:noFill/>
-      <a:ln w="9525" cap="flat" cmpd="sng" algn="ctr">
-        <a:solidFill>
-          <a:schemeClr val="tx1">
-            <a:lumMod val="15000"/>
-            <a:lumOff val="85000"/>
-          </a:schemeClr>
-        </a:solidFill>
-        <a:round/>
-      </a:ln>
-    </cs:spPr>
-    <cs:defRPr sz="1197" kern="1200"/>
-  </cs:dataTable>
-  <cs:downBar>
-    <cs:lnRef idx="0"/>
-    <cs:fillRef idx="0"/>
-    <cs:effectRef idx="0"/>
-    <cs:fontRef idx="minor">
-      <a:schemeClr val="dk1"/>
-    </cs:fontRef>
-    <cs:spPr>
-      <a:solidFill>
-        <a:schemeClr val="dk1">
-          <a:lumMod val="65000"/>
-          <a:lumOff val="35000"/>
-        </a:schemeClr>
-      </a:solidFill>
-      <a:ln w="9525">
-        <a:solidFill>
-          <a:schemeClr val="tx1">
-            <a:lumMod val="65000"/>
-            <a:lumOff val="35000"/>
-          </a:schemeClr>
-        </a:solidFill>
-      </a:ln>
-    </cs:spPr>
-  </cs:downBar>
-  <cs:dropLine>
-    <cs:lnRef idx="0"/>
-    <cs:fillRef idx="0"/>
-    <cs:effectRef idx="0"/>
-    <cs:fontRef idx="minor">
-      <a:schemeClr val="tx1"/>
-    </cs:fontRef>
-    <cs:spPr>
-      <a:ln w="9525" cap="flat" cmpd="sng" algn="ctr">
-        <a:solidFill>
-          <a:schemeClr val="tx1">
-            <a:lumMod val="35000"/>
-            <a:lumOff val="65000"/>
-          </a:schemeClr>
-        </a:solidFill>
-        <a:round/>
-      </a:ln>
-    </cs:spPr>
-  </cs:dropLine>
-  <cs:errorBar>
-    <cs:lnRef idx="0"/>
-    <cs:fillRef idx="0"/>
-    <cs:effectRef idx="0"/>
-    <cs:fontRef idx="minor">
-      <a:schemeClr val="tx1"/>
-    </cs:fontRef>
-    <cs:spPr>
-      <a:ln w="9525" cap="flat" cmpd="sng" algn="ctr">
-        <a:solidFill>
-          <a:schemeClr val="tx1">
-            <a:lumMod val="65000"/>
-            <a:lumOff val="35000"/>
-          </a:schemeClr>
-        </a:solidFill>
-        <a:round/>
-      </a:ln>
-    </cs:spPr>
-  </cs:errorBar>
-  <cs:floor>
-    <cs:lnRef idx="0"/>
-    <cs:fillRef idx="0"/>
-    <cs:effectRef idx="0"/>
-    <cs:fontRef idx="minor">
-      <a:schemeClr val="tx1"/>
-    </cs:fontRef>
-    <cs:spPr>
-      <a:noFill/>
-      <a:ln>
-        <a:noFill/>
-      </a:ln>
-    </cs:spPr>
-  </cs:floor>
-  <cs:gridlineMajor>
-    <cs:lnRef idx="0"/>
-    <cs:fillRef idx="0"/>
-    <cs:effectRef idx="0"/>
-    <cs:fontRef idx="minor">
-      <a:schemeClr val="tx1"/>
-    </cs:fontRef>
-    <cs:spPr>
-      <a:ln w="9525" cap="flat" cmpd="sng" algn="ctr">
-        <a:solidFill>
-          <a:schemeClr val="tx1">
-            <a:lumMod val="15000"/>
-            <a:lumOff val="85000"/>
-          </a:schemeClr>
-        </a:solidFill>
-        <a:round/>
-      </a:ln>
-    </cs:spPr>
-  </cs:gridlineMajor>
-  <cs:gridlineMinor>
-    <cs:lnRef idx="0"/>
-    <cs:fillRef idx="0"/>
-    <cs:effectRef idx="0"/>
-    <cs:fontRef idx="minor">
-      <a:schemeClr val="tx1"/>
-    </cs:fontRef>
-    <cs:spPr>
-      <a:ln w="9525" cap="flat" cmpd="sng" algn="ctr">
-        <a:solidFill>
-          <a:schemeClr val="tx1">
-            <a:lumMod val="5000"/>
-            <a:lumOff val="95000"/>
-          </a:schemeClr>
-        </a:solidFill>
-        <a:round/>
-      </a:ln>
-    </cs:spPr>
-  </cs:gridlineMinor>
-  <cs:hiLoLine>
-    <cs:lnRef idx="0"/>
-    <cs:fillRef idx="0"/>
-    <cs:effectRef idx="0"/>
-    <cs:fontRef idx="minor">
-      <a:schemeClr val="tx1"/>
-    </cs:fontRef>
-    <cs:spPr>
-      <a:ln w="9525" cap="flat" cmpd="sng" algn="ctr">
-        <a:solidFill>
-          <a:schemeClr val="tx1">
-            <a:lumMod val="75000"/>
-            <a:lumOff val="25000"/>
-          </a:schemeClr>
-        </a:solidFill>
-        <a:round/>
-      </a:ln>
-    </cs:spPr>
-  </cs:hiLoLine>
-  <cs:leaderLine>
-    <cs:lnRef idx="0"/>
-    <cs:fillRef idx="0"/>
-    <cs:effectRef idx="0"/>
-    <cs:fontRef idx="minor">
-      <a:schemeClr val="tx1"/>
-    </cs:fontRef>
-    <cs:spPr>
-      <a:ln w="9525" cap="flat" cmpd="sng" algn="ctr">
-        <a:solidFill>
-          <a:schemeClr val="tx1">
-            <a:lumMod val="35000"/>
-            <a:lumOff val="65000"/>
-          </a:schemeClr>
-        </a:solidFill>
-        <a:round/>
-      </a:ln>
-    </cs:spPr>
-  </cs:leaderLine>
-  <cs:legend>
-    <cs:lnRef idx="0"/>
-    <cs:fillRef idx="0"/>
-    <cs:effectRef idx="0"/>
-    <cs:fontRef idx="minor">
-      <a:schemeClr val="tx1">
-        <a:lumMod val="65000"/>
-        <a:lumOff val="35000"/>
-      </a:schemeClr>
-    </cs:fontRef>
-    <cs:defRPr sz="1197" kern="1200"/>
-  </cs:legend>
-  <cs:plotArea mods="allowNoFillOverride allowNoLineOverride">
-    <cs:lnRef idx="0"/>
-    <cs:fillRef idx="0"/>
-    <cs:effectRef idx="0"/>
-    <cs:fontRef idx="minor">
-      <a:schemeClr val="tx1"/>
-    </cs:fontRef>
-  </cs:plotArea>
-  <cs:plotArea3D mods="allowNoFillOverride allowNoLineOverride">
-    <cs:lnRef idx="0"/>
-    <cs:fillRef idx="0"/>
-    <cs:effectRef idx="0"/>
-    <cs:fontRef idx="minor">
-      <a:schemeClr val="tx1"/>
-    </cs:fontRef>
-  </cs:plotArea3D>
-  <cs:seriesAxis>
-    <cs:lnRef idx="0"/>
-    <cs:fillRef idx="0"/>
-    <cs:effectRef idx="0"/>
-    <cs:fontRef idx="minor">
-      <a:schemeClr val="tx1">
-        <a:lumMod val="65000"/>
-        <a:lumOff val="35000"/>
-      </a:schemeClr>
-    </cs:fontRef>
-    <cs:defRPr sz="1197" kern="1200"/>
-  </cs:seriesAxis>
-  <cs:seriesLine>
-    <cs:lnRef idx="0"/>
-    <cs:fillRef idx="0"/>
-    <cs:effectRef idx="0"/>
-    <cs:fontRef idx="minor">
-      <a:schemeClr val="tx1"/>
-    </cs:fontRef>
-    <cs:spPr>
-      <a:ln w="9525" cap="flat" cmpd="sng" algn="ctr">
-        <a:solidFill>
-          <a:schemeClr val="tx1">
-            <a:lumMod val="35000"/>
-            <a:lumOff val="65000"/>
-          </a:schemeClr>
-        </a:solidFill>
-        <a:round/>
-      </a:ln>
-    </cs:spPr>
-  </cs:seriesLine>
-  <cs:title>
-    <cs:lnRef idx="0"/>
-    <cs:fillRef idx="0"/>
-    <cs:effectRef idx="0"/>
-    <cs:fontRef idx="minor">
-      <a:schemeClr val="tx1">
-        <a:lumMod val="65000"/>
-        <a:lumOff val="35000"/>
-      </a:schemeClr>
-    </cs:fontRef>
-    <cs:defRPr sz="1862" b="0" kern="1200" spc="0" baseline="0"/>
-  </cs:title>
-  <cs:trendline>
-    <cs:lnRef idx="0">
-      <cs:styleClr val="auto"/>
-    </cs:lnRef>
-    <cs:fillRef idx="0"/>
-    <cs:effectRef idx="0"/>
-    <cs:fontRef idx="minor">
-      <a:schemeClr val="tx1"/>
-    </cs:fontRef>
-    <cs:spPr>
-      <a:ln w="19050" cap="rnd">
-        <a:solidFill>
-          <a:schemeClr val="phClr"/>
-        </a:solidFill>
-        <a:prstDash val="sysDot"/>
-      </a:ln>
-    </cs:spPr>
-  </cs:trendline>
-  <cs:trendlineLabel>
-    <cs:lnRef idx="0"/>
-    <cs:fillRef idx="0"/>
-    <cs:effectRef idx="0"/>
-    <cs:fontRef idx="minor">
-      <a:schemeClr val="tx1">
-        <a:lumMod val="65000"/>
-        <a:lumOff val="35000"/>
-      </a:schemeClr>
-    </cs:fontRef>
-    <cs:defRPr sz="1197" kern="1200"/>
-  </cs:trendlineLabel>
-  <cs:upBar>
-    <cs:lnRef idx="0"/>
-    <cs:fillRef idx="0"/>
-    <cs:effectRef idx="0"/>
-    <cs:fontRef idx="minor">
-      <a:schemeClr val="dk1"/>
-    </cs:fontRef>
-    <cs:spPr>
-      <a:solidFill>
-        <a:schemeClr val="lt1"/>
-      </a:solidFill>
-      <a:ln w="9525">
-        <a:solidFill>
-          <a:schemeClr val="tx1">
-            <a:lumMod val="15000"/>
-            <a:lumOff val="85000"/>
-          </a:schemeClr>
-        </a:solidFill>
-      </a:ln>
-    </cs:spPr>
-  </cs:upBar>
-  <cs:valueAxis>
-    <cs:lnRef idx="0"/>
-    <cs:fillRef idx="0"/>
-    <cs:effectRef idx="0"/>
-    <cs:fontRef idx="minor">
-      <a:schemeClr val="tx1">
-        <a:lumMod val="65000"/>
-        <a:lumOff val="35000"/>
-      </a:schemeClr>
-    </cs:fontRef>
-    <cs:defRPr sz="1197" kern="1200"/>
-  </cs:valueAxis>
-  <cs:wall>
-    <cs:lnRef idx="0"/>
-    <cs:fillRef idx="0"/>
-    <cs:effectRef idx="0"/>
-    <cs:fontRef idx="minor">
-      <a:schemeClr val="tx1"/>
-    </cs:fontRef>
-    <cs:spPr>
-      <a:noFill/>
-      <a:ln>
-        <a:noFill/>
-      </a:ln>
-    </cs:spPr>
-  </cs:wall>
-</cs:chartStyle>
-</file>
-
 <file path=ppt/notesMasters/notesMaster1.xml><?xml version="1.0" encoding="utf-8"?>
 <p:notesMaster xmlns:a="http://schemas.openxmlformats.org/drawingml/2006/main" xmlns:r="http://schemas.openxmlformats.org/officeDocument/2006/relationships" xmlns:p="http://schemas.openxmlformats.org/presentationml/2006/main">
   <p:cSld>
@@ -4242,7 +3198,7 @@
           <a:p>
             <a:fld id="{B1E5340B-A185-9840-A330-97877DFCEF3C}" type="datetimeFigureOut">
               <a:rPr lang="en-US" smtClean="0"/>
-              <a:t>5/29/25</a:t>
+              <a:t>5/30/2025</a:t>
             </a:fld>
             <a:endParaRPr lang="en-US"/>
           </a:p>
@@ -4400,7 +3356,7 @@
           <a:p>
             <a:fld id="{171632A9-F944-274E-8DDC-519AD0441DB0}" type="slidenum">
               <a:rPr lang="en-US" smtClean="0"/>
-              <a:t>‹#›</a:t>
+              <a:t>‹N°›</a:t>
             </a:fld>
             <a:endParaRPr lang="en-US"/>
           </a:p>
@@ -4601,7 +3557,118 @@
           <a:p>
             <a:fld id="{171632A9-F944-274E-8DDC-519AD0441DB0}" type="slidenum">
               <a:rPr lang="en-US" smtClean="0"/>
-              <a:t>5</a:t>
+              <a:t>3</a:t>
+            </a:fld>
+            <a:endParaRPr lang="en-US"/>
+          </a:p>
+        </p:txBody>
+      </p:sp>
+    </p:spTree>
+    <p:extLst>
+      <p:ext uri="{BB962C8B-B14F-4D97-AF65-F5344CB8AC3E}">
+        <p14:creationId xmlns:p14="http://schemas.microsoft.com/office/powerpoint/2010/main" val="417115389"/>
+      </p:ext>
+    </p:extLst>
+  </p:cSld>
+  <p:clrMapOvr>
+    <a:masterClrMapping/>
+  </p:clrMapOvr>
+</p:notes>
+</file>
+
+<file path=ppt/notesSlides/notesSlide2.xml><?xml version="1.0" encoding="utf-8"?>
+<p:notes xmlns:a="http://schemas.openxmlformats.org/drawingml/2006/main" xmlns:r="http://schemas.openxmlformats.org/officeDocument/2006/relationships" xmlns:p="http://schemas.openxmlformats.org/presentationml/2006/main">
+  <p:cSld>
+    <p:spTree>
+      <p:nvGrpSpPr>
+        <p:cNvPr id="1" name=""/>
+        <p:cNvGrpSpPr/>
+        <p:nvPr/>
+      </p:nvGrpSpPr>
+      <p:grpSpPr>
+        <a:xfrm>
+          <a:off x="0" y="0"/>
+          <a:ext cx="0" cy="0"/>
+          <a:chOff x="0" y="0"/>
+          <a:chExt cx="0" cy="0"/>
+        </a:xfrm>
+      </p:grpSpPr>
+      <p:sp>
+        <p:nvSpPr>
+          <p:cNvPr id="2" name="Slide Image Placeholder 1"/>
+          <p:cNvSpPr>
+            <a:spLocks noGrp="1" noRot="1" noChangeAspect="1"/>
+          </p:cNvSpPr>
+          <p:nvPr>
+            <p:ph type="sldImg"/>
+          </p:nvPr>
+        </p:nvSpPr>
+        <p:spPr/>
+      </p:sp>
+      <p:sp>
+        <p:nvSpPr>
+          <p:cNvPr id="3" name="Notes Placeholder 2"/>
+          <p:cNvSpPr>
+            <a:spLocks noGrp="1"/>
+          </p:cNvSpPr>
+          <p:nvPr>
+            <p:ph type="body" idx="1"/>
+          </p:nvPr>
+        </p:nvSpPr>
+        <p:spPr/>
+        <p:txBody>
+          <a:bodyPr/>
+          <a:lstStyle/>
+          <a:p>
+            <a:pPr marL="171450" indent="-171450">
+              <a:buFontTx/>
+              <a:buChar char="-"/>
+            </a:pPr>
+            <a:r>
+              <a:rPr lang="en-US" dirty="0"/>
+              <a:t> 2 or 3 points</a:t>
+            </a:r>
+          </a:p>
+          <a:p>
+            <a:pPr marL="171450" indent="-171450">
+              <a:buFontTx/>
+              <a:buChar char="-"/>
+            </a:pPr>
+            <a:r>
+              <a:rPr lang="en-US" dirty="0"/>
+              <a:t>One slide on the classical</a:t>
+            </a:r>
+          </a:p>
+          <a:p>
+            <a:pPr marL="171450" indent="-171450">
+              <a:buFontTx/>
+              <a:buChar char="-"/>
+            </a:pPr>
+            <a:r>
+              <a:rPr lang="en-US" dirty="0"/>
+              <a:t>One for the embedded</a:t>
+            </a:r>
+          </a:p>
+        </p:txBody>
+      </p:sp>
+      <p:sp>
+        <p:nvSpPr>
+          <p:cNvPr id="4" name="Slide Number Placeholder 3"/>
+          <p:cNvSpPr>
+            <a:spLocks noGrp="1"/>
+          </p:cNvSpPr>
+          <p:nvPr>
+            <p:ph type="sldNum" sz="quarter" idx="5"/>
+          </p:nvPr>
+        </p:nvSpPr>
+        <p:spPr/>
+        <p:txBody>
+          <a:bodyPr/>
+          <a:lstStyle/>
+          <a:p>
+            <a:fld id="{171632A9-F944-274E-8DDC-519AD0441DB0}" type="slidenum">
+              <a:rPr lang="en-US" smtClean="0"/>
+              <a:t>6</a:t>
             </a:fld>
             <a:endParaRPr lang="en-US"/>
           </a:p>
@@ -4766,7 +3833,7 @@
           <a:lstStyle/>
           <a:p>
             <a:fld id="{83F8789F-F040-1246-9F38-E63023A0164B}" type="datetimeFigureOut">
-              <a:t>5/29/25</a:t>
+              <a:t>30/05/2025</a:t>
             </a:fld>
             <a:endParaRPr lang="en-US"/>
           </a:p>
@@ -4819,7 +3886,7 @@
           <a:lstStyle/>
           <a:p>
             <a:fld id="{68C28C03-D10A-AE46-9567-8D9AA2376AB0}" type="slidenum">
-              <a:t>‹#›</a:t>
+              <a:t>‹N°›</a:t>
             </a:fld>
             <a:endParaRPr lang="en-US"/>
           </a:p>
@@ -4962,7 +4029,7 @@
           <a:lstStyle/>
           <a:p>
             <a:fld id="{83F8789F-F040-1246-9F38-E63023A0164B}" type="datetimeFigureOut">
-              <a:t>5/29/25</a:t>
+              <a:t>30/05/2025</a:t>
             </a:fld>
             <a:endParaRPr lang="en-US"/>
           </a:p>
@@ -5015,7 +4082,7 @@
           <a:lstStyle/>
           <a:p>
             <a:fld id="{68C28C03-D10A-AE46-9567-8D9AA2376AB0}" type="slidenum">
-              <a:t>‹#›</a:t>
+              <a:t>‹N°›</a:t>
             </a:fld>
             <a:endParaRPr lang="en-US"/>
           </a:p>
@@ -5168,7 +4235,7 @@
           <a:lstStyle/>
           <a:p>
             <a:fld id="{83F8789F-F040-1246-9F38-E63023A0164B}" type="datetimeFigureOut">
-              <a:t>5/29/25</a:t>
+              <a:t>30/05/2025</a:t>
             </a:fld>
             <a:endParaRPr lang="en-US"/>
           </a:p>
@@ -5221,7 +4288,7 @@
           <a:lstStyle/>
           <a:p>
             <a:fld id="{68C28C03-D10A-AE46-9567-8D9AA2376AB0}" type="slidenum">
-              <a:t>‹#›</a:t>
+              <a:t>‹N°›</a:t>
             </a:fld>
             <a:endParaRPr lang="en-US"/>
           </a:p>
@@ -5364,7 +4431,7 @@
           <a:lstStyle/>
           <a:p>
             <a:fld id="{83F8789F-F040-1246-9F38-E63023A0164B}" type="datetimeFigureOut">
-              <a:t>5/29/25</a:t>
+              <a:t>30/05/2025</a:t>
             </a:fld>
             <a:endParaRPr lang="en-US"/>
           </a:p>
@@ -5417,7 +4484,7 @@
           <a:lstStyle/>
           <a:p>
             <a:fld id="{68C28C03-D10A-AE46-9567-8D9AA2376AB0}" type="slidenum">
-              <a:t>‹#›</a:t>
+              <a:t>‹N°›</a:t>
             </a:fld>
             <a:endParaRPr lang="en-US"/>
           </a:p>
@@ -5637,7 +4704,7 @@
           <a:lstStyle/>
           <a:p>
             <a:fld id="{83F8789F-F040-1246-9F38-E63023A0164B}" type="datetimeFigureOut">
-              <a:t>5/29/25</a:t>
+              <a:t>30/05/2025</a:t>
             </a:fld>
             <a:endParaRPr lang="en-US"/>
           </a:p>
@@ -5690,7 +4757,7 @@
           <a:lstStyle/>
           <a:p>
             <a:fld id="{68C28C03-D10A-AE46-9567-8D9AA2376AB0}" type="slidenum">
-              <a:t>‹#›</a:t>
+              <a:t>‹N°›</a:t>
             </a:fld>
             <a:endParaRPr lang="en-US"/>
           </a:p>
@@ -5900,7 +4967,7 @@
           <a:lstStyle/>
           <a:p>
             <a:fld id="{83F8789F-F040-1246-9F38-E63023A0164B}" type="datetimeFigureOut">
-              <a:t>5/29/25</a:t>
+              <a:t>30/05/2025</a:t>
             </a:fld>
             <a:endParaRPr lang="en-US"/>
           </a:p>
@@ -5953,7 +5020,7 @@
           <a:lstStyle/>
           <a:p>
             <a:fld id="{68C28C03-D10A-AE46-9567-8D9AA2376AB0}" type="slidenum">
-              <a:t>‹#›</a:t>
+              <a:t>‹N°›</a:t>
             </a:fld>
             <a:endParaRPr lang="en-US"/>
           </a:p>
@@ -6310,7 +5377,7 @@
           <a:lstStyle/>
           <a:p>
             <a:fld id="{83F8789F-F040-1246-9F38-E63023A0164B}" type="datetimeFigureOut">
-              <a:t>5/29/25</a:t>
+              <a:t>30/05/2025</a:t>
             </a:fld>
             <a:endParaRPr lang="en-US"/>
           </a:p>
@@ -6363,7 +5430,7 @@
           <a:lstStyle/>
           <a:p>
             <a:fld id="{68C28C03-D10A-AE46-9567-8D9AA2376AB0}" type="slidenum">
-              <a:t>‹#›</a:t>
+              <a:t>‹N°›</a:t>
             </a:fld>
             <a:endParaRPr lang="en-US"/>
           </a:p>
@@ -6449,7 +5516,7 @@
           <a:lstStyle/>
           <a:p>
             <a:fld id="{83F8789F-F040-1246-9F38-E63023A0164B}" type="datetimeFigureOut">
-              <a:t>5/29/25</a:t>
+              <a:t>30/05/2025</a:t>
             </a:fld>
             <a:endParaRPr lang="en-US"/>
           </a:p>
@@ -6502,7 +5569,7 @@
           <a:lstStyle/>
           <a:p>
             <a:fld id="{68C28C03-D10A-AE46-9567-8D9AA2376AB0}" type="slidenum">
-              <a:t>‹#›</a:t>
+              <a:t>‹N°›</a:t>
             </a:fld>
             <a:endParaRPr lang="en-US"/>
           </a:p>
@@ -6560,7 +5627,7 @@
           <a:lstStyle/>
           <a:p>
             <a:fld id="{83F8789F-F040-1246-9F38-E63023A0164B}" type="datetimeFigureOut">
-              <a:t>5/29/25</a:t>
+              <a:t>30/05/2025</a:t>
             </a:fld>
             <a:endParaRPr lang="en-US"/>
           </a:p>
@@ -6613,7 +5680,7 @@
           <a:lstStyle/>
           <a:p>
             <a:fld id="{68C28C03-D10A-AE46-9567-8D9AA2376AB0}" type="slidenum">
-              <a:t>‹#›</a:t>
+              <a:t>‹N°›</a:t>
             </a:fld>
             <a:endParaRPr lang="en-US"/>
           </a:p>
@@ -6869,7 +5936,7 @@
           <a:lstStyle/>
           <a:p>
             <a:fld id="{83F8789F-F040-1246-9F38-E63023A0164B}" type="datetimeFigureOut">
-              <a:t>5/29/25</a:t>
+              <a:t>30/05/2025</a:t>
             </a:fld>
             <a:endParaRPr lang="en-US"/>
           </a:p>
@@ -6922,7 +5989,7 @@
           <a:lstStyle/>
           <a:p>
             <a:fld id="{68C28C03-D10A-AE46-9567-8D9AA2376AB0}" type="slidenum">
-              <a:t>‹#›</a:t>
+              <a:t>‹N°›</a:t>
             </a:fld>
             <a:endParaRPr lang="en-US"/>
           </a:p>
@@ -7155,7 +6222,7 @@
           <a:lstStyle/>
           <a:p>
             <a:fld id="{83F8789F-F040-1246-9F38-E63023A0164B}" type="datetimeFigureOut">
-              <a:t>5/29/25</a:t>
+              <a:t>30/05/2025</a:t>
             </a:fld>
             <a:endParaRPr lang="en-US"/>
           </a:p>
@@ -7208,7 +6275,7 @@
           <a:lstStyle/>
           <a:p>
             <a:fld id="{68C28C03-D10A-AE46-9567-8D9AA2376AB0}" type="slidenum">
-              <a:t>‹#›</a:t>
+              <a:t>‹N°›</a:t>
             </a:fld>
             <a:endParaRPr lang="en-US"/>
           </a:p>
@@ -7394,7 +6461,7 @@
           </a:lstStyle>
           <a:p>
             <a:fld id="{83F8789F-F040-1246-9F38-E63023A0164B}" type="datetimeFigureOut">
-              <a:t>5/29/25</a:t>
+              <a:t>30/05/2025</a:t>
             </a:fld>
             <a:endParaRPr lang="en-US"/>
           </a:p>
@@ -7483,7 +6550,7 @@
           </a:lstStyle>
           <a:p>
             <a:fld id="{68C28C03-D10A-AE46-9567-8D9AA2376AB0}" type="slidenum">
-              <a:t>‹#›</a:t>
+              <a:t>‹N°›</a:t>
             </a:fld>
             <a:endParaRPr lang="en-US"/>
           </a:p>
@@ -8084,14 +7151,19 @@
             <p:ph type="title"/>
           </p:nvPr>
         </p:nvSpPr>
-        <p:spPr/>
+        <p:spPr>
+          <a:xfrm>
+            <a:off x="838200" y="365125"/>
+            <a:ext cx="10515600" cy="779463"/>
+          </a:xfrm>
+        </p:spPr>
         <p:txBody>
           <a:bodyPr/>
           <a:lstStyle/>
           <a:p>
             <a:r>
-              <a:rPr lang="en-US"/>
-              <a:t>Methods (preprocessing)</a:t>
+              <a:rPr lang="en-US" dirty="0"/>
+              <a:t>Classical Models Exploration</a:t>
             </a:r>
           </a:p>
         </p:txBody>
@@ -8112,64 +7184,95 @@
             <p:ph idx="1"/>
           </p:nvPr>
         </p:nvSpPr>
-        <p:spPr/>
+        <p:spPr>
+          <a:xfrm>
+            <a:off x="838200" y="1464191"/>
+            <a:ext cx="10515600" cy="990251"/>
+          </a:xfrm>
+        </p:spPr>
         <p:txBody>
           <a:bodyPr/>
           <a:lstStyle/>
           <a:p>
             <a:r>
-              <a:rPr lang="en-US"/>
-              <a:t>How you approached the dataset, cleaning, preprocessing...</a:t>
-            </a:r>
-          </a:p>
-          <a:p>
-            <a:r>
-              <a:rPr lang="en-US"/>
-              <a:t>Techniques you tried. Did you end up using all of them? Did you discard any, for some reason?</a:t>
-            </a:r>
-          </a:p>
-          <a:p>
-            <a:r>
-              <a:rPr lang="en-US"/>
-              <a:t>Charts that display the impact of the techniques on accuracy</a:t>
-            </a:r>
-          </a:p>
-        </p:txBody>
-      </p:sp>
-      <p:graphicFrame>
-        <p:nvGraphicFramePr>
-          <p:cNvPr id="4" name="Chart 3">
-            <a:extLst>
-              <a:ext uri="{FF2B5EF4-FFF2-40B4-BE49-F238E27FC236}">
-                <a16:creationId xmlns:a16="http://schemas.microsoft.com/office/drawing/2014/main" id="{6A9C027C-ADBD-953C-5C24-6FC7F9F59C03}"/>
-              </a:ext>
-            </a:extLst>
-          </p:cNvPr>
-          <p:cNvGraphicFramePr/>
-          <p:nvPr>
-            <p:extLst>
-              <p:ext uri="{D42A27DB-BD31-4B8C-83A1-F6EECF244321}">
-                <p14:modId xmlns:p14="http://schemas.microsoft.com/office/powerpoint/2010/main" val="1423913326"/>
-              </p:ext>
-            </p:extLst>
-          </p:nvPr>
-        </p:nvGraphicFramePr>
-        <p:xfrm>
-          <a:off x="3111062" y="3878318"/>
-          <a:ext cx="5262179" cy="2757780"/>
-        </p:xfrm>
-        <a:graphic>
-          <a:graphicData uri="http://schemas.openxmlformats.org/drawingml/2006/chart">
-            <c:chart xmlns:c="http://schemas.openxmlformats.org/drawingml/2006/chart" xmlns:r="http://schemas.openxmlformats.org/officeDocument/2006/relationships" r:id="rId2"/>
-          </a:graphicData>
-        </a:graphic>
-      </p:graphicFrame>
+              <a:rPr lang="en-US" dirty="0"/>
+              <a:t>Baseline: Logistic Regression with Stemming + </a:t>
+            </a:r>
+            <a:r>
+              <a:rPr lang="en-US" dirty="0" err="1"/>
+              <a:t>CountVectorizer</a:t>
+            </a:r>
+            <a:endParaRPr lang="en-US" dirty="0"/>
+          </a:p>
+          <a:p>
+            <a:r>
+              <a:rPr lang="en-US" dirty="0"/>
+              <a:t>Model </a:t>
+            </a:r>
+            <a:r>
+              <a:rPr lang="fr-FR" dirty="0" err="1"/>
+              <a:t>Selection</a:t>
+            </a:r>
+            <a:r>
+              <a:rPr lang="fr-FR" dirty="0"/>
+              <a:t> &amp; Evaluation</a:t>
+            </a:r>
+            <a:r>
+              <a:rPr lang="en-US" dirty="0"/>
+              <a:t> : </a:t>
+            </a:r>
+            <a:r>
+              <a:rPr lang="en-US" dirty="0" err="1"/>
+              <a:t>GridSearchCV</a:t>
+            </a:r>
+            <a:r>
+              <a:rPr lang="en-US" dirty="0"/>
+              <a:t> + TF- IDF</a:t>
+            </a:r>
+          </a:p>
+        </p:txBody>
+      </p:sp>
+      <p:sp>
+        <p:nvSpPr>
+          <p:cNvPr id="5" name="TextBox 4">
+            <a:extLst>
+              <a:ext uri="{FF2B5EF4-FFF2-40B4-BE49-F238E27FC236}">
+                <a16:creationId xmlns:a16="http://schemas.microsoft.com/office/drawing/2014/main" id="{9029F6EC-8A9B-5A14-6D5B-D9D053688737}"/>
+              </a:ext>
+            </a:extLst>
+          </p:cNvPr>
+          <p:cNvSpPr txBox="1"/>
+          <p:nvPr/>
+        </p:nvSpPr>
+        <p:spPr>
+          <a:xfrm>
+            <a:off x="11258731" y="45522"/>
+            <a:ext cx="401072" cy="369332"/>
+          </a:xfrm>
+          <a:prstGeom prst="rect">
+            <a:avLst/>
+          </a:prstGeom>
+          <a:noFill/>
+        </p:spPr>
+        <p:txBody>
+          <a:bodyPr wrap="none" rtlCol="0">
+            <a:spAutoFit/>
+          </a:bodyPr>
+          <a:lstStyle/>
+          <a:p>
+            <a:r>
+              <a:rPr lang="en-US" dirty="0"/>
+              <a:t>JD</a:t>
+            </a:r>
+          </a:p>
+        </p:txBody>
+      </p:sp>
       <p:pic>
         <p:nvPicPr>
-          <p:cNvPr id="7" name="Picture 6">
-            <a:extLst>
-              <a:ext uri="{FF2B5EF4-FFF2-40B4-BE49-F238E27FC236}">
-                <a16:creationId xmlns:a16="http://schemas.microsoft.com/office/drawing/2014/main" id="{BF177205-9F68-8819-2262-5F244BF2C3EE}"/>
+          <p:cNvPr id="7" name="Image 6">
+            <a:extLst>
+              <a:ext uri="{FF2B5EF4-FFF2-40B4-BE49-F238E27FC236}">
+                <a16:creationId xmlns:a16="http://schemas.microsoft.com/office/drawing/2014/main" id="{2BA2230A-7D9F-271E-E78A-F1055BAF8AB3}"/>
               </a:ext>
             </a:extLst>
           </p:cNvPr>
@@ -8186,8 +7289,126 @@
         </p:blipFill>
         <p:spPr>
           <a:xfrm>
-            <a:off x="4190124" y="2038044"/>
-            <a:ext cx="7772400" cy="3410673"/>
+            <a:off x="105781" y="2839453"/>
+            <a:ext cx="6739580" cy="4018547"/>
+          </a:xfrm>
+          <a:prstGeom prst="rect">
+            <a:avLst/>
+          </a:prstGeom>
+        </p:spPr>
+      </p:pic>
+      <p:pic>
+        <p:nvPicPr>
+          <p:cNvPr id="13" name="Image 12">
+            <a:extLst>
+              <a:ext uri="{FF2B5EF4-FFF2-40B4-BE49-F238E27FC236}">
+                <a16:creationId xmlns:a16="http://schemas.microsoft.com/office/drawing/2014/main" id="{17884D41-B265-97B7-9F3C-BE5A36E0358D}"/>
+              </a:ext>
+            </a:extLst>
+          </p:cNvPr>
+          <p:cNvPicPr>
+            <a:picLocks noChangeAspect="1"/>
+          </p:cNvPicPr>
+          <p:nvPr/>
+        </p:nvPicPr>
+        <p:blipFill>
+          <a:blip r:embed="rId4"/>
+          <a:stretch>
+            <a:fillRect/>
+          </a:stretch>
+        </p:blipFill>
+        <p:spPr>
+          <a:xfrm>
+            <a:off x="7010271" y="2454442"/>
+            <a:ext cx="4914227" cy="3705726"/>
+          </a:xfrm>
+          <a:prstGeom prst="rect">
+            <a:avLst/>
+          </a:prstGeom>
+        </p:spPr>
+      </p:pic>
+    </p:spTree>
+    <p:extLst>
+      <p:ext uri="{BB962C8B-B14F-4D97-AF65-F5344CB8AC3E}">
+        <p14:creationId xmlns:p14="http://schemas.microsoft.com/office/powerpoint/2010/main" val="2773743017"/>
+      </p:ext>
+    </p:extLst>
+  </p:cSld>
+  <p:clrMapOvr>
+    <a:masterClrMapping/>
+  </p:clrMapOvr>
+</p:sld>
+</file>
+
+<file path=ppt/slides/slide4.xml><?xml version="1.0" encoding="utf-8"?>
+<p:sld xmlns:a="http://schemas.openxmlformats.org/drawingml/2006/main" xmlns:r="http://schemas.openxmlformats.org/officeDocument/2006/relationships" xmlns:p="http://schemas.openxmlformats.org/presentationml/2006/main">
+  <p:cSld>
+    <p:spTree>
+      <p:nvGrpSpPr>
+        <p:cNvPr id="1" name=""/>
+        <p:cNvGrpSpPr/>
+        <p:nvPr/>
+      </p:nvGrpSpPr>
+      <p:grpSpPr>
+        <a:xfrm>
+          <a:off x="0" y="0"/>
+          <a:ext cx="0" cy="0"/>
+          <a:chOff x="0" y="0"/>
+          <a:chExt cx="0" cy="0"/>
+        </a:xfrm>
+      </p:grpSpPr>
+      <p:sp>
+        <p:nvSpPr>
+          <p:cNvPr id="2" name="Title 1">
+            <a:extLst>
+              <a:ext uri="{FF2B5EF4-FFF2-40B4-BE49-F238E27FC236}">
+                <a16:creationId xmlns:a16="http://schemas.microsoft.com/office/drawing/2014/main" id="{9CDA37DD-20C1-5C1C-B2D4-9B1040AB4E14}"/>
+              </a:ext>
+            </a:extLst>
+          </p:cNvPr>
+          <p:cNvSpPr>
+            <a:spLocks noGrp="1"/>
+          </p:cNvSpPr>
+          <p:nvPr>
+            <p:ph type="title"/>
+          </p:nvPr>
+        </p:nvSpPr>
+        <p:spPr/>
+        <p:txBody>
+          <a:bodyPr/>
+          <a:lstStyle/>
+          <a:p>
+            <a:r>
+              <a:rPr lang="en-US" dirty="0"/>
+              <a:t>Preprocessing and Tuning</a:t>
+            </a:r>
+          </a:p>
+        </p:txBody>
+      </p:sp>
+      <p:pic>
+        <p:nvPicPr>
+          <p:cNvPr id="7" name="Picture 6">
+            <a:extLst>
+              <a:ext uri="{FF2B5EF4-FFF2-40B4-BE49-F238E27FC236}">
+                <a16:creationId xmlns:a16="http://schemas.microsoft.com/office/drawing/2014/main" id="{BF177205-9F68-8819-2262-5F244BF2C3EE}"/>
+              </a:ext>
+            </a:extLst>
+          </p:cNvPr>
+          <p:cNvPicPr>
+            <a:picLocks noChangeAspect="1"/>
+          </p:cNvPicPr>
+          <p:nvPr/>
+        </p:nvPicPr>
+        <p:blipFill>
+          <a:blip r:embed="rId2"/>
+          <a:stretch>
+            <a:fillRect/>
+          </a:stretch>
+        </p:blipFill>
+        <p:spPr>
+          <a:xfrm>
+            <a:off x="352050" y="3681663"/>
+            <a:ext cx="6785347" cy="2977536"/>
           </a:xfrm>
           <a:prstGeom prst="rect">
             <a:avLst/>
@@ -8229,10 +7450,329 @@
           </a:p>
         </p:txBody>
       </p:sp>
+      <p:graphicFrame>
+        <p:nvGraphicFramePr>
+          <p:cNvPr id="9" name="Tableau 8">
+            <a:extLst>
+              <a:ext uri="{FF2B5EF4-FFF2-40B4-BE49-F238E27FC236}">
+                <a16:creationId xmlns:a16="http://schemas.microsoft.com/office/drawing/2014/main" id="{958D5B2E-01A5-F259-356A-41274CB399A8}"/>
+              </a:ext>
+            </a:extLst>
+          </p:cNvPr>
+          <p:cNvGraphicFramePr>
+            <a:graphicFrameLocks noGrp="1"/>
+          </p:cNvGraphicFramePr>
+          <p:nvPr/>
+        </p:nvGraphicFramePr>
+        <p:xfrm>
+          <a:off x="838200" y="1447324"/>
+          <a:ext cx="10979939" cy="1559560"/>
+        </p:xfrm>
+        <a:graphic>
+          <a:graphicData uri="http://schemas.openxmlformats.org/drawingml/2006/table">
+            <a:tbl>
+              <a:tblPr firstRow="1" bandRow="1">
+                <a:tableStyleId>{5940675A-B579-460E-94D1-54222C63F5DA}</a:tableStyleId>
+              </a:tblPr>
+              <a:tblGrid>
+                <a:gridCol w="6829044">
+                  <a:extLst>
+                    <a:ext uri="{9D8B030D-6E8A-4147-A177-3AD203B41FA5}">
+                      <a16:colId xmlns:a16="http://schemas.microsoft.com/office/drawing/2014/main" val="1285521251"/>
+                    </a:ext>
+                  </a:extLst>
+                </a:gridCol>
+                <a:gridCol w="4150895">
+                  <a:extLst>
+                    <a:ext uri="{9D8B030D-6E8A-4147-A177-3AD203B41FA5}">
+                      <a16:colId xmlns:a16="http://schemas.microsoft.com/office/drawing/2014/main" val="3399148459"/>
+                    </a:ext>
+                  </a:extLst>
+                </a:gridCol>
+              </a:tblGrid>
+              <a:tr h="370840">
+                <a:tc>
+                  <a:txBody>
+                    <a:bodyPr/>
+                    <a:lstStyle/>
+                    <a:p>
+                      <a:pPr algn="ctr"/>
+                      <a:r>
+                        <a:rPr lang="fr-FR" dirty="0" err="1">
+                          <a:solidFill>
+                            <a:schemeClr val="tx1"/>
+                          </a:solidFill>
+                        </a:rPr>
+                        <a:t>Text</a:t>
+                      </a:r>
+                      <a:r>
+                        <a:rPr lang="fr-FR" dirty="0">
+                          <a:solidFill>
+                            <a:schemeClr val="tx1"/>
+                          </a:solidFill>
+                        </a:rPr>
+                        <a:t> </a:t>
+                      </a:r>
+                      <a:r>
+                        <a:rPr lang="fr-FR" dirty="0" err="1">
+                          <a:solidFill>
+                            <a:schemeClr val="tx1"/>
+                          </a:solidFill>
+                        </a:rPr>
+                        <a:t>Prepocessing</a:t>
+                      </a:r>
+                      <a:endParaRPr lang="fr-FR" dirty="0">
+                        <a:solidFill>
+                          <a:schemeClr val="tx1"/>
+                        </a:solidFill>
+                      </a:endParaRPr>
+                    </a:p>
+                  </a:txBody>
+                  <a:tcPr/>
+                </a:tc>
+                <a:tc>
+                  <a:txBody>
+                    <a:bodyPr/>
+                    <a:lstStyle/>
+                    <a:p>
+                      <a:pPr algn="ctr"/>
+                      <a:r>
+                        <a:rPr lang="fr-FR" dirty="0" err="1">
+                          <a:solidFill>
+                            <a:schemeClr val="tx1"/>
+                          </a:solidFill>
+                        </a:rPr>
+                        <a:t>Feature</a:t>
+                      </a:r>
+                      <a:r>
+                        <a:rPr lang="fr-FR" dirty="0">
+                          <a:solidFill>
+                            <a:schemeClr val="tx1"/>
+                          </a:solidFill>
+                        </a:rPr>
+                        <a:t> </a:t>
+                      </a:r>
+                      <a:r>
+                        <a:rPr lang="fr-FR" dirty="0" err="1">
+                          <a:solidFill>
+                            <a:schemeClr val="tx1"/>
+                          </a:solidFill>
+                        </a:rPr>
+                        <a:t>Preprocessing</a:t>
+                      </a:r>
+                      <a:endParaRPr lang="fr-FR" dirty="0">
+                        <a:solidFill>
+                          <a:schemeClr val="tx1"/>
+                        </a:solidFill>
+                      </a:endParaRPr>
+                    </a:p>
+                  </a:txBody>
+                  <a:tcPr/>
+                </a:tc>
+                <a:extLst>
+                  <a:ext uri="{0D108BD9-81ED-4DB2-BD59-A6C34878D82A}">
+                    <a16:rowId xmlns:a16="http://schemas.microsoft.com/office/drawing/2014/main" val="1103554156"/>
+                  </a:ext>
+                </a:extLst>
+              </a:tr>
+              <a:tr h="370840">
+                <a:tc>
+                  <a:txBody>
+                    <a:bodyPr/>
+                    <a:lstStyle/>
+                    <a:p>
+                      <a:pPr marL="285750" indent="-285750">
+                        <a:buFont typeface="Arial" panose="020B0604020202020204" pitchFamily="34" charset="0"/>
+                        <a:buChar char="•"/>
+                      </a:pPr>
+                      <a:r>
+                        <a:rPr lang="fr-FR" dirty="0" err="1"/>
+                        <a:t>Text</a:t>
+                      </a:r>
+                      <a:r>
+                        <a:rPr lang="fr-FR" dirty="0"/>
+                        <a:t> Structure </a:t>
+                      </a:r>
+                      <a:r>
+                        <a:rPr lang="fr-FR" dirty="0" err="1"/>
+                        <a:t>Analyzation</a:t>
+                      </a:r>
+                      <a:r>
+                        <a:rPr lang="fr-FR" dirty="0"/>
+                        <a:t> (Shape, </a:t>
+                      </a:r>
+                      <a:r>
+                        <a:rPr lang="fr-FR" dirty="0" err="1"/>
+                        <a:t>Columns</a:t>
+                      </a:r>
+                      <a:r>
+                        <a:rPr lang="fr-FR" dirty="0"/>
+                        <a:t>, Duplicates…)</a:t>
+                      </a:r>
+                    </a:p>
+                    <a:p>
+                      <a:pPr marL="285750" indent="-285750">
+                        <a:buFont typeface="Arial" panose="020B0604020202020204" pitchFamily="34" charset="0"/>
+                        <a:buChar char="•"/>
+                      </a:pPr>
+                      <a:r>
+                        <a:rPr lang="fr-FR" dirty="0" err="1"/>
+                        <a:t>Text</a:t>
+                      </a:r>
+                      <a:r>
+                        <a:rPr lang="fr-FR" dirty="0"/>
+                        <a:t> </a:t>
+                      </a:r>
+                      <a:r>
+                        <a:rPr lang="fr-FR" dirty="0" err="1"/>
+                        <a:t>Normalization</a:t>
+                      </a:r>
+                      <a:r>
+                        <a:rPr lang="fr-FR" dirty="0"/>
+                        <a:t> (</a:t>
+                      </a:r>
+                      <a:r>
+                        <a:rPr lang="fr-FR" dirty="0" err="1"/>
+                        <a:t>Tokenize</a:t>
+                      </a:r>
+                      <a:r>
+                        <a:rPr lang="fr-FR" dirty="0"/>
+                        <a:t>, </a:t>
+                      </a:r>
+                      <a:r>
+                        <a:rPr lang="fr-FR" dirty="0" err="1"/>
+                        <a:t>Stopwords</a:t>
+                      </a:r>
+                      <a:r>
+                        <a:rPr lang="fr-FR" dirty="0"/>
+                        <a:t>, </a:t>
+                      </a:r>
+                      <a:r>
+                        <a:rPr lang="fr-FR" dirty="0" err="1"/>
+                        <a:t>Stemmetize</a:t>
+                      </a:r>
+                      <a:r>
+                        <a:rPr lang="fr-FR" dirty="0"/>
+                        <a:t>, </a:t>
+                      </a:r>
+                      <a:r>
+                        <a:rPr lang="fr-FR" dirty="0" err="1"/>
+                        <a:t>Lemmatize</a:t>
+                      </a:r>
+                      <a:r>
+                        <a:rPr lang="fr-FR" dirty="0"/>
+                        <a:t>…)</a:t>
+                      </a:r>
+                    </a:p>
+                    <a:p>
+                      <a:pPr marL="285750" indent="-285750">
+                        <a:buFont typeface="Arial" panose="020B0604020202020204" pitchFamily="34" charset="0"/>
+                        <a:buChar char="•"/>
+                      </a:pPr>
+                      <a:r>
+                        <a:rPr lang="fr-FR" dirty="0"/>
+                        <a:t>Data Augmentation (</a:t>
+                      </a:r>
+                      <a:r>
+                        <a:rPr lang="fr-FR" dirty="0" err="1"/>
+                        <a:t>Text</a:t>
+                      </a:r>
+                      <a:r>
+                        <a:rPr lang="fr-FR" dirty="0"/>
+                        <a:t> </a:t>
+                      </a:r>
+                      <a:r>
+                        <a:rPr lang="fr-FR" dirty="0" err="1"/>
+                        <a:t>Synonyms</a:t>
+                      </a:r>
+                      <a:r>
+                        <a:rPr lang="fr-FR" dirty="0"/>
+                        <a:t>)</a:t>
+                      </a:r>
+                    </a:p>
+                    <a:p>
+                      <a:pPr marL="285750" indent="-285750">
+                        <a:buFont typeface="Arial" panose="020B0604020202020204" pitchFamily="34" charset="0"/>
+                        <a:buChar char="•"/>
+                      </a:pPr>
+                      <a:r>
+                        <a:rPr lang="fr-FR" dirty="0" err="1"/>
+                        <a:t>Hyperparameters</a:t>
+                      </a:r>
+                      <a:r>
+                        <a:rPr lang="fr-FR" dirty="0"/>
+                        <a:t> (N-Gram range…)</a:t>
+                      </a:r>
+                    </a:p>
+                  </a:txBody>
+                  <a:tcPr/>
+                </a:tc>
+                <a:tc>
+                  <a:txBody>
+                    <a:bodyPr/>
+                    <a:lstStyle/>
+                    <a:p>
+                      <a:pPr marL="285750" indent="-285750">
+                        <a:buFont typeface="Arial" panose="020B0604020202020204" pitchFamily="34" charset="0"/>
+                        <a:buChar char="•"/>
+                      </a:pPr>
+                      <a:r>
+                        <a:rPr lang="en-US" dirty="0"/>
+                        <a:t>Bag-of-Words (</a:t>
+                      </a:r>
+                      <a:r>
+                        <a:rPr lang="en-US" dirty="0" err="1"/>
+                        <a:t>BoW</a:t>
+                      </a:r>
+                      <a:r>
+                        <a:rPr lang="en-US" dirty="0"/>
+                        <a:t>)</a:t>
+                      </a:r>
+                    </a:p>
+                    <a:p>
+                      <a:pPr marL="285750" indent="-285750">
+                        <a:buFont typeface="Arial" panose="020B0604020202020204" pitchFamily="34" charset="0"/>
+                        <a:buChar char="•"/>
+                      </a:pPr>
+                      <a:r>
+                        <a:rPr lang="en-US" dirty="0"/>
+                        <a:t>TF-IDF</a:t>
+                      </a:r>
+                    </a:p>
+                    <a:p>
+                      <a:pPr marL="285750" indent="-285750">
+                        <a:buFont typeface="Arial" panose="020B0604020202020204" pitchFamily="34" charset="0"/>
+                        <a:buChar char="•"/>
+                      </a:pPr>
+                      <a:r>
+                        <a:rPr lang="en-US" dirty="0" err="1"/>
+                        <a:t>GloVe</a:t>
+                      </a:r>
+                      <a:r>
+                        <a:rPr lang="en-US" dirty="0"/>
+                        <a:t> - word Embedding</a:t>
+                      </a:r>
+                    </a:p>
+                    <a:p>
+                      <a:endParaRPr lang="fr-FR" dirty="0"/>
+                    </a:p>
+                  </a:txBody>
+                  <a:tcPr/>
+                </a:tc>
+                <a:extLst>
+                  <a:ext uri="{0D108BD9-81ED-4DB2-BD59-A6C34878D82A}">
+                    <a16:rowId xmlns:a16="http://schemas.microsoft.com/office/drawing/2014/main" val="603490620"/>
+                  </a:ext>
+                </a:extLst>
+              </a:tr>
+            </a:tbl>
+          </a:graphicData>
+        </a:graphic>
+      </p:graphicFrame>
     </p:spTree>
     <p:extLst>
       <p:ext uri="{BB962C8B-B14F-4D97-AF65-F5344CB8AC3E}">
-        <p14:creationId xmlns:p14="http://schemas.microsoft.com/office/powerpoint/2010/main" val="4203737440"/>
+        <p14:creationId xmlns:p14="http://schemas.microsoft.com/office/powerpoint/2010/main" val="2075510991"/>
       </p:ext>
     </p:extLst>
   </p:cSld>
@@ -8242,7 +7782,7 @@
 </p:sld>
 </file>
 
-<file path=ppt/slides/slide4.xml><?xml version="1.0" encoding="utf-8"?>
+<file path=ppt/slides/slide5.xml><?xml version="1.0" encoding="utf-8"?>
 <p:sld xmlns:a="http://schemas.openxmlformats.org/drawingml/2006/main" xmlns:r="http://schemas.openxmlformats.org/officeDocument/2006/relationships" xmlns:p="http://schemas.openxmlformats.org/presentationml/2006/main">
   <p:cSld>
     <p:spTree>
@@ -8281,15 +7821,29 @@
             <p:ph type="title"/>
           </p:nvPr>
         </p:nvSpPr>
-        <p:spPr/>
+        <p:spPr>
+          <a:xfrm>
+            <a:off x="838200" y="77970"/>
+            <a:ext cx="10515600" cy="1325563"/>
+          </a:xfrm>
+        </p:spPr>
         <p:txBody>
           <a:bodyPr/>
           <a:lstStyle/>
           <a:p>
             <a:r>
-              <a:rPr lang="en-US"/>
-              <a:t>Methods (embedding)</a:t>
-            </a:r>
+              <a:rPr lang="fr-FR" dirty="0"/>
+              <a:t>Embedded </a:t>
+            </a:r>
+            <a:r>
+              <a:rPr lang="fr-FR" dirty="0" err="1"/>
+              <a:t>Models</a:t>
+            </a:r>
+            <a:r>
+              <a:rPr lang="fr-FR" dirty="0"/>
+              <a:t> Exploration</a:t>
+            </a:r>
+            <a:endParaRPr lang="en-US" dirty="0"/>
           </a:p>
         </p:txBody>
       </p:sp>
@@ -8309,38 +7863,61 @@
             <p:ph idx="1"/>
           </p:nvPr>
         </p:nvSpPr>
-        <p:spPr/>
-        <p:txBody>
-          <a:bodyPr/>
+        <p:spPr>
+          <a:xfrm>
+            <a:off x="188494" y="1403533"/>
+            <a:ext cx="5093368" cy="4166101"/>
+          </a:xfrm>
+        </p:spPr>
+        <p:txBody>
+          <a:bodyPr>
+            <a:normAutofit/>
+          </a:bodyPr>
           <a:lstStyle/>
           <a:p>
             <a:r>
-              <a:rPr lang="en-US"/>
-              <a:t>Optionally, use embeddings for your model</a:t>
-            </a:r>
-          </a:p>
-          <a:p>
-            <a:r>
-              <a:rPr lang="en-US"/>
-              <a:t>Preprocessing may be different</a:t>
-            </a:r>
-          </a:p>
-          <a:p>
-            <a:r>
-              <a:rPr lang="en-US"/>
-              <a:t>You should use the embeddings matrix as input for the numerical model</a:t>
-            </a:r>
-          </a:p>
-          <a:p>
-            <a:r>
-              <a:rPr lang="en-US"/>
-              <a:t>Or, you can combine embeddings with BoW/TF-IDF</a:t>
-            </a:r>
-          </a:p>
-          <a:p>
-            <a:r>
-              <a:rPr lang="en-US"/>
-              <a:t>Explain your experiments</a:t>
+              <a:rPr lang="en-US" dirty="0"/>
+              <a:t>Model 6a : </a:t>
+            </a:r>
+            <a:r>
+              <a:rPr lang="fr-FR" dirty="0"/>
+              <a:t>Universal Sentence Encoder for sentence-</a:t>
+            </a:r>
+            <a:r>
+              <a:rPr lang="fr-FR" dirty="0" err="1"/>
+              <a:t>level</a:t>
+            </a:r>
+            <a:r>
+              <a:rPr lang="fr-FR" dirty="0"/>
+              <a:t> </a:t>
+            </a:r>
+            <a:r>
+              <a:rPr lang="fr-FR" dirty="0" err="1"/>
+              <a:t>semantics</a:t>
+            </a:r>
+            <a:r>
+              <a:rPr lang="en-US" dirty="0"/>
+              <a:t>.</a:t>
+            </a:r>
+          </a:p>
+          <a:p>
+            <a:r>
+              <a:rPr lang="en-US" dirty="0"/>
+              <a:t>Model 6b : </a:t>
+            </a:r>
+            <a:r>
+              <a:rPr lang="en-US" dirty="0" err="1"/>
+              <a:t>GloVe</a:t>
+            </a:r>
+            <a:r>
+              <a:rPr lang="en-US" dirty="0"/>
+              <a:t> embeddings with mean pooling.</a:t>
+            </a:r>
+          </a:p>
+          <a:p>
+            <a:r>
+              <a:rPr lang="en-US" dirty="0"/>
+              <a:t>Simple BERT : Contextual embeddings with minimal preprocessing.</a:t>
             </a:r>
           </a:p>
         </p:txBody>
@@ -8380,179 +7957,40 @@
           </a:p>
         </p:txBody>
       </p:sp>
-    </p:spTree>
-    <p:extLst>
-      <p:ext uri="{BB962C8B-B14F-4D97-AF65-F5344CB8AC3E}">
-        <p14:creationId xmlns:p14="http://schemas.microsoft.com/office/powerpoint/2010/main" val="319888296"/>
-      </p:ext>
-    </p:extLst>
-  </p:cSld>
-  <p:clrMapOvr>
-    <a:masterClrMapping/>
-  </p:clrMapOvr>
-</p:sld>
-</file>
-
-<file path=ppt/slides/slide5.xml><?xml version="1.0" encoding="utf-8"?>
-<p:sld xmlns:a="http://schemas.openxmlformats.org/drawingml/2006/main" xmlns:r="http://schemas.openxmlformats.org/officeDocument/2006/relationships" xmlns:p="http://schemas.openxmlformats.org/presentationml/2006/main">
-  <p:cSld>
-    <p:spTree>
-      <p:nvGrpSpPr>
-        <p:cNvPr id="1" name=""/>
-        <p:cNvGrpSpPr/>
-        <p:nvPr/>
-      </p:nvGrpSpPr>
-      <p:grpSpPr>
-        <a:xfrm>
-          <a:off x="0" y="0"/>
-          <a:ext cx="0" cy="0"/>
-          <a:chOff x="0" y="0"/>
-          <a:chExt cx="0" cy="0"/>
-        </a:xfrm>
-      </p:grpSpPr>
-      <p:sp>
-        <p:nvSpPr>
-          <p:cNvPr id="2" name="Title 1">
-            <a:extLst>
-              <a:ext uri="{FF2B5EF4-FFF2-40B4-BE49-F238E27FC236}">
-                <a16:creationId xmlns:a16="http://schemas.microsoft.com/office/drawing/2014/main" id="{9CDA37DD-20C1-5C1C-B2D4-9B1040AB4E14}"/>
-              </a:ext>
-            </a:extLst>
-          </p:cNvPr>
-          <p:cNvSpPr>
-            <a:spLocks noGrp="1"/>
-          </p:cNvSpPr>
-          <p:nvPr>
-            <p:ph type="title"/>
-          </p:nvPr>
-        </p:nvSpPr>
-        <p:spPr/>
-        <p:txBody>
-          <a:bodyPr/>
-          <a:lstStyle/>
-          <a:p>
-            <a:r>
-              <a:rPr lang="en-US" dirty="0"/>
-              <a:t>Methods (models) – 1 or 2 slides</a:t>
-            </a:r>
-          </a:p>
-        </p:txBody>
-      </p:sp>
-      <p:sp>
-        <p:nvSpPr>
-          <p:cNvPr id="3" name="Content Placeholder 2">
-            <a:extLst>
-              <a:ext uri="{FF2B5EF4-FFF2-40B4-BE49-F238E27FC236}">
-                <a16:creationId xmlns:a16="http://schemas.microsoft.com/office/drawing/2014/main" id="{F9085543-BAEE-863C-37C8-06656B914EC0}"/>
-              </a:ext>
-            </a:extLst>
-          </p:cNvPr>
-          <p:cNvSpPr>
-            <a:spLocks noGrp="1"/>
-          </p:cNvSpPr>
-          <p:nvPr>
-            <p:ph idx="1"/>
-          </p:nvPr>
-        </p:nvSpPr>
-        <p:spPr/>
-        <p:txBody>
-          <a:bodyPr/>
-          <a:lstStyle/>
-          <a:p>
-            <a:r>
-              <a:rPr lang="en-US"/>
-              <a:t>Explain the models you tried and why</a:t>
-            </a:r>
-          </a:p>
-          <a:p>
-            <a:r>
-              <a:rPr lang="en-US"/>
-              <a:t>Chart comparing them. </a:t>
-            </a:r>
-          </a:p>
-          <a:p>
-            <a:pPr lvl="1"/>
-            <a:r>
-              <a:rPr lang="en-US"/>
-              <a:t>Try to capture subtleties but don’t make it too complicated. </a:t>
-            </a:r>
-          </a:p>
-          <a:p>
-            <a:pPr lvl="1"/>
-            <a:r>
-              <a:rPr lang="en-US"/>
-              <a:t>For example, if a model didn’t improve with preprocessing then don’t include it. But if a model was very affected by preprocessing/hyperparameters then it’s interesting to see how</a:t>
-            </a:r>
-          </a:p>
-        </p:txBody>
-      </p:sp>
-      <p:graphicFrame>
-        <p:nvGraphicFramePr>
-          <p:cNvPr id="4" name="Chart 3">
-            <a:extLst>
-              <a:ext uri="{FF2B5EF4-FFF2-40B4-BE49-F238E27FC236}">
-                <a16:creationId xmlns:a16="http://schemas.microsoft.com/office/drawing/2014/main" id="{6A9C027C-ADBD-953C-5C24-6FC7F9F59C03}"/>
-              </a:ext>
-            </a:extLst>
-          </p:cNvPr>
-          <p:cNvGraphicFramePr/>
-          <p:nvPr>
-            <p:extLst>
-              <p:ext uri="{D42A27DB-BD31-4B8C-83A1-F6EECF244321}">
-                <p14:modId xmlns:p14="http://schemas.microsoft.com/office/powerpoint/2010/main" val="3965728679"/>
-              </p:ext>
-            </p:extLst>
-          </p:nvPr>
-        </p:nvGraphicFramePr>
-        <p:xfrm>
-          <a:off x="3111062" y="4100220"/>
-          <a:ext cx="5262179" cy="2757780"/>
-        </p:xfrm>
-        <a:graphic>
-          <a:graphicData uri="http://schemas.openxmlformats.org/drawingml/2006/chart">
-            <c:chart xmlns:c="http://schemas.openxmlformats.org/drawingml/2006/chart" xmlns:r="http://schemas.openxmlformats.org/officeDocument/2006/relationships" r:id="rId3"/>
-          </a:graphicData>
-        </a:graphic>
-      </p:graphicFrame>
-      <p:sp>
-        <p:nvSpPr>
-          <p:cNvPr id="5" name="TextBox 4">
-            <a:extLst>
-              <a:ext uri="{FF2B5EF4-FFF2-40B4-BE49-F238E27FC236}">
-                <a16:creationId xmlns:a16="http://schemas.microsoft.com/office/drawing/2014/main" id="{9029F6EC-8A9B-5A14-6D5B-D9D053688737}"/>
-              </a:ext>
-            </a:extLst>
-          </p:cNvPr>
-          <p:cNvSpPr txBox="1"/>
+      <p:pic>
+        <p:nvPicPr>
+          <p:cNvPr id="7" name="Image 6">
+            <a:extLst>
+              <a:ext uri="{FF2B5EF4-FFF2-40B4-BE49-F238E27FC236}">
+                <a16:creationId xmlns:a16="http://schemas.microsoft.com/office/drawing/2014/main" id="{F1737D34-A8F8-5327-2C34-7A955BE00A90}"/>
+              </a:ext>
+            </a:extLst>
+          </p:cNvPr>
+          <p:cNvPicPr>
+            <a:picLocks noChangeAspect="1"/>
+          </p:cNvPicPr>
           <p:nvPr/>
-        </p:nvSpPr>
+        </p:nvPicPr>
+        <p:blipFill>
+          <a:blip r:embed="rId2"/>
+          <a:stretch>
+            <a:fillRect/>
+          </a:stretch>
+        </p:blipFill>
         <p:spPr>
           <a:xfrm>
-            <a:off x="11258731" y="45522"/>
-            <a:ext cx="401072" cy="369332"/>
+            <a:off x="5020767" y="1403532"/>
+            <a:ext cx="7171234" cy="4756636"/>
           </a:xfrm>
           <a:prstGeom prst="rect">
             <a:avLst/>
           </a:prstGeom>
-          <a:noFill/>
         </p:spPr>
-        <p:txBody>
-          <a:bodyPr wrap="none" rtlCol="0">
-            <a:spAutoFit/>
-          </a:bodyPr>
-          <a:lstStyle/>
-          <a:p>
-            <a:r>
-              <a:rPr lang="en-US" dirty="0"/>
-              <a:t>JD</a:t>
-            </a:r>
-          </a:p>
-        </p:txBody>
-      </p:sp>
+      </p:pic>
     </p:spTree>
     <p:extLst>
       <p:ext uri="{BB962C8B-B14F-4D97-AF65-F5344CB8AC3E}">
-        <p14:creationId xmlns:p14="http://schemas.microsoft.com/office/powerpoint/2010/main" val="3237876696"/>
+        <p14:creationId xmlns:p14="http://schemas.microsoft.com/office/powerpoint/2010/main" val="3145451097"/>
       </p:ext>
     </p:extLst>
   </p:cSld>
@@ -8601,8 +8039,8 @@
           <a:lstStyle/>
           <a:p>
             <a:r>
-              <a:rPr lang="en-US"/>
-              <a:t>Testing vs Validation accuracy</a:t>
+              <a:rPr lang="en-US" dirty="0"/>
+              <a:t>Methods (models) – 1 or 2 slides</a:t>
             </a:r>
           </a:p>
         </p:txBody>
@@ -8630,13 +8068,27 @@
           <a:p>
             <a:r>
               <a:rPr lang="en-US"/>
-              <a:t>Compare both numbers</a:t>
-            </a:r>
-          </a:p>
-          <a:p>
-            <a:r>
-              <a:rPr lang="en-US"/>
-              <a:t>If they are very different, explain why</a:t>
+              <a:t>Explain the models you tried and why</a:t>
+            </a:r>
+          </a:p>
+          <a:p>
+            <a:r>
+              <a:rPr lang="en-US"/>
+              <a:t>Chart comparing them. </a:t>
+            </a:r>
+          </a:p>
+          <a:p>
+            <a:pPr lvl="1"/>
+            <a:r>
+              <a:rPr lang="en-US"/>
+              <a:t>Try to capture subtleties but don’t make it too complicated. </a:t>
+            </a:r>
+          </a:p>
+          <a:p>
+            <a:pPr lvl="1"/>
+            <a:r>
+              <a:rPr lang="en-US"/>
+              <a:t>For example, if a model didn’t improve with preprocessing then don’t include it. But if a model was very affected by preprocessing/hyperparameters then it’s interesting to see how</a:t>
             </a:r>
           </a:p>
         </p:txBody>
@@ -8654,18 +8106,18 @@
           <p:nvPr>
             <p:extLst>
               <p:ext uri="{D42A27DB-BD31-4B8C-83A1-F6EECF244321}">
-                <p14:modId xmlns:p14="http://schemas.microsoft.com/office/powerpoint/2010/main" val="799440586"/>
+                <p14:modId xmlns:p14="http://schemas.microsoft.com/office/powerpoint/2010/main" val="3965728679"/>
               </p:ext>
             </p:extLst>
           </p:nvPr>
         </p:nvGraphicFramePr>
         <p:xfrm>
-          <a:off x="8573530" y="1282380"/>
-          <a:ext cx="2780270" cy="2757780"/>
+          <a:off x="3111062" y="4100220"/>
+          <a:ext cx="5262179" cy="2757780"/>
         </p:xfrm>
         <a:graphic>
           <a:graphicData uri="http://schemas.openxmlformats.org/drawingml/2006/chart">
-            <c:chart xmlns:c="http://schemas.openxmlformats.org/drawingml/2006/chart" xmlns:r="http://schemas.openxmlformats.org/officeDocument/2006/relationships" r:id="rId2"/>
+            <c:chart xmlns:c="http://schemas.openxmlformats.org/drawingml/2006/chart" xmlns:r="http://schemas.openxmlformats.org/officeDocument/2006/relationships" r:id="rId3"/>
           </a:graphicData>
         </a:graphic>
       </p:graphicFrame>
@@ -8674,7 +8126,7 @@
           <p:cNvPr id="5" name="TextBox 4">
             <a:extLst>
               <a:ext uri="{FF2B5EF4-FFF2-40B4-BE49-F238E27FC236}">
-                <a16:creationId xmlns:a16="http://schemas.microsoft.com/office/drawing/2014/main" id="{0C05A9D7-8C6F-CFC3-0D55-7C1C88740D6F}"/>
+                <a16:creationId xmlns:a16="http://schemas.microsoft.com/office/drawing/2014/main" id="{9029F6EC-8A9B-5A14-6D5B-D9D053688737}"/>
               </a:ext>
             </a:extLst>
           </p:cNvPr>
@@ -8684,7 +8136,7 @@
         <p:spPr>
           <a:xfrm>
             <a:off x="11258731" y="45522"/>
-            <a:ext cx="933269" cy="369332"/>
+            <a:ext cx="401072" cy="369332"/>
           </a:xfrm>
           <a:prstGeom prst="rect">
             <a:avLst/>
@@ -8699,7 +8151,7 @@
           <a:p>
             <a:r>
               <a:rPr lang="en-US" dirty="0"/>
-              <a:t>Michael</a:t>
+              <a:t>JD</a:t>
             </a:r>
           </a:p>
         </p:txBody>
@@ -8707,7 +8159,7 @@
     </p:spTree>
     <p:extLst>
       <p:ext uri="{BB962C8B-B14F-4D97-AF65-F5344CB8AC3E}">
-        <p14:creationId xmlns:p14="http://schemas.microsoft.com/office/powerpoint/2010/main" val="3828345116"/>
+        <p14:creationId xmlns:p14="http://schemas.microsoft.com/office/powerpoint/2010/main" val="3237876696"/>
       </p:ext>
     </p:extLst>
   </p:cSld>
@@ -8757,7 +8209,7 @@
           <a:p>
             <a:r>
               <a:rPr lang="en-US"/>
-              <a:t>Takeaways</a:t>
+              <a:t>Testing vs Validation accuracy</a:t>
             </a:r>
           </a:p>
         </p:txBody>
@@ -8785,19 +8237,76 @@
           <a:p>
             <a:r>
               <a:rPr lang="en-US"/>
-              <a:t>Recap / conclusions</a:t>
-            </a:r>
-          </a:p>
-          <a:p>
-            <a:r>
-              <a:rPr lang="en-US"/>
-              <a:t>Challenges</a:t>
-            </a:r>
-          </a:p>
-          <a:p>
-            <a:r>
-              <a:rPr lang="en-US"/>
-              <a:t>Key learnings</a:t>
+              <a:t>Compare both numbers</a:t>
+            </a:r>
+          </a:p>
+          <a:p>
+            <a:r>
+              <a:rPr lang="en-US"/>
+              <a:t>If they are very different, explain why</a:t>
+            </a:r>
+          </a:p>
+        </p:txBody>
+      </p:sp>
+      <p:graphicFrame>
+        <p:nvGraphicFramePr>
+          <p:cNvPr id="4" name="Chart 3">
+            <a:extLst>
+              <a:ext uri="{FF2B5EF4-FFF2-40B4-BE49-F238E27FC236}">
+                <a16:creationId xmlns:a16="http://schemas.microsoft.com/office/drawing/2014/main" id="{6A9C027C-ADBD-953C-5C24-6FC7F9F59C03}"/>
+              </a:ext>
+            </a:extLst>
+          </p:cNvPr>
+          <p:cNvGraphicFramePr/>
+          <p:nvPr>
+            <p:extLst>
+              <p:ext uri="{D42A27DB-BD31-4B8C-83A1-F6EECF244321}">
+                <p14:modId xmlns:p14="http://schemas.microsoft.com/office/powerpoint/2010/main" val="799440586"/>
+              </p:ext>
+            </p:extLst>
+          </p:nvPr>
+        </p:nvGraphicFramePr>
+        <p:xfrm>
+          <a:off x="8573530" y="1282380"/>
+          <a:ext cx="2780270" cy="2757780"/>
+        </p:xfrm>
+        <a:graphic>
+          <a:graphicData uri="http://schemas.openxmlformats.org/drawingml/2006/chart">
+            <c:chart xmlns:c="http://schemas.openxmlformats.org/drawingml/2006/chart" xmlns:r="http://schemas.openxmlformats.org/officeDocument/2006/relationships" r:id="rId2"/>
+          </a:graphicData>
+        </a:graphic>
+      </p:graphicFrame>
+      <p:sp>
+        <p:nvSpPr>
+          <p:cNvPr id="5" name="TextBox 4">
+            <a:extLst>
+              <a:ext uri="{FF2B5EF4-FFF2-40B4-BE49-F238E27FC236}">
+                <a16:creationId xmlns:a16="http://schemas.microsoft.com/office/drawing/2014/main" id="{0C05A9D7-8C6F-CFC3-0D55-7C1C88740D6F}"/>
+              </a:ext>
+            </a:extLst>
+          </p:cNvPr>
+          <p:cNvSpPr txBox="1"/>
+          <p:nvPr/>
+        </p:nvSpPr>
+        <p:spPr>
+          <a:xfrm>
+            <a:off x="11258731" y="45522"/>
+            <a:ext cx="933269" cy="369332"/>
+          </a:xfrm>
+          <a:prstGeom prst="rect">
+            <a:avLst/>
+          </a:prstGeom>
+          <a:noFill/>
+        </p:spPr>
+        <p:txBody>
+          <a:bodyPr wrap="none" rtlCol="0">
+            <a:spAutoFit/>
+          </a:bodyPr>
+          <a:lstStyle/>
+          <a:p>
+            <a:r>
+              <a:rPr lang="en-US" dirty="0"/>
+              <a:t>Michael</a:t>
             </a:r>
           </a:p>
         </p:txBody>
@@ -8805,7 +8314,7 @@
     </p:spTree>
     <p:extLst>
       <p:ext uri="{BB962C8B-B14F-4D97-AF65-F5344CB8AC3E}">
-        <p14:creationId xmlns:p14="http://schemas.microsoft.com/office/powerpoint/2010/main" val="1129822540"/>
+        <p14:creationId xmlns:p14="http://schemas.microsoft.com/office/powerpoint/2010/main" val="3828345116"/>
       </p:ext>
     </p:extLst>
   </p:cSld>
@@ -8816,6 +8325,126 @@
 </file>
 
 <file path=ppt/slides/slide8.xml><?xml version="1.0" encoding="utf-8"?>
+<p:sld xmlns:a="http://schemas.openxmlformats.org/drawingml/2006/main" xmlns:r="http://schemas.openxmlformats.org/officeDocument/2006/relationships" xmlns:p="http://schemas.openxmlformats.org/presentationml/2006/main">
+  <p:cSld>
+    <p:spTree>
+      <p:nvGrpSpPr>
+        <p:cNvPr id="1" name=""/>
+        <p:cNvGrpSpPr/>
+        <p:nvPr/>
+      </p:nvGrpSpPr>
+      <p:grpSpPr>
+        <a:xfrm>
+          <a:off x="0" y="0"/>
+          <a:ext cx="0" cy="0"/>
+          <a:chOff x="0" y="0"/>
+          <a:chExt cx="0" cy="0"/>
+        </a:xfrm>
+      </p:grpSpPr>
+      <p:sp>
+        <p:nvSpPr>
+          <p:cNvPr id="2" name="Title 1">
+            <a:extLst>
+              <a:ext uri="{FF2B5EF4-FFF2-40B4-BE49-F238E27FC236}">
+                <a16:creationId xmlns:a16="http://schemas.microsoft.com/office/drawing/2014/main" id="{9CDA37DD-20C1-5C1C-B2D4-9B1040AB4E14}"/>
+              </a:ext>
+            </a:extLst>
+          </p:cNvPr>
+          <p:cNvSpPr>
+            <a:spLocks noGrp="1"/>
+          </p:cNvSpPr>
+          <p:nvPr>
+            <p:ph type="title"/>
+          </p:nvPr>
+        </p:nvSpPr>
+        <p:spPr/>
+        <p:txBody>
+          <a:bodyPr/>
+          <a:lstStyle/>
+          <a:p>
+            <a:r>
+              <a:rPr lang="en-US" dirty="0"/>
+              <a:t>Takeaways</a:t>
+            </a:r>
+          </a:p>
+        </p:txBody>
+      </p:sp>
+      <p:sp>
+        <p:nvSpPr>
+          <p:cNvPr id="3" name="Content Placeholder 2">
+            <a:extLst>
+              <a:ext uri="{FF2B5EF4-FFF2-40B4-BE49-F238E27FC236}">
+                <a16:creationId xmlns:a16="http://schemas.microsoft.com/office/drawing/2014/main" id="{F9085543-BAEE-863C-37C8-06656B914EC0}"/>
+              </a:ext>
+            </a:extLst>
+          </p:cNvPr>
+          <p:cNvSpPr>
+            <a:spLocks noGrp="1"/>
+          </p:cNvSpPr>
+          <p:nvPr>
+            <p:ph idx="1"/>
+          </p:nvPr>
+        </p:nvSpPr>
+        <p:spPr/>
+        <p:txBody>
+          <a:bodyPr>
+            <a:normAutofit/>
+          </a:bodyPr>
+          <a:lstStyle/>
+          <a:p>
+            <a:r>
+              <a:rPr lang="en-US" dirty="0"/>
+              <a:t>Simple models can still perform well with proper tuning</a:t>
+            </a:r>
+          </a:p>
+          <a:p>
+            <a:r>
+              <a:rPr lang="en-US" dirty="0"/>
+              <a:t>Embeddings (BERT) bring performance at the cost of training time</a:t>
+            </a:r>
+          </a:p>
+          <a:p>
+            <a:r>
+              <a:rPr lang="en-US" dirty="0"/>
+              <a:t>Data cleaning was crucial: garbage in, garbage out</a:t>
+            </a:r>
+          </a:p>
+          <a:p>
+            <a:r>
+              <a:rPr lang="en-US" dirty="0"/>
+              <a:t>Learned to balance model performance, interpretability, and compute cost</a:t>
+            </a:r>
+          </a:p>
+          <a:p>
+            <a:r>
+              <a:rPr lang="en-US" dirty="0"/>
+              <a:t>Improve collaboration skills, version code with git and </a:t>
+            </a:r>
+            <a:r>
+              <a:rPr lang="en-US" dirty="0" err="1"/>
+              <a:t>github</a:t>
+            </a:r>
+            <a:r>
+              <a:rPr lang="en-US" dirty="0"/>
+              <a:t>, and structure an ML workflow (reusable functions)</a:t>
+            </a:r>
+          </a:p>
+        </p:txBody>
+      </p:sp>
+    </p:spTree>
+    <p:extLst>
+      <p:ext uri="{BB962C8B-B14F-4D97-AF65-F5344CB8AC3E}">
+        <p14:creationId xmlns:p14="http://schemas.microsoft.com/office/powerpoint/2010/main" val="3540792297"/>
+      </p:ext>
+    </p:extLst>
+  </p:cSld>
+  <p:clrMapOvr>
+    <a:masterClrMapping/>
+  </p:clrMapOvr>
+</p:sld>
+</file>
+
+<file path=ppt/slides/slide9.xml><?xml version="1.0" encoding="utf-8"?>
 <p:sld xmlns:a="http://schemas.openxmlformats.org/drawingml/2006/main" xmlns:r="http://schemas.openxmlformats.org/officeDocument/2006/relationships" xmlns:p="http://schemas.openxmlformats.org/presentationml/2006/main">
   <p:cSld>
     <p:bg>

</xml_diff>

<commit_message>
Presentation update + Model2 confusion matrix update
</commit_message>
<xml_diff>
--- a/g2_presentation.pptx
+++ b/g2_presentation.pptx
@@ -5,7 +5,7 @@
     <p:sldMasterId id="2147483648" r:id="rId1"/>
   </p:sldMasterIdLst>
   <p:notesMasterIdLst>
-    <p:notesMasterId r:id="rId11"/>
+    <p:notesMasterId r:id="rId13"/>
   </p:notesMasterIdLst>
   <p:sldIdLst>
     <p:sldId id="256" r:id="rId2"/>
@@ -15,8 +15,10 @@
     <p:sldId id="266" r:id="rId6"/>
     <p:sldId id="259" r:id="rId7"/>
     <p:sldId id="260" r:id="rId8"/>
-    <p:sldId id="267" r:id="rId9"/>
-    <p:sldId id="262" r:id="rId10"/>
+    <p:sldId id="269" r:id="rId9"/>
+    <p:sldId id="268" r:id="rId10"/>
+    <p:sldId id="267" r:id="rId11"/>
+    <p:sldId id="262" r:id="rId12"/>
   </p:sldIdLst>
   <p:sldSz cx="12192000" cy="6858000"/>
   <p:notesSz cx="6858000" cy="9144000"/>
@@ -6946,6 +6948,341 @@
 </p:sld>
 </file>
 
+<file path=ppt/slides/slide10.xml><?xml version="1.0" encoding="utf-8"?>
+<p:sld xmlns:a="http://schemas.openxmlformats.org/drawingml/2006/main" xmlns:r="http://schemas.openxmlformats.org/officeDocument/2006/relationships" xmlns:p="http://schemas.openxmlformats.org/presentationml/2006/main">
+  <p:cSld>
+    <p:spTree>
+      <p:nvGrpSpPr>
+        <p:cNvPr id="1" name=""/>
+        <p:cNvGrpSpPr/>
+        <p:nvPr/>
+      </p:nvGrpSpPr>
+      <p:grpSpPr>
+        <a:xfrm>
+          <a:off x="0" y="0"/>
+          <a:ext cx="0" cy="0"/>
+          <a:chOff x="0" y="0"/>
+          <a:chExt cx="0" cy="0"/>
+        </a:xfrm>
+      </p:grpSpPr>
+      <p:sp>
+        <p:nvSpPr>
+          <p:cNvPr id="2" name="Title 1">
+            <a:extLst>
+              <a:ext uri="{FF2B5EF4-FFF2-40B4-BE49-F238E27FC236}">
+                <a16:creationId xmlns:a16="http://schemas.microsoft.com/office/drawing/2014/main" id="{9CDA37DD-20C1-5C1C-B2D4-9B1040AB4E14}"/>
+              </a:ext>
+            </a:extLst>
+          </p:cNvPr>
+          <p:cNvSpPr>
+            <a:spLocks noGrp="1"/>
+          </p:cNvSpPr>
+          <p:nvPr>
+            <p:ph type="title"/>
+          </p:nvPr>
+        </p:nvSpPr>
+        <p:spPr/>
+        <p:txBody>
+          <a:bodyPr/>
+          <a:lstStyle/>
+          <a:p>
+            <a:r>
+              <a:rPr lang="en-US" dirty="0"/>
+              <a:t>Takeaways</a:t>
+            </a:r>
+          </a:p>
+        </p:txBody>
+      </p:sp>
+      <p:sp>
+        <p:nvSpPr>
+          <p:cNvPr id="3" name="Content Placeholder 2">
+            <a:extLst>
+              <a:ext uri="{FF2B5EF4-FFF2-40B4-BE49-F238E27FC236}">
+                <a16:creationId xmlns:a16="http://schemas.microsoft.com/office/drawing/2014/main" id="{F9085543-BAEE-863C-37C8-06656B914EC0}"/>
+              </a:ext>
+            </a:extLst>
+          </p:cNvPr>
+          <p:cNvSpPr>
+            <a:spLocks noGrp="1"/>
+          </p:cNvSpPr>
+          <p:nvPr>
+            <p:ph idx="1"/>
+          </p:nvPr>
+        </p:nvSpPr>
+        <p:spPr/>
+        <p:txBody>
+          <a:bodyPr>
+            <a:normAutofit/>
+          </a:bodyPr>
+          <a:lstStyle/>
+          <a:p>
+            <a:r>
+              <a:rPr lang="en-US" dirty="0"/>
+              <a:t>Simple models can still perform well with proper tuning</a:t>
+            </a:r>
+          </a:p>
+          <a:p>
+            <a:r>
+              <a:rPr lang="en-US" dirty="0"/>
+              <a:t>Embeddings (BERT) bring performance at the cost of training time</a:t>
+            </a:r>
+          </a:p>
+          <a:p>
+            <a:r>
+              <a:rPr lang="en-US" dirty="0"/>
+              <a:t>Data cleaning was crucial: garbage in, garbage out</a:t>
+            </a:r>
+          </a:p>
+          <a:p>
+            <a:r>
+              <a:rPr lang="en-US" dirty="0"/>
+              <a:t>Learned to balance model performance, interpretability, and compute cost</a:t>
+            </a:r>
+          </a:p>
+          <a:p>
+            <a:r>
+              <a:rPr lang="en-US" dirty="0"/>
+              <a:t>Improve collaboration skills, version code with git and </a:t>
+            </a:r>
+            <a:r>
+              <a:rPr lang="en-US" dirty="0" err="1"/>
+              <a:t>github</a:t>
+            </a:r>
+            <a:r>
+              <a:rPr lang="en-US" dirty="0"/>
+              <a:t>, and structure an ML workflow (reusable functions)</a:t>
+            </a:r>
+          </a:p>
+        </p:txBody>
+      </p:sp>
+    </p:spTree>
+    <p:extLst>
+      <p:ext uri="{BB962C8B-B14F-4D97-AF65-F5344CB8AC3E}">
+        <p14:creationId xmlns:p14="http://schemas.microsoft.com/office/powerpoint/2010/main" val="3540792297"/>
+      </p:ext>
+    </p:extLst>
+  </p:cSld>
+  <p:clrMapOvr>
+    <a:masterClrMapping/>
+  </p:clrMapOvr>
+</p:sld>
+</file>
+
+<file path=ppt/slides/slide11.xml><?xml version="1.0" encoding="utf-8"?>
+<p:sld xmlns:a="http://schemas.openxmlformats.org/drawingml/2006/main" xmlns:r="http://schemas.openxmlformats.org/officeDocument/2006/relationships" xmlns:p="http://schemas.openxmlformats.org/presentationml/2006/main">
+  <p:cSld>
+    <p:bg>
+      <p:bgPr>
+        <a:solidFill>
+          <a:schemeClr val="accent4">
+            <a:lumMod val="20000"/>
+            <a:lumOff val="80000"/>
+          </a:schemeClr>
+        </a:solidFill>
+        <a:effectLst/>
+      </p:bgPr>
+    </p:bg>
+    <p:spTree>
+      <p:nvGrpSpPr>
+        <p:cNvPr id="1" name=""/>
+        <p:cNvGrpSpPr/>
+        <p:nvPr/>
+      </p:nvGrpSpPr>
+      <p:grpSpPr>
+        <a:xfrm>
+          <a:off x="0" y="0"/>
+          <a:ext cx="0" cy="0"/>
+          <a:chOff x="0" y="0"/>
+          <a:chExt cx="0" cy="0"/>
+        </a:xfrm>
+      </p:grpSpPr>
+      <p:sp>
+        <p:nvSpPr>
+          <p:cNvPr id="2" name="Title 1">
+            <a:extLst>
+              <a:ext uri="{FF2B5EF4-FFF2-40B4-BE49-F238E27FC236}">
+                <a16:creationId xmlns:a16="http://schemas.microsoft.com/office/drawing/2014/main" id="{9CDA37DD-20C1-5C1C-B2D4-9B1040AB4E14}"/>
+              </a:ext>
+            </a:extLst>
+          </p:cNvPr>
+          <p:cNvSpPr>
+            <a:spLocks noGrp="1"/>
+          </p:cNvSpPr>
+          <p:nvPr>
+            <p:ph type="title"/>
+          </p:nvPr>
+        </p:nvSpPr>
+        <p:spPr/>
+        <p:txBody>
+          <a:bodyPr/>
+          <a:lstStyle/>
+          <a:p>
+            <a:r>
+              <a:rPr lang="en-US"/>
+              <a:t>Instructions</a:t>
+            </a:r>
+          </a:p>
+        </p:txBody>
+      </p:sp>
+      <p:sp>
+        <p:nvSpPr>
+          <p:cNvPr id="3" name="Content Placeholder 2">
+            <a:extLst>
+              <a:ext uri="{FF2B5EF4-FFF2-40B4-BE49-F238E27FC236}">
+                <a16:creationId xmlns:a16="http://schemas.microsoft.com/office/drawing/2014/main" id="{F9085543-BAEE-863C-37C8-06656B914EC0}"/>
+              </a:ext>
+            </a:extLst>
+          </p:cNvPr>
+          <p:cNvSpPr>
+            <a:spLocks noGrp="1"/>
+          </p:cNvSpPr>
+          <p:nvPr>
+            <p:ph idx="1"/>
+          </p:nvPr>
+        </p:nvSpPr>
+        <p:spPr/>
+        <p:txBody>
+          <a:bodyPr>
+            <a:normAutofit fontScale="77500" lnSpcReduction="20000"/>
+          </a:bodyPr>
+          <a:lstStyle/>
+          <a:p>
+            <a:pPr>
+              <a:lnSpc>
+                <a:spcPct val="120000"/>
+              </a:lnSpc>
+            </a:pPr>
+            <a:r>
+              <a:rPr lang="en-US"/>
+              <a:t>All team members must </a:t>
+            </a:r>
+            <a:r>
+              <a:rPr lang="en-US" b="1"/>
+              <a:t>participate</a:t>
+            </a:r>
+            <a:r>
+              <a:rPr lang="en-US"/>
+              <a:t> (either split the slides, or discuss the part that you did for each slide)</a:t>
+            </a:r>
+          </a:p>
+          <a:p>
+            <a:pPr>
+              <a:lnSpc>
+                <a:spcPct val="120000"/>
+              </a:lnSpc>
+            </a:pPr>
+            <a:r>
+              <a:rPr lang="en-US" b="1"/>
+              <a:t>7 minutes </a:t>
+            </a:r>
+            <a:r>
+              <a:rPr lang="en-US"/>
+              <a:t>for presentation (HARD limit) + 3 minutes for questions</a:t>
+            </a:r>
+          </a:p>
+          <a:p>
+            <a:pPr>
+              <a:lnSpc>
+                <a:spcPct val="120000"/>
+              </a:lnSpc>
+            </a:pPr>
+            <a:r>
+              <a:rPr lang="en-US"/>
+              <a:t>Tip: </a:t>
+            </a:r>
+            <a:r>
+              <a:rPr lang="en-US" b="1"/>
+              <a:t>Rehearse</a:t>
+            </a:r>
+            <a:r>
+              <a:rPr lang="en-US"/>
+              <a:t> the presentation at least once</a:t>
+            </a:r>
+          </a:p>
+          <a:p>
+            <a:pPr marL="0" indent="0">
+              <a:lnSpc>
+                <a:spcPct val="120000"/>
+              </a:lnSpc>
+              <a:buNone/>
+            </a:pPr>
+            <a:endParaRPr lang="en-US"/>
+          </a:p>
+          <a:p>
+            <a:pPr>
+              <a:lnSpc>
+                <a:spcPct val="120000"/>
+              </a:lnSpc>
+            </a:pPr>
+            <a:r>
+              <a:rPr lang="en-US" b="1"/>
+              <a:t>Submit</a:t>
+            </a:r>
+            <a:r>
+              <a:rPr lang="en-US"/>
+              <a:t>: code + ppt + predictions csv on a github repo</a:t>
+            </a:r>
+          </a:p>
+          <a:p>
+            <a:pPr>
+              <a:lnSpc>
+                <a:spcPct val="120000"/>
+              </a:lnSpc>
+            </a:pPr>
+            <a:r>
+              <a:rPr lang="en-US" b="1"/>
+              <a:t>Deadline</a:t>
+            </a:r>
+            <a:r>
+              <a:rPr lang="en-US"/>
+              <a:t>: Friday 5pm. Presentations will start around that time so we have a 30-min buffer to account for technical issues</a:t>
+            </a:r>
+          </a:p>
+          <a:p>
+            <a:pPr>
+              <a:lnSpc>
+                <a:spcPct val="120000"/>
+              </a:lnSpc>
+            </a:pPr>
+            <a:r>
+              <a:rPr lang="en-US"/>
+              <a:t>Each student must </a:t>
+            </a:r>
+            <a:r>
+              <a:rPr lang="en-US" b="1"/>
+              <a:t>submit their own repo </a:t>
+            </a:r>
+            <a:r>
+              <a:rPr lang="en-US"/>
+              <a:t>to the Ironhack portal</a:t>
+            </a:r>
+          </a:p>
+          <a:p>
+            <a:pPr lvl="1">
+              <a:lnSpc>
+                <a:spcPct val="120000"/>
+              </a:lnSpc>
+            </a:pPr>
+            <a:r>
+              <a:rPr lang="en-US"/>
+              <a:t>Group members may submit the same files – but each on their own repo</a:t>
+            </a:r>
+          </a:p>
+        </p:txBody>
+      </p:sp>
+    </p:spTree>
+    <p:extLst>
+      <p:ext uri="{BB962C8B-B14F-4D97-AF65-F5344CB8AC3E}">
+        <p14:creationId xmlns:p14="http://schemas.microsoft.com/office/powerpoint/2010/main" val="3760480868"/>
+      </p:ext>
+    </p:extLst>
+  </p:cSld>
+  <p:clrMapOvr>
+    <a:masterClrMapping/>
+  </p:clrMapOvr>
+</p:sld>
+</file>
+
 <file path=ppt/slides/slide2.xml><?xml version="1.0" encoding="utf-8"?>
 <p:sld xmlns:a="http://schemas.openxmlformats.org/drawingml/2006/main" xmlns:r="http://schemas.openxmlformats.org/officeDocument/2006/relationships" xmlns:p="http://schemas.openxmlformats.org/presentationml/2006/main">
   <p:cSld>
@@ -8341,100 +8678,40 @@
           <a:chExt cx="0" cy="0"/>
         </a:xfrm>
       </p:grpSpPr>
-      <p:sp>
-        <p:nvSpPr>
-          <p:cNvPr id="2" name="Title 1">
-            <a:extLst>
-              <a:ext uri="{FF2B5EF4-FFF2-40B4-BE49-F238E27FC236}">
-                <a16:creationId xmlns:a16="http://schemas.microsoft.com/office/drawing/2014/main" id="{9CDA37DD-20C1-5C1C-B2D4-9B1040AB4E14}"/>
-              </a:ext>
-            </a:extLst>
-          </p:cNvPr>
-          <p:cNvSpPr>
-            <a:spLocks noGrp="1"/>
-          </p:cNvSpPr>
-          <p:nvPr>
-            <p:ph type="title"/>
-          </p:nvPr>
-        </p:nvSpPr>
-        <p:spPr/>
-        <p:txBody>
-          <a:bodyPr/>
-          <a:lstStyle/>
-          <a:p>
-            <a:r>
-              <a:rPr lang="en-US" dirty="0"/>
-              <a:t>Takeaways</a:t>
-            </a:r>
-          </a:p>
-        </p:txBody>
-      </p:sp>
-      <p:sp>
-        <p:nvSpPr>
-          <p:cNvPr id="3" name="Content Placeholder 2">
-            <a:extLst>
-              <a:ext uri="{FF2B5EF4-FFF2-40B4-BE49-F238E27FC236}">
-                <a16:creationId xmlns:a16="http://schemas.microsoft.com/office/drawing/2014/main" id="{F9085543-BAEE-863C-37C8-06656B914EC0}"/>
-              </a:ext>
-            </a:extLst>
-          </p:cNvPr>
-          <p:cNvSpPr>
-            <a:spLocks noGrp="1"/>
-          </p:cNvSpPr>
-          <p:nvPr>
-            <p:ph idx="1"/>
-          </p:nvPr>
-        </p:nvSpPr>
-        <p:spPr/>
-        <p:txBody>
-          <a:bodyPr>
-            <a:normAutofit/>
-          </a:bodyPr>
-          <a:lstStyle/>
-          <a:p>
-            <a:r>
-              <a:rPr lang="en-US" dirty="0"/>
-              <a:t>Simple models can still perform well with proper tuning</a:t>
-            </a:r>
-          </a:p>
-          <a:p>
-            <a:r>
-              <a:rPr lang="en-US" dirty="0"/>
-              <a:t>Embeddings (BERT) bring performance at the cost of training time</a:t>
-            </a:r>
-          </a:p>
-          <a:p>
-            <a:r>
-              <a:rPr lang="en-US" dirty="0"/>
-              <a:t>Data cleaning was crucial: garbage in, garbage out</a:t>
-            </a:r>
-          </a:p>
-          <a:p>
-            <a:r>
-              <a:rPr lang="en-US" dirty="0"/>
-              <a:t>Learned to balance model performance, interpretability, and compute cost</a:t>
-            </a:r>
-          </a:p>
-          <a:p>
-            <a:r>
-              <a:rPr lang="en-US" dirty="0"/>
-              <a:t>Improve collaboration skills, version code with git and </a:t>
-            </a:r>
-            <a:r>
-              <a:rPr lang="en-US" dirty="0" err="1"/>
-              <a:t>github</a:t>
-            </a:r>
-            <a:r>
-              <a:rPr lang="en-US" dirty="0"/>
-              <a:t>, and structure an ML workflow (reusable functions)</a:t>
-            </a:r>
-          </a:p>
-        </p:txBody>
-      </p:sp>
+      <p:pic>
+        <p:nvPicPr>
+          <p:cNvPr id="7" name="Image 6">
+            <a:extLst>
+              <a:ext uri="{FF2B5EF4-FFF2-40B4-BE49-F238E27FC236}">
+                <a16:creationId xmlns:a16="http://schemas.microsoft.com/office/drawing/2014/main" id="{FA35D399-9E5B-364C-6AD8-92F0FB5D20AA}"/>
+              </a:ext>
+            </a:extLst>
+          </p:cNvPr>
+          <p:cNvPicPr>
+            <a:picLocks noChangeAspect="1"/>
+          </p:cNvPicPr>
+          <p:nvPr/>
+        </p:nvPicPr>
+        <p:blipFill>
+          <a:blip r:embed="rId2"/>
+          <a:stretch>
+            <a:fillRect/>
+          </a:stretch>
+        </p:blipFill>
+        <p:spPr>
+          <a:xfrm>
+            <a:off x="134314" y="0"/>
+            <a:ext cx="11923372" cy="6858000"/>
+          </a:xfrm>
+          <a:prstGeom prst="rect">
+            <a:avLst/>
+          </a:prstGeom>
+        </p:spPr>
+      </p:pic>
     </p:spTree>
     <p:extLst>
       <p:ext uri="{BB962C8B-B14F-4D97-AF65-F5344CB8AC3E}">
-        <p14:creationId xmlns:p14="http://schemas.microsoft.com/office/powerpoint/2010/main" val="3540792297"/>
+        <p14:creationId xmlns:p14="http://schemas.microsoft.com/office/powerpoint/2010/main" val="3690581016"/>
       </p:ext>
     </p:extLst>
   </p:cSld>
@@ -8447,17 +8724,6 @@
 <file path=ppt/slides/slide9.xml><?xml version="1.0" encoding="utf-8"?>
 <p:sld xmlns:a="http://schemas.openxmlformats.org/drawingml/2006/main" xmlns:r="http://schemas.openxmlformats.org/officeDocument/2006/relationships" xmlns:p="http://schemas.openxmlformats.org/presentationml/2006/main">
   <p:cSld>
-    <p:bg>
-      <p:bgPr>
-        <a:solidFill>
-          <a:schemeClr val="accent4">
-            <a:lumMod val="20000"/>
-            <a:lumOff val="80000"/>
-          </a:schemeClr>
-        </a:solidFill>
-        <a:effectLst/>
-      </p:bgPr>
-    </p:bg>
     <p:spTree>
       <p:nvGrpSpPr>
         <p:cNvPr id="1" name=""/>
@@ -8474,10 +8740,10 @@
       </p:grpSpPr>
       <p:sp>
         <p:nvSpPr>
-          <p:cNvPr id="2" name="Title 1">
-            <a:extLst>
-              <a:ext uri="{FF2B5EF4-FFF2-40B4-BE49-F238E27FC236}">
-                <a16:creationId xmlns:a16="http://schemas.microsoft.com/office/drawing/2014/main" id="{9CDA37DD-20C1-5C1C-B2D4-9B1040AB4E14}"/>
+          <p:cNvPr id="2" name="Titre 1">
+            <a:extLst>
+              <a:ext uri="{FF2B5EF4-FFF2-40B4-BE49-F238E27FC236}">
+                <a16:creationId xmlns:a16="http://schemas.microsoft.com/office/drawing/2014/main" id="{CA4D12FF-E23C-FB36-4268-5145C6B2114C}"/>
               </a:ext>
             </a:extLst>
           </p:cNvPr>
@@ -8494,162 +8760,145 @@
           <a:lstStyle/>
           <a:p>
             <a:r>
-              <a:rPr lang="en-US"/>
-              <a:t>Instructions</a:t>
-            </a:r>
-          </a:p>
-        </p:txBody>
-      </p:sp>
-      <p:sp>
-        <p:nvSpPr>
-          <p:cNvPr id="3" name="Content Placeholder 2">
-            <a:extLst>
-              <a:ext uri="{FF2B5EF4-FFF2-40B4-BE49-F238E27FC236}">
-                <a16:creationId xmlns:a16="http://schemas.microsoft.com/office/drawing/2014/main" id="{F9085543-BAEE-863C-37C8-06656B914EC0}"/>
+              <a:rPr lang="fr-FR" dirty="0"/>
+              <a:t>Confusion matrix </a:t>
+            </a:r>
+            <a:r>
+              <a:rPr lang="fr-FR" dirty="0" err="1"/>
+              <a:t>comparison</a:t>
+            </a:r>
+            <a:r>
+              <a:rPr lang="fr-FR" dirty="0"/>
+              <a:t> </a:t>
+            </a:r>
+            <a:r>
+              <a:rPr lang="fr-FR" dirty="0" err="1"/>
+              <a:t>between</a:t>
+            </a:r>
+            <a:r>
+              <a:rPr lang="fr-FR" dirty="0"/>
+              <a:t> </a:t>
+            </a:r>
+            <a:r>
+              <a:rPr lang="fr-FR" dirty="0" err="1"/>
+              <a:t>GridSearchCV</a:t>
+            </a:r>
+            <a:r>
+              <a:rPr lang="fr-FR" dirty="0"/>
+              <a:t> LR and Full BERT</a:t>
+            </a:r>
+          </a:p>
+        </p:txBody>
+      </p:sp>
+      <p:sp>
+        <p:nvSpPr>
+          <p:cNvPr id="4" name="AutoShape 2">
+            <a:extLst>
+              <a:ext uri="{FF2B5EF4-FFF2-40B4-BE49-F238E27FC236}">
+                <a16:creationId xmlns:a16="http://schemas.microsoft.com/office/drawing/2014/main" id="{FDBBE4C7-BB09-00B9-5560-2D5256131BF0}"/>
               </a:ext>
             </a:extLst>
           </p:cNvPr>
           <p:cNvSpPr>
-            <a:spLocks noGrp="1"/>
+            <a:spLocks noChangeAspect="1" noChangeArrowheads="1"/>
           </p:cNvSpPr>
-          <p:nvPr>
-            <p:ph idx="1"/>
-          </p:nvPr>
-        </p:nvSpPr>
-        <p:spPr/>
-        <p:txBody>
-          <a:bodyPr>
-            <a:normAutofit fontScale="77500" lnSpcReduction="20000"/>
+          <p:nvPr/>
+        </p:nvSpPr>
+        <p:spPr bwMode="auto">
+          <a:xfrm>
+            <a:off x="5943600" y="3276600"/>
+            <a:ext cx="304800" cy="304800"/>
+          </a:xfrm>
+          <a:prstGeom prst="rect">
+            <a:avLst/>
+          </a:prstGeom>
+          <a:noFill/>
+          <a:extLst>
+            <a:ext uri="{909E8E84-426E-40DD-AFC4-6F175D3DCCD1}">
+              <a14:hiddenFill xmlns:a14="http://schemas.microsoft.com/office/drawing/2010/main">
+                <a:solidFill>
+                  <a:srgbClr val="FFFFFF"/>
+                </a:solidFill>
+              </a14:hiddenFill>
+            </a:ext>
+          </a:extLst>
+        </p:spPr>
+        <p:txBody>
+          <a:bodyPr vert="horz" wrap="square" lIns="91440" tIns="45720" rIns="91440" bIns="45720" numCol="1" anchor="t" anchorCtr="0" compatLnSpc="1">
+            <a:prstTxWarp prst="textNoShape">
+              <a:avLst/>
+            </a:prstTxWarp>
           </a:bodyPr>
           <a:lstStyle/>
           <a:p>
-            <a:pPr>
-              <a:lnSpc>
-                <a:spcPct val="120000"/>
-              </a:lnSpc>
-            </a:pPr>
-            <a:r>
-              <a:rPr lang="en-US"/>
-              <a:t>All team members must </a:t>
-            </a:r>
-            <a:r>
-              <a:rPr lang="en-US" b="1"/>
-              <a:t>participate</a:t>
-            </a:r>
-            <a:r>
-              <a:rPr lang="en-US"/>
-              <a:t> (either split the slides, or discuss the part that you did for each slide)</a:t>
-            </a:r>
-          </a:p>
-          <a:p>
-            <a:pPr>
-              <a:lnSpc>
-                <a:spcPct val="120000"/>
-              </a:lnSpc>
-            </a:pPr>
-            <a:r>
-              <a:rPr lang="en-US" b="1"/>
-              <a:t>7 minutes </a:t>
-            </a:r>
-            <a:r>
-              <a:rPr lang="en-US"/>
-              <a:t>for presentation (HARD limit) + 3 minutes for questions</a:t>
-            </a:r>
-          </a:p>
-          <a:p>
-            <a:pPr>
-              <a:lnSpc>
-                <a:spcPct val="120000"/>
-              </a:lnSpc>
-            </a:pPr>
-            <a:r>
-              <a:rPr lang="en-US"/>
-              <a:t>Tip: </a:t>
-            </a:r>
-            <a:r>
-              <a:rPr lang="en-US" b="1"/>
-              <a:t>Rehearse</a:t>
-            </a:r>
-            <a:r>
-              <a:rPr lang="en-US"/>
-              <a:t> the presentation at least once</a:t>
-            </a:r>
-          </a:p>
-          <a:p>
-            <a:pPr marL="0" indent="0">
-              <a:lnSpc>
-                <a:spcPct val="120000"/>
-              </a:lnSpc>
-              <a:buNone/>
-            </a:pPr>
-            <a:endParaRPr lang="en-US"/>
-          </a:p>
-          <a:p>
-            <a:pPr>
-              <a:lnSpc>
-                <a:spcPct val="120000"/>
-              </a:lnSpc>
-            </a:pPr>
-            <a:r>
-              <a:rPr lang="en-US" b="1"/>
-              <a:t>Submit</a:t>
-            </a:r>
-            <a:r>
-              <a:rPr lang="en-US"/>
-              <a:t>: code + ppt + predictions csv on a github repo</a:t>
-            </a:r>
-          </a:p>
-          <a:p>
-            <a:pPr>
-              <a:lnSpc>
-                <a:spcPct val="120000"/>
-              </a:lnSpc>
-            </a:pPr>
-            <a:r>
-              <a:rPr lang="en-US" b="1"/>
-              <a:t>Deadline</a:t>
-            </a:r>
-            <a:r>
-              <a:rPr lang="en-US"/>
-              <a:t>: Friday 5pm. Presentations will start around that time so we have a 30-min buffer to account for technical issues</a:t>
-            </a:r>
-          </a:p>
-          <a:p>
-            <a:pPr>
-              <a:lnSpc>
-                <a:spcPct val="120000"/>
-              </a:lnSpc>
-            </a:pPr>
-            <a:r>
-              <a:rPr lang="en-US"/>
-              <a:t>Each student must </a:t>
-            </a:r>
-            <a:r>
-              <a:rPr lang="en-US" b="1"/>
-              <a:t>submit their own repo </a:t>
-            </a:r>
-            <a:r>
-              <a:rPr lang="en-US"/>
-              <a:t>to the Ironhack portal</a:t>
-            </a:r>
-          </a:p>
-          <a:p>
-            <a:pPr lvl="1">
-              <a:lnSpc>
-                <a:spcPct val="120000"/>
-              </a:lnSpc>
-            </a:pPr>
-            <a:r>
-              <a:rPr lang="en-US"/>
-              <a:t>Group members may submit the same files – but each on their own repo</a:t>
-            </a:r>
-          </a:p>
-        </p:txBody>
-      </p:sp>
+            <a:endParaRPr lang="fr-FR"/>
+          </a:p>
+        </p:txBody>
+      </p:sp>
+      <p:pic>
+        <p:nvPicPr>
+          <p:cNvPr id="7" name="Image 6">
+            <a:extLst>
+              <a:ext uri="{FF2B5EF4-FFF2-40B4-BE49-F238E27FC236}">
+                <a16:creationId xmlns:a16="http://schemas.microsoft.com/office/drawing/2014/main" id="{31AEC6C3-1329-F77D-9DF0-5A35213817B7}"/>
+              </a:ext>
+            </a:extLst>
+          </p:cNvPr>
+          <p:cNvPicPr>
+            <a:picLocks noChangeAspect="1"/>
+          </p:cNvPicPr>
+          <p:nvPr/>
+        </p:nvPicPr>
+        <p:blipFill>
+          <a:blip r:embed="rId2"/>
+          <a:stretch>
+            <a:fillRect/>
+          </a:stretch>
+        </p:blipFill>
+        <p:spPr>
+          <a:xfrm>
+            <a:off x="288931" y="1690686"/>
+            <a:ext cx="5421499" cy="4703947"/>
+          </a:xfrm>
+          <a:prstGeom prst="rect">
+            <a:avLst/>
+          </a:prstGeom>
+        </p:spPr>
+      </p:pic>
+      <p:pic>
+        <p:nvPicPr>
+          <p:cNvPr id="9" name="Image 8">
+            <a:extLst>
+              <a:ext uri="{FF2B5EF4-FFF2-40B4-BE49-F238E27FC236}">
+                <a16:creationId xmlns:a16="http://schemas.microsoft.com/office/drawing/2014/main" id="{DA3E81CB-E101-80DD-26B6-809D76AD8862}"/>
+              </a:ext>
+            </a:extLst>
+          </p:cNvPr>
+          <p:cNvPicPr>
+            <a:picLocks noChangeAspect="1"/>
+          </p:cNvPicPr>
+          <p:nvPr/>
+        </p:nvPicPr>
+        <p:blipFill>
+          <a:blip r:embed="rId3"/>
+          <a:stretch>
+            <a:fillRect/>
+          </a:stretch>
+        </p:blipFill>
+        <p:spPr>
+          <a:xfrm>
+            <a:off x="6399441" y="1690687"/>
+            <a:ext cx="5421499" cy="4637923"/>
+          </a:xfrm>
+          <a:prstGeom prst="rect">
+            <a:avLst/>
+          </a:prstGeom>
+        </p:spPr>
+      </p:pic>
     </p:spTree>
     <p:extLst>
       <p:ext uri="{BB962C8B-B14F-4D97-AF65-F5344CB8AC3E}">
-        <p14:creationId xmlns:p14="http://schemas.microsoft.com/office/powerpoint/2010/main" val="3760480868"/>
+        <p14:creationId xmlns:p14="http://schemas.microsoft.com/office/powerpoint/2010/main" val="2563928342"/>
       </p:ext>
     </p:extLst>
   </p:cSld>

</xml_diff>

<commit_message>
Graph added to preprocessing slide
</commit_message>
<xml_diff>
--- a/g2_presentation.pptx
+++ b/g2_presentation.pptx
@@ -7722,36 +7722,6 @@
           </a:p>
         </p:txBody>
       </p:sp>
-      <p:pic>
-        <p:nvPicPr>
-          <p:cNvPr id="7" name="Picture 6">
-            <a:extLst>
-              <a:ext uri="{FF2B5EF4-FFF2-40B4-BE49-F238E27FC236}">
-                <a16:creationId xmlns:a16="http://schemas.microsoft.com/office/drawing/2014/main" id="{BF177205-9F68-8819-2262-5F244BF2C3EE}"/>
-              </a:ext>
-            </a:extLst>
-          </p:cNvPr>
-          <p:cNvPicPr>
-            <a:picLocks noChangeAspect="1"/>
-          </p:cNvPicPr>
-          <p:nvPr/>
-        </p:nvPicPr>
-        <p:blipFill>
-          <a:blip r:embed="rId2"/>
-          <a:stretch>
-            <a:fillRect/>
-          </a:stretch>
-        </p:blipFill>
-        <p:spPr>
-          <a:xfrm>
-            <a:off x="352050" y="3681663"/>
-            <a:ext cx="6785347" cy="2977536"/>
-          </a:xfrm>
-          <a:prstGeom prst="rect">
-            <a:avLst/>
-          </a:prstGeom>
-        </p:spPr>
-      </p:pic>
       <p:sp>
         <p:nvSpPr>
           <p:cNvPr id="8" name="TextBox 7">
@@ -8106,6 +8076,66 @@
           </a:graphicData>
         </a:graphic>
       </p:graphicFrame>
+      <p:pic>
+        <p:nvPicPr>
+          <p:cNvPr id="4" name="Image 3">
+            <a:extLst>
+              <a:ext uri="{FF2B5EF4-FFF2-40B4-BE49-F238E27FC236}">
+                <a16:creationId xmlns:a16="http://schemas.microsoft.com/office/drawing/2014/main" id="{F6D2201B-53A4-E791-8E31-7BCBFD16CF7F}"/>
+              </a:ext>
+            </a:extLst>
+          </p:cNvPr>
+          <p:cNvPicPr>
+            <a:picLocks noChangeAspect="1"/>
+          </p:cNvPicPr>
+          <p:nvPr/>
+        </p:nvPicPr>
+        <p:blipFill>
+          <a:blip r:embed="rId2"/>
+          <a:stretch>
+            <a:fillRect/>
+          </a:stretch>
+        </p:blipFill>
+        <p:spPr>
+          <a:xfrm>
+            <a:off x="121353" y="3429000"/>
+            <a:ext cx="5974647" cy="2647950"/>
+          </a:xfrm>
+          <a:prstGeom prst="rect">
+            <a:avLst/>
+          </a:prstGeom>
+        </p:spPr>
+      </p:pic>
+      <p:pic>
+        <p:nvPicPr>
+          <p:cNvPr id="6" name="Image 5">
+            <a:extLst>
+              <a:ext uri="{FF2B5EF4-FFF2-40B4-BE49-F238E27FC236}">
+                <a16:creationId xmlns:a16="http://schemas.microsoft.com/office/drawing/2014/main" id="{551D3478-856F-BA1D-DB3B-3D19711A11CF}"/>
+              </a:ext>
+            </a:extLst>
+          </p:cNvPr>
+          <p:cNvPicPr>
+            <a:picLocks noChangeAspect="1"/>
+          </p:cNvPicPr>
+          <p:nvPr/>
+        </p:nvPicPr>
+        <p:blipFill>
+          <a:blip r:embed="rId3"/>
+          <a:stretch>
+            <a:fillRect/>
+          </a:stretch>
+        </p:blipFill>
+        <p:spPr>
+          <a:xfrm>
+            <a:off x="6096000" y="3429000"/>
+            <a:ext cx="5722139" cy="3197866"/>
+          </a:xfrm>
+          <a:prstGeom prst="rect">
+            <a:avLst/>
+          </a:prstGeom>
+        </p:spPr>
+      </p:pic>
     </p:spTree>
     <p:extLst>
       <p:ext uri="{BB962C8B-B14F-4D97-AF65-F5344CB8AC3E}">

</xml_diff>

<commit_message>
Updated slides for full BERT
</commit_message>
<xml_diff>
--- a/g2_presentation.pptx
+++ b/g2_presentation.pptx
@@ -125,2999 +125,6 @@
 </p:presentation>
 </file>
 
-<file path=ppt/charts/chart1.xml><?xml version="1.0" encoding="utf-8"?>
-<c:chartSpace xmlns:c="http://schemas.openxmlformats.org/drawingml/2006/chart" xmlns:a="http://schemas.openxmlformats.org/drawingml/2006/main" xmlns:r="http://schemas.openxmlformats.org/officeDocument/2006/relationships" xmlns:c16r2="http://schemas.microsoft.com/office/drawing/2015/06/chart">
-  <c:date1904 val="0"/>
-  <c:lang val="fr-FR"/>
-  <c:roundedCorners val="0"/>
-  <mc:AlternateContent xmlns:mc="http://schemas.openxmlformats.org/markup-compatibility/2006">
-    <mc:Choice xmlns:c14="http://schemas.microsoft.com/office/drawing/2007/8/2/chart" Requires="c14">
-      <c14:style val="102"/>
-    </mc:Choice>
-    <mc:Fallback>
-      <c:style val="2"/>
-    </mc:Fallback>
-  </mc:AlternateContent>
-  <c:chart>
-    <c:title>
-      <c:tx>
-        <c:rich>
-          <a:bodyPr rot="0" spcFirstLastPara="1" vertOverflow="ellipsis" vert="horz" wrap="square" anchor="ctr" anchorCtr="1"/>
-          <a:lstStyle/>
-          <a:p>
-            <a:pPr>
-              <a:defRPr sz="1862" b="0" i="0" u="none" strike="noStrike" kern="1200" spc="0" baseline="0">
-                <a:solidFill>
-                  <a:schemeClr val="tx1">
-                    <a:lumMod val="65000"/>
-                    <a:lumOff val="35000"/>
-                  </a:schemeClr>
-                </a:solidFill>
-                <a:latin typeface="+mn-lt"/>
-                <a:ea typeface="+mn-ea"/>
-                <a:cs typeface="+mn-cs"/>
-              </a:defRPr>
-            </a:pPr>
-            <a:r>
-              <a:rPr lang="en-US"/>
-              <a:t>Best models</a:t>
-            </a:r>
-          </a:p>
-        </c:rich>
-      </c:tx>
-      <c:overlay val="0"/>
-      <c:spPr>
-        <a:noFill/>
-        <a:ln>
-          <a:noFill/>
-        </a:ln>
-        <a:effectLst/>
-      </c:spPr>
-      <c:txPr>
-        <a:bodyPr rot="0" spcFirstLastPara="1" vertOverflow="ellipsis" vert="horz" wrap="square" anchor="ctr" anchorCtr="1"/>
-        <a:lstStyle/>
-        <a:p>
-          <a:pPr>
-            <a:defRPr sz="1862" b="0" i="0" u="none" strike="noStrike" kern="1200" spc="0" baseline="0">
-              <a:solidFill>
-                <a:schemeClr val="tx1">
-                  <a:lumMod val="65000"/>
-                  <a:lumOff val="35000"/>
-                </a:schemeClr>
-              </a:solidFill>
-              <a:latin typeface="+mn-lt"/>
-              <a:ea typeface="+mn-ea"/>
-              <a:cs typeface="+mn-cs"/>
-            </a:defRPr>
-          </a:pPr>
-          <a:endParaRPr lang="en-US"/>
-        </a:p>
-      </c:txPr>
-    </c:title>
-    <c:autoTitleDeleted val="0"/>
-    <c:plotArea>
-      <c:layout/>
-      <c:lineChart>
-        <c:grouping val="standard"/>
-        <c:varyColors val="0"/>
-        <c:ser>
-          <c:idx val="0"/>
-          <c:order val="0"/>
-          <c:tx>
-            <c:strRef>
-              <c:f>Sheet1!$B$1</c:f>
-              <c:strCache>
-                <c:ptCount val="1"/>
-                <c:pt idx="0">
-                  <c:v>Preprocessing A</c:v>
-                </c:pt>
-              </c:strCache>
-            </c:strRef>
-          </c:tx>
-          <c:spPr>
-            <a:ln w="28575" cap="rnd">
-              <a:solidFill>
-                <a:schemeClr val="accent1"/>
-              </a:solidFill>
-              <a:round/>
-            </a:ln>
-            <a:effectLst/>
-          </c:spPr>
-          <c:marker>
-            <c:symbol val="none"/>
-          </c:marker>
-          <c:cat>
-            <c:strRef>
-              <c:f>Sheet1!$A$2:$A$5</c:f>
-              <c:strCache>
-                <c:ptCount val="4"/>
-                <c:pt idx="0">
-                  <c:v>Model 1</c:v>
-                </c:pt>
-                <c:pt idx="1">
-                  <c:v>Model 2</c:v>
-                </c:pt>
-                <c:pt idx="2">
-                  <c:v>Model 3</c:v>
-                </c:pt>
-                <c:pt idx="3">
-                  <c:v>Model 4</c:v>
-                </c:pt>
-              </c:strCache>
-            </c:strRef>
-          </c:cat>
-          <c:val>
-            <c:numRef>
-              <c:f>Sheet1!$B$2:$B$5</c:f>
-              <c:numCache>
-                <c:formatCode>General</c:formatCode>
-                <c:ptCount val="4"/>
-                <c:pt idx="0">
-                  <c:v>75</c:v>
-                </c:pt>
-                <c:pt idx="1">
-                  <c:v>70</c:v>
-                </c:pt>
-                <c:pt idx="2">
-                  <c:v>80</c:v>
-                </c:pt>
-                <c:pt idx="3">
-                  <c:v>84</c:v>
-                </c:pt>
-              </c:numCache>
-            </c:numRef>
-          </c:val>
-          <c:smooth val="0"/>
-          <c:extLst>
-            <c:ext xmlns:c16="http://schemas.microsoft.com/office/drawing/2014/chart" uri="{C3380CC4-5D6E-409C-BE32-E72D297353CC}">
-              <c16:uniqueId val="{00000000-B4F6-8B4F-B359-7E3DEF79D9F1}"/>
-            </c:ext>
-          </c:extLst>
-        </c:ser>
-        <c:ser>
-          <c:idx val="1"/>
-          <c:order val="1"/>
-          <c:tx>
-            <c:strRef>
-              <c:f>Sheet1!$C$1</c:f>
-              <c:strCache>
-                <c:ptCount val="1"/>
-                <c:pt idx="0">
-                  <c:v>Preprocessing B</c:v>
-                </c:pt>
-              </c:strCache>
-            </c:strRef>
-          </c:tx>
-          <c:spPr>
-            <a:ln w="28575" cap="rnd">
-              <a:solidFill>
-                <a:schemeClr val="accent2"/>
-              </a:solidFill>
-              <a:round/>
-            </a:ln>
-            <a:effectLst/>
-          </c:spPr>
-          <c:marker>
-            <c:symbol val="none"/>
-          </c:marker>
-          <c:cat>
-            <c:strRef>
-              <c:f>Sheet1!$A$2:$A$5</c:f>
-              <c:strCache>
-                <c:ptCount val="4"/>
-                <c:pt idx="0">
-                  <c:v>Model 1</c:v>
-                </c:pt>
-                <c:pt idx="1">
-                  <c:v>Model 2</c:v>
-                </c:pt>
-                <c:pt idx="2">
-                  <c:v>Model 3</c:v>
-                </c:pt>
-                <c:pt idx="3">
-                  <c:v>Model 4</c:v>
-                </c:pt>
-              </c:strCache>
-            </c:strRef>
-          </c:cat>
-          <c:val>
-            <c:numRef>
-              <c:f>Sheet1!$C$2:$C$5</c:f>
-              <c:numCache>
-                <c:formatCode>General</c:formatCode>
-                <c:ptCount val="4"/>
-                <c:pt idx="0">
-                  <c:v>85</c:v>
-                </c:pt>
-                <c:pt idx="1">
-                  <c:v>93</c:v>
-                </c:pt>
-                <c:pt idx="2">
-                  <c:v>98</c:v>
-                </c:pt>
-                <c:pt idx="3">
-                  <c:v>99</c:v>
-                </c:pt>
-              </c:numCache>
-            </c:numRef>
-          </c:val>
-          <c:smooth val="0"/>
-          <c:extLst>
-            <c:ext xmlns:c16="http://schemas.microsoft.com/office/drawing/2014/chart" uri="{C3380CC4-5D6E-409C-BE32-E72D297353CC}">
-              <c16:uniqueId val="{00000001-B4F6-8B4F-B359-7E3DEF79D9F1}"/>
-            </c:ext>
-          </c:extLst>
-        </c:ser>
-        <c:dLbls>
-          <c:showLegendKey val="0"/>
-          <c:showVal val="0"/>
-          <c:showCatName val="0"/>
-          <c:showSerName val="0"/>
-          <c:showPercent val="0"/>
-          <c:showBubbleSize val="0"/>
-        </c:dLbls>
-        <c:smooth val="0"/>
-        <c:axId val="109254431"/>
-        <c:axId val="109778767"/>
-      </c:lineChart>
-      <c:catAx>
-        <c:axId val="109254431"/>
-        <c:scaling>
-          <c:orientation val="minMax"/>
-        </c:scaling>
-        <c:delete val="0"/>
-        <c:axPos val="b"/>
-        <c:numFmt formatCode="General" sourceLinked="1"/>
-        <c:majorTickMark val="none"/>
-        <c:minorTickMark val="none"/>
-        <c:tickLblPos val="nextTo"/>
-        <c:spPr>
-          <a:noFill/>
-          <a:ln w="9525" cap="flat" cmpd="sng" algn="ctr">
-            <a:solidFill>
-              <a:schemeClr val="tx1">
-                <a:lumMod val="15000"/>
-                <a:lumOff val="85000"/>
-              </a:schemeClr>
-            </a:solidFill>
-            <a:round/>
-          </a:ln>
-          <a:effectLst/>
-        </c:spPr>
-        <c:txPr>
-          <a:bodyPr rot="-60000000" spcFirstLastPara="1" vertOverflow="ellipsis" vert="horz" wrap="square" anchor="ctr" anchorCtr="1"/>
-          <a:lstStyle/>
-          <a:p>
-            <a:pPr>
-              <a:defRPr sz="1197" b="0" i="0" u="none" strike="noStrike" kern="1200" baseline="0">
-                <a:solidFill>
-                  <a:schemeClr val="tx1">
-                    <a:lumMod val="65000"/>
-                    <a:lumOff val="35000"/>
-                  </a:schemeClr>
-                </a:solidFill>
-                <a:latin typeface="+mn-lt"/>
-                <a:ea typeface="+mn-ea"/>
-                <a:cs typeface="+mn-cs"/>
-              </a:defRPr>
-            </a:pPr>
-            <a:endParaRPr lang="en-US"/>
-          </a:p>
-        </c:txPr>
-        <c:crossAx val="109778767"/>
-        <c:crosses val="autoZero"/>
-        <c:auto val="1"/>
-        <c:lblAlgn val="ctr"/>
-        <c:lblOffset val="100"/>
-        <c:noMultiLvlLbl val="0"/>
-      </c:catAx>
-      <c:valAx>
-        <c:axId val="109778767"/>
-        <c:scaling>
-          <c:orientation val="minMax"/>
-        </c:scaling>
-        <c:delete val="0"/>
-        <c:axPos val="l"/>
-        <c:majorGridlines>
-          <c:spPr>
-            <a:ln w="9525" cap="flat" cmpd="sng" algn="ctr">
-              <a:solidFill>
-                <a:schemeClr val="tx1">
-                  <a:lumMod val="15000"/>
-                  <a:lumOff val="85000"/>
-                </a:schemeClr>
-              </a:solidFill>
-              <a:round/>
-            </a:ln>
-            <a:effectLst/>
-          </c:spPr>
-        </c:majorGridlines>
-        <c:numFmt formatCode="General" sourceLinked="1"/>
-        <c:majorTickMark val="none"/>
-        <c:minorTickMark val="none"/>
-        <c:tickLblPos val="nextTo"/>
-        <c:spPr>
-          <a:noFill/>
-          <a:ln>
-            <a:noFill/>
-          </a:ln>
-          <a:effectLst/>
-        </c:spPr>
-        <c:txPr>
-          <a:bodyPr rot="-60000000" spcFirstLastPara="1" vertOverflow="ellipsis" vert="horz" wrap="square" anchor="ctr" anchorCtr="1"/>
-          <a:lstStyle/>
-          <a:p>
-            <a:pPr>
-              <a:defRPr sz="1197" b="0" i="0" u="none" strike="noStrike" kern="1200" baseline="0">
-                <a:solidFill>
-                  <a:schemeClr val="tx1">
-                    <a:lumMod val="65000"/>
-                    <a:lumOff val="35000"/>
-                  </a:schemeClr>
-                </a:solidFill>
-                <a:latin typeface="+mn-lt"/>
-                <a:ea typeface="+mn-ea"/>
-                <a:cs typeface="+mn-cs"/>
-              </a:defRPr>
-            </a:pPr>
-            <a:endParaRPr lang="en-US"/>
-          </a:p>
-        </c:txPr>
-        <c:crossAx val="109254431"/>
-        <c:crosses val="autoZero"/>
-        <c:crossBetween val="between"/>
-      </c:valAx>
-      <c:spPr>
-        <a:noFill/>
-        <a:ln>
-          <a:noFill/>
-        </a:ln>
-        <a:effectLst/>
-      </c:spPr>
-    </c:plotArea>
-    <c:legend>
-      <c:legendPos val="b"/>
-      <c:overlay val="0"/>
-      <c:spPr>
-        <a:noFill/>
-        <a:ln>
-          <a:noFill/>
-        </a:ln>
-        <a:effectLst/>
-      </c:spPr>
-      <c:txPr>
-        <a:bodyPr rot="0" spcFirstLastPara="1" vertOverflow="ellipsis" vert="horz" wrap="square" anchor="ctr" anchorCtr="1"/>
-        <a:lstStyle/>
-        <a:p>
-          <a:pPr>
-            <a:defRPr sz="1197" b="0" i="0" u="none" strike="noStrike" kern="1200" baseline="0">
-              <a:solidFill>
-                <a:schemeClr val="tx1">
-                  <a:lumMod val="65000"/>
-                  <a:lumOff val="35000"/>
-                </a:schemeClr>
-              </a:solidFill>
-              <a:latin typeface="+mn-lt"/>
-              <a:ea typeface="+mn-ea"/>
-              <a:cs typeface="+mn-cs"/>
-            </a:defRPr>
-          </a:pPr>
-          <a:endParaRPr lang="en-US"/>
-        </a:p>
-      </c:txPr>
-    </c:legend>
-    <c:plotVisOnly val="1"/>
-    <c:dispBlanksAs val="gap"/>
-    <c:extLst>
-      <c:ext xmlns:c16r3="http://schemas.microsoft.com/office/drawing/2017/03/chart" uri="{56B9EC1D-385E-4148-901F-78D8002777C0}">
-        <c16r3:dataDisplayOptions16>
-          <c16r3:dispNaAsBlank val="1"/>
-        </c16r3:dataDisplayOptions16>
-      </c:ext>
-    </c:extLst>
-    <c:showDLblsOverMax val="0"/>
-  </c:chart>
-  <c:spPr>
-    <a:noFill/>
-    <a:ln>
-      <a:noFill/>
-    </a:ln>
-    <a:effectLst/>
-  </c:spPr>
-  <c:txPr>
-    <a:bodyPr/>
-    <a:lstStyle/>
-    <a:p>
-      <a:pPr>
-        <a:defRPr/>
-      </a:pPr>
-      <a:endParaRPr lang="en-US"/>
-    </a:p>
-  </c:txPr>
-  <c:externalData r:id="rId3">
-    <c:autoUpdate val="0"/>
-  </c:externalData>
-</c:chartSpace>
-</file>
-
-<file path=ppt/charts/chart2.xml><?xml version="1.0" encoding="utf-8"?>
-<c:chartSpace xmlns:c="http://schemas.openxmlformats.org/drawingml/2006/chart" xmlns:a="http://schemas.openxmlformats.org/drawingml/2006/main" xmlns:r="http://schemas.openxmlformats.org/officeDocument/2006/relationships" xmlns:c16r2="http://schemas.microsoft.com/office/drawing/2015/06/chart">
-  <c:date1904 val="0"/>
-  <c:lang val="fr-FR"/>
-  <c:roundedCorners val="0"/>
-  <mc:AlternateContent xmlns:mc="http://schemas.openxmlformats.org/markup-compatibility/2006">
-    <mc:Choice xmlns:c14="http://schemas.microsoft.com/office/drawing/2007/8/2/chart" Requires="c14">
-      <c14:style val="102"/>
-    </mc:Choice>
-    <mc:Fallback>
-      <c:style val="2"/>
-    </mc:Fallback>
-  </mc:AlternateContent>
-  <c:chart>
-    <c:title>
-      <c:tx>
-        <c:rich>
-          <a:bodyPr rot="0" spcFirstLastPara="1" vertOverflow="ellipsis" vert="horz" wrap="square" anchor="ctr" anchorCtr="1"/>
-          <a:lstStyle/>
-          <a:p>
-            <a:pPr>
-              <a:defRPr sz="1862" b="0" i="0" u="none" strike="noStrike" kern="1200" spc="0" baseline="0">
-                <a:solidFill>
-                  <a:schemeClr val="tx1">
-                    <a:lumMod val="65000"/>
-                    <a:lumOff val="35000"/>
-                  </a:schemeClr>
-                </a:solidFill>
-                <a:latin typeface="+mn-lt"/>
-                <a:ea typeface="+mn-ea"/>
-                <a:cs typeface="+mn-cs"/>
-              </a:defRPr>
-            </a:pPr>
-            <a:r>
-              <a:rPr lang="en-US"/>
-              <a:t>Model accuracy</a:t>
-            </a:r>
-          </a:p>
-        </c:rich>
-      </c:tx>
-      <c:overlay val="0"/>
-      <c:spPr>
-        <a:noFill/>
-        <a:ln>
-          <a:noFill/>
-        </a:ln>
-        <a:effectLst/>
-      </c:spPr>
-      <c:txPr>
-        <a:bodyPr rot="0" spcFirstLastPara="1" vertOverflow="ellipsis" vert="horz" wrap="square" anchor="ctr" anchorCtr="1"/>
-        <a:lstStyle/>
-        <a:p>
-          <a:pPr>
-            <a:defRPr sz="1862" b="0" i="0" u="none" strike="noStrike" kern="1200" spc="0" baseline="0">
-              <a:solidFill>
-                <a:schemeClr val="tx1">
-                  <a:lumMod val="65000"/>
-                  <a:lumOff val="35000"/>
-                </a:schemeClr>
-              </a:solidFill>
-              <a:latin typeface="+mn-lt"/>
-              <a:ea typeface="+mn-ea"/>
-              <a:cs typeface="+mn-cs"/>
-            </a:defRPr>
-          </a:pPr>
-          <a:endParaRPr lang="en-US"/>
-        </a:p>
-      </c:txPr>
-    </c:title>
-    <c:autoTitleDeleted val="0"/>
-    <c:plotArea>
-      <c:layout/>
-      <c:barChart>
-        <c:barDir val="col"/>
-        <c:grouping val="clustered"/>
-        <c:varyColors val="0"/>
-        <c:ser>
-          <c:idx val="0"/>
-          <c:order val="0"/>
-          <c:tx>
-            <c:strRef>
-              <c:f>Sheet1!$B$1</c:f>
-              <c:strCache>
-                <c:ptCount val="1"/>
-                <c:pt idx="0">
-                  <c:v>Config 1</c:v>
-                </c:pt>
-              </c:strCache>
-            </c:strRef>
-          </c:tx>
-          <c:spPr>
-            <a:solidFill>
-              <a:schemeClr val="accent1"/>
-            </a:solidFill>
-            <a:ln>
-              <a:noFill/>
-            </a:ln>
-            <a:effectLst/>
-          </c:spPr>
-          <c:invertIfNegative val="0"/>
-          <c:cat>
-            <c:strRef>
-              <c:f>Sheet1!$A$2:$A$5</c:f>
-              <c:strCache>
-                <c:ptCount val="4"/>
-                <c:pt idx="0">
-                  <c:v>Model 1</c:v>
-                </c:pt>
-                <c:pt idx="1">
-                  <c:v>Model 2</c:v>
-                </c:pt>
-                <c:pt idx="2">
-                  <c:v>Model 3</c:v>
-                </c:pt>
-                <c:pt idx="3">
-                  <c:v>Model 4</c:v>
-                </c:pt>
-              </c:strCache>
-            </c:strRef>
-          </c:cat>
-          <c:val>
-            <c:numRef>
-              <c:f>Sheet1!$B$2:$B$5</c:f>
-              <c:numCache>
-                <c:formatCode>General</c:formatCode>
-                <c:ptCount val="4"/>
-                <c:pt idx="0">
-                  <c:v>75</c:v>
-                </c:pt>
-                <c:pt idx="1">
-                  <c:v>70</c:v>
-                </c:pt>
-                <c:pt idx="2">
-                  <c:v>80</c:v>
-                </c:pt>
-                <c:pt idx="3">
-                  <c:v>84</c:v>
-                </c:pt>
-              </c:numCache>
-            </c:numRef>
-          </c:val>
-          <c:extLst>
-            <c:ext xmlns:c16="http://schemas.microsoft.com/office/drawing/2014/chart" uri="{C3380CC4-5D6E-409C-BE32-E72D297353CC}">
-              <c16:uniqueId val="{00000000-4D92-8543-80F9-E273A3A8231D}"/>
-            </c:ext>
-          </c:extLst>
-        </c:ser>
-        <c:ser>
-          <c:idx val="1"/>
-          <c:order val="1"/>
-          <c:tx>
-            <c:strRef>
-              <c:f>Sheet1!$C$1</c:f>
-              <c:strCache>
-                <c:ptCount val="1"/>
-                <c:pt idx="0">
-                  <c:v>Config 2</c:v>
-                </c:pt>
-              </c:strCache>
-            </c:strRef>
-          </c:tx>
-          <c:spPr>
-            <a:solidFill>
-              <a:schemeClr val="accent2"/>
-            </a:solidFill>
-            <a:ln>
-              <a:noFill/>
-            </a:ln>
-            <a:effectLst/>
-          </c:spPr>
-          <c:invertIfNegative val="0"/>
-          <c:cat>
-            <c:strRef>
-              <c:f>Sheet1!$A$2:$A$5</c:f>
-              <c:strCache>
-                <c:ptCount val="4"/>
-                <c:pt idx="0">
-                  <c:v>Model 1</c:v>
-                </c:pt>
-                <c:pt idx="1">
-                  <c:v>Model 2</c:v>
-                </c:pt>
-                <c:pt idx="2">
-                  <c:v>Model 3</c:v>
-                </c:pt>
-                <c:pt idx="3">
-                  <c:v>Model 4</c:v>
-                </c:pt>
-              </c:strCache>
-            </c:strRef>
-          </c:cat>
-          <c:val>
-            <c:numRef>
-              <c:f>Sheet1!$C$2:$C$5</c:f>
-              <c:numCache>
-                <c:formatCode>General</c:formatCode>
-                <c:ptCount val="4"/>
-                <c:pt idx="0">
-                  <c:v>85</c:v>
-                </c:pt>
-                <c:pt idx="1">
-                  <c:v>93</c:v>
-                </c:pt>
-                <c:pt idx="2">
-                  <c:v>98</c:v>
-                </c:pt>
-                <c:pt idx="3">
-                  <c:v>99</c:v>
-                </c:pt>
-              </c:numCache>
-            </c:numRef>
-          </c:val>
-          <c:extLst>
-            <c:ext xmlns:c16="http://schemas.microsoft.com/office/drawing/2014/chart" uri="{C3380CC4-5D6E-409C-BE32-E72D297353CC}">
-              <c16:uniqueId val="{00000001-4D92-8543-80F9-E273A3A8231D}"/>
-            </c:ext>
-          </c:extLst>
-        </c:ser>
-        <c:ser>
-          <c:idx val="2"/>
-          <c:order val="2"/>
-          <c:tx>
-            <c:strRef>
-              <c:f>Sheet1!$D$1</c:f>
-              <c:strCache>
-                <c:ptCount val="1"/>
-                <c:pt idx="0">
-                  <c:v>Config 3</c:v>
-                </c:pt>
-              </c:strCache>
-            </c:strRef>
-          </c:tx>
-          <c:spPr>
-            <a:solidFill>
-              <a:schemeClr val="accent3"/>
-            </a:solidFill>
-            <a:ln>
-              <a:noFill/>
-            </a:ln>
-            <a:effectLst/>
-          </c:spPr>
-          <c:invertIfNegative val="0"/>
-          <c:cat>
-            <c:strRef>
-              <c:f>Sheet1!$A$2:$A$5</c:f>
-              <c:strCache>
-                <c:ptCount val="4"/>
-                <c:pt idx="0">
-                  <c:v>Model 1</c:v>
-                </c:pt>
-                <c:pt idx="1">
-                  <c:v>Model 2</c:v>
-                </c:pt>
-                <c:pt idx="2">
-                  <c:v>Model 3</c:v>
-                </c:pt>
-                <c:pt idx="3">
-                  <c:v>Model 4</c:v>
-                </c:pt>
-              </c:strCache>
-            </c:strRef>
-          </c:cat>
-          <c:val>
-            <c:numRef>
-              <c:f>Sheet1!$D$2:$D$5</c:f>
-              <c:numCache>
-                <c:formatCode>General</c:formatCode>
-                <c:ptCount val="4"/>
-                <c:pt idx="0">
-                  <c:v>88</c:v>
-                </c:pt>
-                <c:pt idx="1">
-                  <c:v>85</c:v>
-                </c:pt>
-                <c:pt idx="2">
-                  <c:v>99</c:v>
-                </c:pt>
-                <c:pt idx="3">
-                  <c:v>99</c:v>
-                </c:pt>
-              </c:numCache>
-            </c:numRef>
-          </c:val>
-          <c:extLst>
-            <c:ext xmlns:c16="http://schemas.microsoft.com/office/drawing/2014/chart" uri="{C3380CC4-5D6E-409C-BE32-E72D297353CC}">
-              <c16:uniqueId val="{00000002-4D92-8543-80F9-E273A3A8231D}"/>
-            </c:ext>
-          </c:extLst>
-        </c:ser>
-        <c:dLbls>
-          <c:showLegendKey val="0"/>
-          <c:showVal val="0"/>
-          <c:showCatName val="0"/>
-          <c:showSerName val="0"/>
-          <c:showPercent val="0"/>
-          <c:showBubbleSize val="0"/>
-        </c:dLbls>
-        <c:gapWidth val="150"/>
-        <c:axId val="109254431"/>
-        <c:axId val="109778767"/>
-      </c:barChart>
-      <c:catAx>
-        <c:axId val="109254431"/>
-        <c:scaling>
-          <c:orientation val="minMax"/>
-        </c:scaling>
-        <c:delete val="0"/>
-        <c:axPos val="b"/>
-        <c:numFmt formatCode="General" sourceLinked="1"/>
-        <c:majorTickMark val="none"/>
-        <c:minorTickMark val="none"/>
-        <c:tickLblPos val="nextTo"/>
-        <c:spPr>
-          <a:noFill/>
-          <a:ln w="9525" cap="flat" cmpd="sng" algn="ctr">
-            <a:solidFill>
-              <a:schemeClr val="tx1">
-                <a:lumMod val="15000"/>
-                <a:lumOff val="85000"/>
-              </a:schemeClr>
-            </a:solidFill>
-            <a:round/>
-          </a:ln>
-          <a:effectLst/>
-        </c:spPr>
-        <c:txPr>
-          <a:bodyPr rot="-60000000" spcFirstLastPara="1" vertOverflow="ellipsis" vert="horz" wrap="square" anchor="ctr" anchorCtr="1"/>
-          <a:lstStyle/>
-          <a:p>
-            <a:pPr>
-              <a:defRPr sz="1197" b="0" i="0" u="none" strike="noStrike" kern="1200" baseline="0">
-                <a:solidFill>
-                  <a:schemeClr val="tx1">
-                    <a:lumMod val="65000"/>
-                    <a:lumOff val="35000"/>
-                  </a:schemeClr>
-                </a:solidFill>
-                <a:latin typeface="+mn-lt"/>
-                <a:ea typeface="+mn-ea"/>
-                <a:cs typeface="+mn-cs"/>
-              </a:defRPr>
-            </a:pPr>
-            <a:endParaRPr lang="en-US"/>
-          </a:p>
-        </c:txPr>
-        <c:crossAx val="109778767"/>
-        <c:crosses val="autoZero"/>
-        <c:auto val="1"/>
-        <c:lblAlgn val="ctr"/>
-        <c:lblOffset val="100"/>
-        <c:noMultiLvlLbl val="0"/>
-      </c:catAx>
-      <c:valAx>
-        <c:axId val="109778767"/>
-        <c:scaling>
-          <c:orientation val="minMax"/>
-        </c:scaling>
-        <c:delete val="0"/>
-        <c:axPos val="l"/>
-        <c:majorGridlines>
-          <c:spPr>
-            <a:ln w="9525" cap="flat" cmpd="sng" algn="ctr">
-              <a:solidFill>
-                <a:schemeClr val="tx1">
-                  <a:lumMod val="15000"/>
-                  <a:lumOff val="85000"/>
-                </a:schemeClr>
-              </a:solidFill>
-              <a:round/>
-            </a:ln>
-            <a:effectLst/>
-          </c:spPr>
-        </c:majorGridlines>
-        <c:numFmt formatCode="General" sourceLinked="1"/>
-        <c:majorTickMark val="none"/>
-        <c:minorTickMark val="none"/>
-        <c:tickLblPos val="nextTo"/>
-        <c:spPr>
-          <a:noFill/>
-          <a:ln>
-            <a:noFill/>
-          </a:ln>
-          <a:effectLst/>
-        </c:spPr>
-        <c:txPr>
-          <a:bodyPr rot="-60000000" spcFirstLastPara="1" vertOverflow="ellipsis" vert="horz" wrap="square" anchor="ctr" anchorCtr="1"/>
-          <a:lstStyle/>
-          <a:p>
-            <a:pPr>
-              <a:defRPr sz="1197" b="0" i="0" u="none" strike="noStrike" kern="1200" baseline="0">
-                <a:solidFill>
-                  <a:schemeClr val="tx1">
-                    <a:lumMod val="65000"/>
-                    <a:lumOff val="35000"/>
-                  </a:schemeClr>
-                </a:solidFill>
-                <a:latin typeface="+mn-lt"/>
-                <a:ea typeface="+mn-ea"/>
-                <a:cs typeface="+mn-cs"/>
-              </a:defRPr>
-            </a:pPr>
-            <a:endParaRPr lang="en-US"/>
-          </a:p>
-        </c:txPr>
-        <c:crossAx val="109254431"/>
-        <c:crosses val="autoZero"/>
-        <c:crossBetween val="between"/>
-      </c:valAx>
-      <c:spPr>
-        <a:noFill/>
-        <a:ln>
-          <a:noFill/>
-        </a:ln>
-        <a:effectLst/>
-      </c:spPr>
-    </c:plotArea>
-    <c:legend>
-      <c:legendPos val="b"/>
-      <c:overlay val="0"/>
-      <c:spPr>
-        <a:noFill/>
-        <a:ln>
-          <a:noFill/>
-        </a:ln>
-        <a:effectLst/>
-      </c:spPr>
-      <c:txPr>
-        <a:bodyPr rot="0" spcFirstLastPara="1" vertOverflow="ellipsis" vert="horz" wrap="square" anchor="ctr" anchorCtr="1"/>
-        <a:lstStyle/>
-        <a:p>
-          <a:pPr>
-            <a:defRPr sz="1197" b="0" i="0" u="none" strike="noStrike" kern="1200" baseline="0">
-              <a:solidFill>
-                <a:schemeClr val="tx1">
-                  <a:lumMod val="65000"/>
-                  <a:lumOff val="35000"/>
-                </a:schemeClr>
-              </a:solidFill>
-              <a:latin typeface="+mn-lt"/>
-              <a:ea typeface="+mn-ea"/>
-              <a:cs typeface="+mn-cs"/>
-            </a:defRPr>
-          </a:pPr>
-          <a:endParaRPr lang="en-US"/>
-        </a:p>
-      </c:txPr>
-    </c:legend>
-    <c:plotVisOnly val="1"/>
-    <c:dispBlanksAs val="gap"/>
-    <c:extLst>
-      <c:ext xmlns:c16r3="http://schemas.microsoft.com/office/drawing/2017/03/chart" uri="{56B9EC1D-385E-4148-901F-78D8002777C0}">
-        <c16r3:dataDisplayOptions16>
-          <c16r3:dispNaAsBlank val="1"/>
-        </c16r3:dataDisplayOptions16>
-      </c:ext>
-    </c:extLst>
-    <c:showDLblsOverMax val="0"/>
-  </c:chart>
-  <c:spPr>
-    <a:noFill/>
-    <a:ln>
-      <a:noFill/>
-    </a:ln>
-    <a:effectLst/>
-  </c:spPr>
-  <c:txPr>
-    <a:bodyPr/>
-    <a:lstStyle/>
-    <a:p>
-      <a:pPr>
-        <a:defRPr/>
-      </a:pPr>
-      <a:endParaRPr lang="en-US"/>
-    </a:p>
-  </c:txPr>
-  <c:externalData r:id="rId3">
-    <c:autoUpdate val="0"/>
-  </c:externalData>
-</c:chartSpace>
-</file>
-
-<file path=ppt/charts/chart3.xml><?xml version="1.0" encoding="utf-8"?>
-<c:chartSpace xmlns:c="http://schemas.openxmlformats.org/drawingml/2006/chart" xmlns:a="http://schemas.openxmlformats.org/drawingml/2006/main" xmlns:r="http://schemas.openxmlformats.org/officeDocument/2006/relationships" xmlns:c16r2="http://schemas.microsoft.com/office/drawing/2015/06/chart">
-  <c:date1904 val="0"/>
-  <c:lang val="fr-FR"/>
-  <c:roundedCorners val="0"/>
-  <mc:AlternateContent xmlns:mc="http://schemas.openxmlformats.org/markup-compatibility/2006">
-    <mc:Choice xmlns:c14="http://schemas.microsoft.com/office/drawing/2007/8/2/chart" Requires="c14">
-      <c14:style val="102"/>
-    </mc:Choice>
-    <mc:Fallback>
-      <c:style val="2"/>
-    </mc:Fallback>
-  </mc:AlternateContent>
-  <c:chart>
-    <c:title>
-      <c:tx>
-        <c:rich>
-          <a:bodyPr rot="0" spcFirstLastPara="1" vertOverflow="ellipsis" vert="horz" wrap="square" anchor="ctr" anchorCtr="1"/>
-          <a:lstStyle/>
-          <a:p>
-            <a:pPr>
-              <a:defRPr sz="1862" b="0" i="0" u="none" strike="noStrike" kern="1200" spc="0" baseline="0">
-                <a:solidFill>
-                  <a:schemeClr val="tx1">
-                    <a:lumMod val="65000"/>
-                    <a:lumOff val="35000"/>
-                  </a:schemeClr>
-                </a:solidFill>
-                <a:latin typeface="+mn-lt"/>
-                <a:ea typeface="+mn-ea"/>
-                <a:cs typeface="+mn-cs"/>
-              </a:defRPr>
-            </a:pPr>
-            <a:r>
-              <a:rPr lang="en-US"/>
-              <a:t>Model accuracy</a:t>
-            </a:r>
-          </a:p>
-        </c:rich>
-      </c:tx>
-      <c:overlay val="0"/>
-      <c:spPr>
-        <a:noFill/>
-        <a:ln>
-          <a:noFill/>
-        </a:ln>
-        <a:effectLst/>
-      </c:spPr>
-      <c:txPr>
-        <a:bodyPr rot="0" spcFirstLastPara="1" vertOverflow="ellipsis" vert="horz" wrap="square" anchor="ctr" anchorCtr="1"/>
-        <a:lstStyle/>
-        <a:p>
-          <a:pPr>
-            <a:defRPr sz="1862" b="0" i="0" u="none" strike="noStrike" kern="1200" spc="0" baseline="0">
-              <a:solidFill>
-                <a:schemeClr val="tx1">
-                  <a:lumMod val="65000"/>
-                  <a:lumOff val="35000"/>
-                </a:schemeClr>
-              </a:solidFill>
-              <a:latin typeface="+mn-lt"/>
-              <a:ea typeface="+mn-ea"/>
-              <a:cs typeface="+mn-cs"/>
-            </a:defRPr>
-          </a:pPr>
-          <a:endParaRPr lang="en-US"/>
-        </a:p>
-      </c:txPr>
-    </c:title>
-    <c:autoTitleDeleted val="0"/>
-    <c:plotArea>
-      <c:layout/>
-      <c:barChart>
-        <c:barDir val="col"/>
-        <c:grouping val="clustered"/>
-        <c:varyColors val="0"/>
-        <c:ser>
-          <c:idx val="0"/>
-          <c:order val="0"/>
-          <c:tx>
-            <c:strRef>
-              <c:f>Sheet1!$B$1</c:f>
-              <c:strCache>
-                <c:ptCount val="1"/>
-                <c:pt idx="0">
-                  <c:v>Training</c:v>
-                </c:pt>
-              </c:strCache>
-            </c:strRef>
-          </c:tx>
-          <c:spPr>
-            <a:solidFill>
-              <a:schemeClr val="accent1"/>
-            </a:solidFill>
-            <a:ln>
-              <a:noFill/>
-            </a:ln>
-            <a:effectLst/>
-          </c:spPr>
-          <c:invertIfNegative val="0"/>
-          <c:cat>
-            <c:strRef>
-              <c:f>Sheet1!$A$2</c:f>
-              <c:strCache>
-                <c:ptCount val="1"/>
-                <c:pt idx="0">
-                  <c:v>Winner model</c:v>
-                </c:pt>
-              </c:strCache>
-            </c:strRef>
-          </c:cat>
-          <c:val>
-            <c:numRef>
-              <c:f>Sheet1!$B$2</c:f>
-              <c:numCache>
-                <c:formatCode>General</c:formatCode>
-                <c:ptCount val="1"/>
-                <c:pt idx="0">
-                  <c:v>95</c:v>
-                </c:pt>
-              </c:numCache>
-            </c:numRef>
-          </c:val>
-          <c:extLst>
-            <c:ext xmlns:c16="http://schemas.microsoft.com/office/drawing/2014/chart" uri="{C3380CC4-5D6E-409C-BE32-E72D297353CC}">
-              <c16:uniqueId val="{00000000-4D92-8543-80F9-E273A3A8231D}"/>
-            </c:ext>
-          </c:extLst>
-        </c:ser>
-        <c:ser>
-          <c:idx val="1"/>
-          <c:order val="1"/>
-          <c:tx>
-            <c:strRef>
-              <c:f>Sheet1!$C$1</c:f>
-              <c:strCache>
-                <c:ptCount val="1"/>
-                <c:pt idx="0">
-                  <c:v>Testing</c:v>
-                </c:pt>
-              </c:strCache>
-            </c:strRef>
-          </c:tx>
-          <c:spPr>
-            <a:solidFill>
-              <a:schemeClr val="accent2"/>
-            </a:solidFill>
-            <a:ln>
-              <a:noFill/>
-            </a:ln>
-            <a:effectLst/>
-          </c:spPr>
-          <c:invertIfNegative val="0"/>
-          <c:cat>
-            <c:strRef>
-              <c:f>Sheet1!$A$2</c:f>
-              <c:strCache>
-                <c:ptCount val="1"/>
-                <c:pt idx="0">
-                  <c:v>Winner model</c:v>
-                </c:pt>
-              </c:strCache>
-            </c:strRef>
-          </c:cat>
-          <c:val>
-            <c:numRef>
-              <c:f>Sheet1!$C$2</c:f>
-              <c:numCache>
-                <c:formatCode>General</c:formatCode>
-                <c:ptCount val="1"/>
-                <c:pt idx="0">
-                  <c:v>97</c:v>
-                </c:pt>
-              </c:numCache>
-            </c:numRef>
-          </c:val>
-          <c:extLst>
-            <c:ext xmlns:c16="http://schemas.microsoft.com/office/drawing/2014/chart" uri="{C3380CC4-5D6E-409C-BE32-E72D297353CC}">
-              <c16:uniqueId val="{00000001-4D92-8543-80F9-E273A3A8231D}"/>
-            </c:ext>
-          </c:extLst>
-        </c:ser>
-        <c:ser>
-          <c:idx val="2"/>
-          <c:order val="2"/>
-          <c:tx>
-            <c:strRef>
-              <c:f>Sheet1!$D$1</c:f>
-              <c:strCache>
-                <c:ptCount val="1"/>
-                <c:pt idx="0">
-                  <c:v>Validation</c:v>
-                </c:pt>
-              </c:strCache>
-            </c:strRef>
-          </c:tx>
-          <c:spPr>
-            <a:solidFill>
-              <a:schemeClr val="accent3"/>
-            </a:solidFill>
-            <a:ln>
-              <a:noFill/>
-            </a:ln>
-            <a:effectLst/>
-          </c:spPr>
-          <c:invertIfNegative val="0"/>
-          <c:cat>
-            <c:strRef>
-              <c:f>Sheet1!$A$2</c:f>
-              <c:strCache>
-                <c:ptCount val="1"/>
-                <c:pt idx="0">
-                  <c:v>Winner model</c:v>
-                </c:pt>
-              </c:strCache>
-            </c:strRef>
-          </c:cat>
-          <c:val>
-            <c:numRef>
-              <c:f>Sheet1!$D$2</c:f>
-              <c:numCache>
-                <c:formatCode>General</c:formatCode>
-                <c:ptCount val="1"/>
-                <c:pt idx="0">
-                  <c:v>93</c:v>
-                </c:pt>
-              </c:numCache>
-            </c:numRef>
-          </c:val>
-          <c:extLst>
-            <c:ext xmlns:c16="http://schemas.microsoft.com/office/drawing/2014/chart" uri="{C3380CC4-5D6E-409C-BE32-E72D297353CC}">
-              <c16:uniqueId val="{00000000-53E8-B34C-AD6C-BBEA29DE4B70}"/>
-            </c:ext>
-          </c:extLst>
-        </c:ser>
-        <c:dLbls>
-          <c:showLegendKey val="0"/>
-          <c:showVal val="0"/>
-          <c:showCatName val="0"/>
-          <c:showSerName val="0"/>
-          <c:showPercent val="0"/>
-          <c:showBubbleSize val="0"/>
-        </c:dLbls>
-        <c:gapWidth val="150"/>
-        <c:axId val="109254431"/>
-        <c:axId val="109778767"/>
-      </c:barChart>
-      <c:catAx>
-        <c:axId val="109254431"/>
-        <c:scaling>
-          <c:orientation val="minMax"/>
-        </c:scaling>
-        <c:delete val="0"/>
-        <c:axPos val="b"/>
-        <c:numFmt formatCode="General" sourceLinked="1"/>
-        <c:majorTickMark val="none"/>
-        <c:minorTickMark val="none"/>
-        <c:tickLblPos val="nextTo"/>
-        <c:spPr>
-          <a:noFill/>
-          <a:ln w="9525" cap="flat" cmpd="sng" algn="ctr">
-            <a:solidFill>
-              <a:schemeClr val="tx1">
-                <a:lumMod val="15000"/>
-                <a:lumOff val="85000"/>
-              </a:schemeClr>
-            </a:solidFill>
-            <a:round/>
-          </a:ln>
-          <a:effectLst/>
-        </c:spPr>
-        <c:txPr>
-          <a:bodyPr rot="-60000000" spcFirstLastPara="1" vertOverflow="ellipsis" vert="horz" wrap="square" anchor="ctr" anchorCtr="1"/>
-          <a:lstStyle/>
-          <a:p>
-            <a:pPr>
-              <a:defRPr sz="1197" b="0" i="0" u="none" strike="noStrike" kern="1200" baseline="0">
-                <a:solidFill>
-                  <a:schemeClr val="tx1">
-                    <a:lumMod val="65000"/>
-                    <a:lumOff val="35000"/>
-                  </a:schemeClr>
-                </a:solidFill>
-                <a:latin typeface="+mn-lt"/>
-                <a:ea typeface="+mn-ea"/>
-                <a:cs typeface="+mn-cs"/>
-              </a:defRPr>
-            </a:pPr>
-            <a:endParaRPr lang="en-US"/>
-          </a:p>
-        </c:txPr>
-        <c:crossAx val="109778767"/>
-        <c:crosses val="autoZero"/>
-        <c:auto val="1"/>
-        <c:lblAlgn val="ctr"/>
-        <c:lblOffset val="100"/>
-        <c:noMultiLvlLbl val="0"/>
-      </c:catAx>
-      <c:valAx>
-        <c:axId val="109778767"/>
-        <c:scaling>
-          <c:orientation val="minMax"/>
-          <c:max val="100"/>
-          <c:min val="0"/>
-        </c:scaling>
-        <c:delete val="0"/>
-        <c:axPos val="l"/>
-        <c:majorGridlines>
-          <c:spPr>
-            <a:ln w="9525" cap="flat" cmpd="sng" algn="ctr">
-              <a:solidFill>
-                <a:schemeClr val="tx1">
-                  <a:lumMod val="15000"/>
-                  <a:lumOff val="85000"/>
-                </a:schemeClr>
-              </a:solidFill>
-              <a:round/>
-            </a:ln>
-            <a:effectLst/>
-          </c:spPr>
-        </c:majorGridlines>
-        <c:numFmt formatCode="General" sourceLinked="1"/>
-        <c:majorTickMark val="none"/>
-        <c:minorTickMark val="none"/>
-        <c:tickLblPos val="nextTo"/>
-        <c:spPr>
-          <a:noFill/>
-          <a:ln>
-            <a:noFill/>
-          </a:ln>
-          <a:effectLst/>
-        </c:spPr>
-        <c:txPr>
-          <a:bodyPr rot="-60000000" spcFirstLastPara="1" vertOverflow="ellipsis" vert="horz" wrap="square" anchor="ctr" anchorCtr="1"/>
-          <a:lstStyle/>
-          <a:p>
-            <a:pPr>
-              <a:defRPr sz="1197" b="0" i="0" u="none" strike="noStrike" kern="1200" baseline="0">
-                <a:solidFill>
-                  <a:schemeClr val="tx1">
-                    <a:lumMod val="65000"/>
-                    <a:lumOff val="35000"/>
-                  </a:schemeClr>
-                </a:solidFill>
-                <a:latin typeface="+mn-lt"/>
-                <a:ea typeface="+mn-ea"/>
-                <a:cs typeface="+mn-cs"/>
-              </a:defRPr>
-            </a:pPr>
-            <a:endParaRPr lang="en-US"/>
-          </a:p>
-        </c:txPr>
-        <c:crossAx val="109254431"/>
-        <c:crosses val="autoZero"/>
-        <c:crossBetween val="between"/>
-      </c:valAx>
-      <c:spPr>
-        <a:noFill/>
-        <a:ln>
-          <a:noFill/>
-        </a:ln>
-        <a:effectLst/>
-      </c:spPr>
-    </c:plotArea>
-    <c:legend>
-      <c:legendPos val="b"/>
-      <c:overlay val="0"/>
-      <c:spPr>
-        <a:noFill/>
-        <a:ln>
-          <a:noFill/>
-        </a:ln>
-        <a:effectLst/>
-      </c:spPr>
-      <c:txPr>
-        <a:bodyPr rot="0" spcFirstLastPara="1" vertOverflow="ellipsis" vert="horz" wrap="square" anchor="ctr" anchorCtr="1"/>
-        <a:lstStyle/>
-        <a:p>
-          <a:pPr>
-            <a:defRPr sz="1197" b="0" i="0" u="none" strike="noStrike" kern="1200" baseline="0">
-              <a:solidFill>
-                <a:schemeClr val="tx1">
-                  <a:lumMod val="65000"/>
-                  <a:lumOff val="35000"/>
-                </a:schemeClr>
-              </a:solidFill>
-              <a:latin typeface="+mn-lt"/>
-              <a:ea typeface="+mn-ea"/>
-              <a:cs typeface="+mn-cs"/>
-            </a:defRPr>
-          </a:pPr>
-          <a:endParaRPr lang="en-US"/>
-        </a:p>
-      </c:txPr>
-    </c:legend>
-    <c:plotVisOnly val="1"/>
-    <c:dispBlanksAs val="gap"/>
-    <c:extLst>
-      <c:ext xmlns:c16r3="http://schemas.microsoft.com/office/drawing/2017/03/chart" uri="{56B9EC1D-385E-4148-901F-78D8002777C0}">
-        <c16r3:dataDisplayOptions16>
-          <c16r3:dispNaAsBlank val="1"/>
-        </c16r3:dataDisplayOptions16>
-      </c:ext>
-    </c:extLst>
-    <c:showDLblsOverMax val="0"/>
-  </c:chart>
-  <c:spPr>
-    <a:noFill/>
-    <a:ln>
-      <a:noFill/>
-    </a:ln>
-    <a:effectLst/>
-  </c:spPr>
-  <c:txPr>
-    <a:bodyPr/>
-    <a:lstStyle/>
-    <a:p>
-      <a:pPr>
-        <a:defRPr/>
-      </a:pPr>
-      <a:endParaRPr lang="en-US"/>
-    </a:p>
-  </c:txPr>
-  <c:externalData r:id="rId3">
-    <c:autoUpdate val="0"/>
-  </c:externalData>
-</c:chartSpace>
-</file>
-
-<file path=ppt/charts/colors1.xml><?xml version="1.0" encoding="utf-8"?>
-<cs:colorStyle xmlns:cs="http://schemas.microsoft.com/office/drawing/2012/chartStyle" xmlns:a="http://schemas.openxmlformats.org/drawingml/2006/main" meth="cycle" id="10">
-  <a:schemeClr val="accent1"/>
-  <a:schemeClr val="accent2"/>
-  <a:schemeClr val="accent3"/>
-  <a:schemeClr val="accent4"/>
-  <a:schemeClr val="accent5"/>
-  <a:schemeClr val="accent6"/>
-  <cs:variation/>
-  <cs:variation>
-    <a:lumMod val="60000"/>
-  </cs:variation>
-  <cs:variation>
-    <a:lumMod val="80000"/>
-    <a:lumOff val="20000"/>
-  </cs:variation>
-  <cs:variation>
-    <a:lumMod val="80000"/>
-  </cs:variation>
-  <cs:variation>
-    <a:lumMod val="60000"/>
-    <a:lumOff val="40000"/>
-  </cs:variation>
-  <cs:variation>
-    <a:lumMod val="50000"/>
-  </cs:variation>
-  <cs:variation>
-    <a:lumMod val="70000"/>
-    <a:lumOff val="30000"/>
-  </cs:variation>
-  <cs:variation>
-    <a:lumMod val="70000"/>
-  </cs:variation>
-  <cs:variation>
-    <a:lumMod val="50000"/>
-    <a:lumOff val="50000"/>
-  </cs:variation>
-</cs:colorStyle>
-</file>
-
-<file path=ppt/charts/colors2.xml><?xml version="1.0" encoding="utf-8"?>
-<cs:colorStyle xmlns:cs="http://schemas.microsoft.com/office/drawing/2012/chartStyle" xmlns:a="http://schemas.openxmlformats.org/drawingml/2006/main" meth="cycle" id="10">
-  <a:schemeClr val="accent1"/>
-  <a:schemeClr val="accent2"/>
-  <a:schemeClr val="accent3"/>
-  <a:schemeClr val="accent4"/>
-  <a:schemeClr val="accent5"/>
-  <a:schemeClr val="accent6"/>
-  <cs:variation/>
-  <cs:variation>
-    <a:lumMod val="60000"/>
-  </cs:variation>
-  <cs:variation>
-    <a:lumMod val="80000"/>
-    <a:lumOff val="20000"/>
-  </cs:variation>
-  <cs:variation>
-    <a:lumMod val="80000"/>
-  </cs:variation>
-  <cs:variation>
-    <a:lumMod val="60000"/>
-    <a:lumOff val="40000"/>
-  </cs:variation>
-  <cs:variation>
-    <a:lumMod val="50000"/>
-  </cs:variation>
-  <cs:variation>
-    <a:lumMod val="70000"/>
-    <a:lumOff val="30000"/>
-  </cs:variation>
-  <cs:variation>
-    <a:lumMod val="70000"/>
-  </cs:variation>
-  <cs:variation>
-    <a:lumMod val="50000"/>
-    <a:lumOff val="50000"/>
-  </cs:variation>
-</cs:colorStyle>
-</file>
-
-<file path=ppt/charts/colors3.xml><?xml version="1.0" encoding="utf-8"?>
-<cs:colorStyle xmlns:cs="http://schemas.microsoft.com/office/drawing/2012/chartStyle" xmlns:a="http://schemas.openxmlformats.org/drawingml/2006/main" meth="cycle" id="10">
-  <a:schemeClr val="accent1"/>
-  <a:schemeClr val="accent2"/>
-  <a:schemeClr val="accent3"/>
-  <a:schemeClr val="accent4"/>
-  <a:schemeClr val="accent5"/>
-  <a:schemeClr val="accent6"/>
-  <cs:variation/>
-  <cs:variation>
-    <a:lumMod val="60000"/>
-  </cs:variation>
-  <cs:variation>
-    <a:lumMod val="80000"/>
-    <a:lumOff val="20000"/>
-  </cs:variation>
-  <cs:variation>
-    <a:lumMod val="80000"/>
-  </cs:variation>
-  <cs:variation>
-    <a:lumMod val="60000"/>
-    <a:lumOff val="40000"/>
-  </cs:variation>
-  <cs:variation>
-    <a:lumMod val="50000"/>
-  </cs:variation>
-  <cs:variation>
-    <a:lumMod val="70000"/>
-    <a:lumOff val="30000"/>
-  </cs:variation>
-  <cs:variation>
-    <a:lumMod val="70000"/>
-  </cs:variation>
-  <cs:variation>
-    <a:lumMod val="50000"/>
-    <a:lumOff val="50000"/>
-  </cs:variation>
-</cs:colorStyle>
-</file>
-
-<file path=ppt/charts/style1.xml><?xml version="1.0" encoding="utf-8"?>
-<cs:chartStyle xmlns:cs="http://schemas.microsoft.com/office/drawing/2012/chartStyle" xmlns:a="http://schemas.openxmlformats.org/drawingml/2006/main" id="227">
-  <cs:axisTitle>
-    <cs:lnRef idx="0"/>
-    <cs:fillRef idx="0"/>
-    <cs:effectRef idx="0"/>
-    <cs:fontRef idx="minor">
-      <a:schemeClr val="tx1">
-        <a:lumMod val="65000"/>
-        <a:lumOff val="35000"/>
-      </a:schemeClr>
-    </cs:fontRef>
-    <cs:defRPr sz="1330" kern="1200"/>
-  </cs:axisTitle>
-  <cs:categoryAxis>
-    <cs:lnRef idx="0"/>
-    <cs:fillRef idx="0"/>
-    <cs:effectRef idx="0"/>
-    <cs:fontRef idx="minor">
-      <a:schemeClr val="tx1">
-        <a:lumMod val="65000"/>
-        <a:lumOff val="35000"/>
-      </a:schemeClr>
-    </cs:fontRef>
-    <cs:spPr>
-      <a:ln w="9525" cap="flat" cmpd="sng" algn="ctr">
-        <a:solidFill>
-          <a:schemeClr val="tx1">
-            <a:lumMod val="15000"/>
-            <a:lumOff val="85000"/>
-          </a:schemeClr>
-        </a:solidFill>
-        <a:round/>
-      </a:ln>
-    </cs:spPr>
-    <cs:defRPr sz="1197" kern="1200"/>
-  </cs:categoryAxis>
-  <cs:chartArea mods="allowNoFillOverride allowNoLineOverride">
-    <cs:lnRef idx="0"/>
-    <cs:fillRef idx="0"/>
-    <cs:effectRef idx="0"/>
-    <cs:fontRef idx="minor">
-      <a:schemeClr val="tx1"/>
-    </cs:fontRef>
-    <cs:spPr>
-      <a:solidFill>
-        <a:schemeClr val="bg1"/>
-      </a:solidFill>
-      <a:ln w="9525" cap="flat" cmpd="sng" algn="ctr">
-        <a:solidFill>
-          <a:schemeClr val="tx1">
-            <a:lumMod val="15000"/>
-            <a:lumOff val="85000"/>
-          </a:schemeClr>
-        </a:solidFill>
-        <a:round/>
-      </a:ln>
-    </cs:spPr>
-    <cs:defRPr sz="1330" kern="1200"/>
-  </cs:chartArea>
-  <cs:dataLabel>
-    <cs:lnRef idx="0"/>
-    <cs:fillRef idx="0"/>
-    <cs:effectRef idx="0"/>
-    <cs:fontRef idx="minor">
-      <a:schemeClr val="tx1">
-        <a:lumMod val="75000"/>
-        <a:lumOff val="25000"/>
-      </a:schemeClr>
-    </cs:fontRef>
-    <cs:defRPr sz="1197" kern="1200"/>
-  </cs:dataLabel>
-  <cs:dataLabelCallout>
-    <cs:lnRef idx="0"/>
-    <cs:fillRef idx="0"/>
-    <cs:effectRef idx="0"/>
-    <cs:fontRef idx="minor">
-      <a:schemeClr val="dk1">
-        <a:lumMod val="65000"/>
-        <a:lumOff val="35000"/>
-      </a:schemeClr>
-    </cs:fontRef>
-    <cs:spPr>
-      <a:solidFill>
-        <a:schemeClr val="lt1"/>
-      </a:solidFill>
-      <a:ln>
-        <a:solidFill>
-          <a:schemeClr val="dk1">
-            <a:lumMod val="25000"/>
-            <a:lumOff val="75000"/>
-          </a:schemeClr>
-        </a:solidFill>
-      </a:ln>
-    </cs:spPr>
-    <cs:defRPr sz="1197" kern="1200"/>
-    <cs:bodyPr rot="0" spcFirstLastPara="1" vertOverflow="clip" horzOverflow="clip" vert="horz" wrap="square" lIns="36576" tIns="18288" rIns="36576" bIns="18288" anchor="ctr" anchorCtr="1">
-      <a:spAutoFit/>
-    </cs:bodyPr>
-  </cs:dataLabelCallout>
-  <cs:dataPoint>
-    <cs:lnRef idx="0"/>
-    <cs:fillRef idx="1">
-      <cs:styleClr val="auto"/>
-    </cs:fillRef>
-    <cs:effectRef idx="0"/>
-    <cs:fontRef idx="minor">
-      <a:schemeClr val="tx1"/>
-    </cs:fontRef>
-    <cs:spPr>
-      <a:solidFill>
-        <a:schemeClr val="phClr"/>
-      </a:solidFill>
-    </cs:spPr>
-  </cs:dataPoint>
-  <cs:dataPoint3D>
-    <cs:lnRef idx="0"/>
-    <cs:fillRef idx="1">
-      <cs:styleClr val="auto"/>
-    </cs:fillRef>
-    <cs:effectRef idx="0"/>
-    <cs:fontRef idx="minor">
-      <a:schemeClr val="tx1"/>
-    </cs:fontRef>
-    <cs:spPr>
-      <a:solidFill>
-        <a:schemeClr val="phClr"/>
-      </a:solidFill>
-    </cs:spPr>
-  </cs:dataPoint3D>
-  <cs:dataPointLine>
-    <cs:lnRef idx="0">
-      <cs:styleClr val="auto"/>
-    </cs:lnRef>
-    <cs:fillRef idx="1"/>
-    <cs:effectRef idx="0"/>
-    <cs:fontRef idx="minor">
-      <a:schemeClr val="tx1"/>
-    </cs:fontRef>
-    <cs:spPr>
-      <a:ln w="28575" cap="rnd">
-        <a:solidFill>
-          <a:schemeClr val="phClr"/>
-        </a:solidFill>
-        <a:round/>
-      </a:ln>
-    </cs:spPr>
-  </cs:dataPointLine>
-  <cs:dataPointMarker>
-    <cs:lnRef idx="0">
-      <cs:styleClr val="auto"/>
-    </cs:lnRef>
-    <cs:fillRef idx="1">
-      <cs:styleClr val="auto"/>
-    </cs:fillRef>
-    <cs:effectRef idx="0"/>
-    <cs:fontRef idx="minor">
-      <a:schemeClr val="tx1"/>
-    </cs:fontRef>
-    <cs:spPr>
-      <a:solidFill>
-        <a:schemeClr val="phClr"/>
-      </a:solidFill>
-      <a:ln w="9525">
-        <a:solidFill>
-          <a:schemeClr val="phClr"/>
-        </a:solidFill>
-      </a:ln>
-    </cs:spPr>
-  </cs:dataPointMarker>
-  <cs:dataPointMarkerLayout symbol="circle" size="5"/>
-  <cs:dataPointWireframe>
-    <cs:lnRef idx="0">
-      <cs:styleClr val="auto"/>
-    </cs:lnRef>
-    <cs:fillRef idx="1"/>
-    <cs:effectRef idx="0"/>
-    <cs:fontRef idx="minor">
-      <a:schemeClr val="tx1"/>
-    </cs:fontRef>
-    <cs:spPr>
-      <a:ln w="9525" cap="rnd">
-        <a:solidFill>
-          <a:schemeClr val="phClr"/>
-        </a:solidFill>
-        <a:round/>
-      </a:ln>
-    </cs:spPr>
-  </cs:dataPointWireframe>
-  <cs:dataTable>
-    <cs:lnRef idx="0"/>
-    <cs:fillRef idx="0"/>
-    <cs:effectRef idx="0"/>
-    <cs:fontRef idx="minor">
-      <a:schemeClr val="tx1">
-        <a:lumMod val="65000"/>
-        <a:lumOff val="35000"/>
-      </a:schemeClr>
-    </cs:fontRef>
-    <cs:spPr>
-      <a:noFill/>
-      <a:ln w="9525" cap="flat" cmpd="sng" algn="ctr">
-        <a:solidFill>
-          <a:schemeClr val="tx1">
-            <a:lumMod val="15000"/>
-            <a:lumOff val="85000"/>
-          </a:schemeClr>
-        </a:solidFill>
-        <a:round/>
-      </a:ln>
-    </cs:spPr>
-    <cs:defRPr sz="1197" kern="1200"/>
-  </cs:dataTable>
-  <cs:downBar>
-    <cs:lnRef idx="0"/>
-    <cs:fillRef idx="0"/>
-    <cs:effectRef idx="0"/>
-    <cs:fontRef idx="minor">
-      <a:schemeClr val="dk1"/>
-    </cs:fontRef>
-    <cs:spPr>
-      <a:solidFill>
-        <a:schemeClr val="dk1">
-          <a:lumMod val="65000"/>
-          <a:lumOff val="35000"/>
-        </a:schemeClr>
-      </a:solidFill>
-      <a:ln w="9525">
-        <a:solidFill>
-          <a:schemeClr val="tx1">
-            <a:lumMod val="65000"/>
-            <a:lumOff val="35000"/>
-          </a:schemeClr>
-        </a:solidFill>
-      </a:ln>
-    </cs:spPr>
-  </cs:downBar>
-  <cs:dropLine>
-    <cs:lnRef idx="0"/>
-    <cs:fillRef idx="0"/>
-    <cs:effectRef idx="0"/>
-    <cs:fontRef idx="minor">
-      <a:schemeClr val="tx1"/>
-    </cs:fontRef>
-    <cs:spPr>
-      <a:ln w="9525" cap="flat" cmpd="sng" algn="ctr">
-        <a:solidFill>
-          <a:schemeClr val="tx1">
-            <a:lumMod val="35000"/>
-            <a:lumOff val="65000"/>
-          </a:schemeClr>
-        </a:solidFill>
-        <a:round/>
-      </a:ln>
-    </cs:spPr>
-  </cs:dropLine>
-  <cs:errorBar>
-    <cs:lnRef idx="0"/>
-    <cs:fillRef idx="0"/>
-    <cs:effectRef idx="0"/>
-    <cs:fontRef idx="minor">
-      <a:schemeClr val="tx1"/>
-    </cs:fontRef>
-    <cs:spPr>
-      <a:ln w="9525" cap="flat" cmpd="sng" algn="ctr">
-        <a:solidFill>
-          <a:schemeClr val="tx1">
-            <a:lumMod val="65000"/>
-            <a:lumOff val="35000"/>
-          </a:schemeClr>
-        </a:solidFill>
-        <a:round/>
-      </a:ln>
-    </cs:spPr>
-  </cs:errorBar>
-  <cs:floor>
-    <cs:lnRef idx="0"/>
-    <cs:fillRef idx="0"/>
-    <cs:effectRef idx="0"/>
-    <cs:fontRef idx="minor">
-      <a:schemeClr val="tx1"/>
-    </cs:fontRef>
-    <cs:spPr>
-      <a:noFill/>
-      <a:ln>
-        <a:noFill/>
-      </a:ln>
-    </cs:spPr>
-  </cs:floor>
-  <cs:gridlineMajor>
-    <cs:lnRef idx="0"/>
-    <cs:fillRef idx="0"/>
-    <cs:effectRef idx="0"/>
-    <cs:fontRef idx="minor">
-      <a:schemeClr val="tx1"/>
-    </cs:fontRef>
-    <cs:spPr>
-      <a:ln w="9525" cap="flat" cmpd="sng" algn="ctr">
-        <a:solidFill>
-          <a:schemeClr val="tx1">
-            <a:lumMod val="15000"/>
-            <a:lumOff val="85000"/>
-          </a:schemeClr>
-        </a:solidFill>
-        <a:round/>
-      </a:ln>
-    </cs:spPr>
-  </cs:gridlineMajor>
-  <cs:gridlineMinor>
-    <cs:lnRef idx="0"/>
-    <cs:fillRef idx="0"/>
-    <cs:effectRef idx="0"/>
-    <cs:fontRef idx="minor">
-      <a:schemeClr val="tx1"/>
-    </cs:fontRef>
-    <cs:spPr>
-      <a:ln w="9525" cap="flat" cmpd="sng" algn="ctr">
-        <a:solidFill>
-          <a:schemeClr val="tx1">
-            <a:lumMod val="5000"/>
-            <a:lumOff val="95000"/>
-          </a:schemeClr>
-        </a:solidFill>
-        <a:round/>
-      </a:ln>
-    </cs:spPr>
-  </cs:gridlineMinor>
-  <cs:hiLoLine>
-    <cs:lnRef idx="0"/>
-    <cs:fillRef idx="0"/>
-    <cs:effectRef idx="0"/>
-    <cs:fontRef idx="minor">
-      <a:schemeClr val="tx1"/>
-    </cs:fontRef>
-    <cs:spPr>
-      <a:ln w="9525" cap="flat" cmpd="sng" algn="ctr">
-        <a:solidFill>
-          <a:schemeClr val="tx1">
-            <a:lumMod val="75000"/>
-            <a:lumOff val="25000"/>
-          </a:schemeClr>
-        </a:solidFill>
-        <a:round/>
-      </a:ln>
-    </cs:spPr>
-  </cs:hiLoLine>
-  <cs:leaderLine>
-    <cs:lnRef idx="0"/>
-    <cs:fillRef idx="0"/>
-    <cs:effectRef idx="0"/>
-    <cs:fontRef idx="minor">
-      <a:schemeClr val="tx1"/>
-    </cs:fontRef>
-    <cs:spPr>
-      <a:ln w="9525" cap="flat" cmpd="sng" algn="ctr">
-        <a:solidFill>
-          <a:schemeClr val="tx1">
-            <a:lumMod val="35000"/>
-            <a:lumOff val="65000"/>
-          </a:schemeClr>
-        </a:solidFill>
-        <a:round/>
-      </a:ln>
-    </cs:spPr>
-  </cs:leaderLine>
-  <cs:legend>
-    <cs:lnRef idx="0"/>
-    <cs:fillRef idx="0"/>
-    <cs:effectRef idx="0"/>
-    <cs:fontRef idx="minor">
-      <a:schemeClr val="tx1">
-        <a:lumMod val="65000"/>
-        <a:lumOff val="35000"/>
-      </a:schemeClr>
-    </cs:fontRef>
-    <cs:defRPr sz="1197" kern="1200"/>
-  </cs:legend>
-  <cs:plotArea mods="allowNoFillOverride allowNoLineOverride">
-    <cs:lnRef idx="0"/>
-    <cs:fillRef idx="0"/>
-    <cs:effectRef idx="0"/>
-    <cs:fontRef idx="minor">
-      <a:schemeClr val="tx1"/>
-    </cs:fontRef>
-  </cs:plotArea>
-  <cs:plotArea3D mods="allowNoFillOverride allowNoLineOverride">
-    <cs:lnRef idx="0"/>
-    <cs:fillRef idx="0"/>
-    <cs:effectRef idx="0"/>
-    <cs:fontRef idx="minor">
-      <a:schemeClr val="tx1"/>
-    </cs:fontRef>
-  </cs:plotArea3D>
-  <cs:seriesAxis>
-    <cs:lnRef idx="0"/>
-    <cs:fillRef idx="0"/>
-    <cs:effectRef idx="0"/>
-    <cs:fontRef idx="minor">
-      <a:schemeClr val="tx1">
-        <a:lumMod val="65000"/>
-        <a:lumOff val="35000"/>
-      </a:schemeClr>
-    </cs:fontRef>
-    <cs:defRPr sz="1197" kern="1200"/>
-  </cs:seriesAxis>
-  <cs:seriesLine>
-    <cs:lnRef idx="0"/>
-    <cs:fillRef idx="0"/>
-    <cs:effectRef idx="0"/>
-    <cs:fontRef idx="minor">
-      <a:schemeClr val="tx1"/>
-    </cs:fontRef>
-    <cs:spPr>
-      <a:ln w="9525" cap="flat" cmpd="sng" algn="ctr">
-        <a:solidFill>
-          <a:schemeClr val="tx1">
-            <a:lumMod val="35000"/>
-            <a:lumOff val="65000"/>
-          </a:schemeClr>
-        </a:solidFill>
-        <a:round/>
-      </a:ln>
-    </cs:spPr>
-  </cs:seriesLine>
-  <cs:title>
-    <cs:lnRef idx="0"/>
-    <cs:fillRef idx="0"/>
-    <cs:effectRef idx="0"/>
-    <cs:fontRef idx="minor">
-      <a:schemeClr val="tx1">
-        <a:lumMod val="65000"/>
-        <a:lumOff val="35000"/>
-      </a:schemeClr>
-    </cs:fontRef>
-    <cs:defRPr sz="1862" b="0" kern="1200" spc="0" baseline="0"/>
-  </cs:title>
-  <cs:trendline>
-    <cs:lnRef idx="0">
-      <cs:styleClr val="auto"/>
-    </cs:lnRef>
-    <cs:fillRef idx="0"/>
-    <cs:effectRef idx="0"/>
-    <cs:fontRef idx="minor">
-      <a:schemeClr val="tx1"/>
-    </cs:fontRef>
-    <cs:spPr>
-      <a:ln w="19050" cap="rnd">
-        <a:solidFill>
-          <a:schemeClr val="phClr"/>
-        </a:solidFill>
-        <a:prstDash val="sysDot"/>
-      </a:ln>
-    </cs:spPr>
-  </cs:trendline>
-  <cs:trendlineLabel>
-    <cs:lnRef idx="0"/>
-    <cs:fillRef idx="0"/>
-    <cs:effectRef idx="0"/>
-    <cs:fontRef idx="minor">
-      <a:schemeClr val="tx1">
-        <a:lumMod val="65000"/>
-        <a:lumOff val="35000"/>
-      </a:schemeClr>
-    </cs:fontRef>
-    <cs:defRPr sz="1197" kern="1200"/>
-  </cs:trendlineLabel>
-  <cs:upBar>
-    <cs:lnRef idx="0"/>
-    <cs:fillRef idx="0"/>
-    <cs:effectRef idx="0"/>
-    <cs:fontRef idx="minor">
-      <a:schemeClr val="dk1"/>
-    </cs:fontRef>
-    <cs:spPr>
-      <a:solidFill>
-        <a:schemeClr val="lt1"/>
-      </a:solidFill>
-      <a:ln w="9525">
-        <a:solidFill>
-          <a:schemeClr val="tx1">
-            <a:lumMod val="15000"/>
-            <a:lumOff val="85000"/>
-          </a:schemeClr>
-        </a:solidFill>
-      </a:ln>
-    </cs:spPr>
-  </cs:upBar>
-  <cs:valueAxis>
-    <cs:lnRef idx="0"/>
-    <cs:fillRef idx="0"/>
-    <cs:effectRef idx="0"/>
-    <cs:fontRef idx="minor">
-      <a:schemeClr val="tx1">
-        <a:lumMod val="65000"/>
-        <a:lumOff val="35000"/>
-      </a:schemeClr>
-    </cs:fontRef>
-    <cs:defRPr sz="1197" kern="1200"/>
-  </cs:valueAxis>
-  <cs:wall>
-    <cs:lnRef idx="0"/>
-    <cs:fillRef idx="0"/>
-    <cs:effectRef idx="0"/>
-    <cs:fontRef idx="minor">
-      <a:schemeClr val="tx1"/>
-    </cs:fontRef>
-    <cs:spPr>
-      <a:noFill/>
-      <a:ln>
-        <a:noFill/>
-      </a:ln>
-    </cs:spPr>
-  </cs:wall>
-</cs:chartStyle>
-</file>
-
-<file path=ppt/charts/style2.xml><?xml version="1.0" encoding="utf-8"?>
-<cs:chartStyle xmlns:cs="http://schemas.microsoft.com/office/drawing/2012/chartStyle" xmlns:a="http://schemas.openxmlformats.org/drawingml/2006/main" id="227">
-  <cs:axisTitle>
-    <cs:lnRef idx="0"/>
-    <cs:fillRef idx="0"/>
-    <cs:effectRef idx="0"/>
-    <cs:fontRef idx="minor">
-      <a:schemeClr val="tx1">
-        <a:lumMod val="65000"/>
-        <a:lumOff val="35000"/>
-      </a:schemeClr>
-    </cs:fontRef>
-    <cs:defRPr sz="1330" kern="1200"/>
-  </cs:axisTitle>
-  <cs:categoryAxis>
-    <cs:lnRef idx="0"/>
-    <cs:fillRef idx="0"/>
-    <cs:effectRef idx="0"/>
-    <cs:fontRef idx="minor">
-      <a:schemeClr val="tx1">
-        <a:lumMod val="65000"/>
-        <a:lumOff val="35000"/>
-      </a:schemeClr>
-    </cs:fontRef>
-    <cs:spPr>
-      <a:ln w="9525" cap="flat" cmpd="sng" algn="ctr">
-        <a:solidFill>
-          <a:schemeClr val="tx1">
-            <a:lumMod val="15000"/>
-            <a:lumOff val="85000"/>
-          </a:schemeClr>
-        </a:solidFill>
-        <a:round/>
-      </a:ln>
-    </cs:spPr>
-    <cs:defRPr sz="1197" kern="1200"/>
-  </cs:categoryAxis>
-  <cs:chartArea mods="allowNoFillOverride allowNoLineOverride">
-    <cs:lnRef idx="0"/>
-    <cs:fillRef idx="0"/>
-    <cs:effectRef idx="0"/>
-    <cs:fontRef idx="minor">
-      <a:schemeClr val="tx1"/>
-    </cs:fontRef>
-    <cs:spPr>
-      <a:solidFill>
-        <a:schemeClr val="bg1"/>
-      </a:solidFill>
-      <a:ln w="9525" cap="flat" cmpd="sng" algn="ctr">
-        <a:solidFill>
-          <a:schemeClr val="tx1">
-            <a:lumMod val="15000"/>
-            <a:lumOff val="85000"/>
-          </a:schemeClr>
-        </a:solidFill>
-        <a:round/>
-      </a:ln>
-    </cs:spPr>
-    <cs:defRPr sz="1330" kern="1200"/>
-  </cs:chartArea>
-  <cs:dataLabel>
-    <cs:lnRef idx="0"/>
-    <cs:fillRef idx="0"/>
-    <cs:effectRef idx="0"/>
-    <cs:fontRef idx="minor">
-      <a:schemeClr val="tx1">
-        <a:lumMod val="75000"/>
-        <a:lumOff val="25000"/>
-      </a:schemeClr>
-    </cs:fontRef>
-    <cs:defRPr sz="1197" kern="1200"/>
-  </cs:dataLabel>
-  <cs:dataLabelCallout>
-    <cs:lnRef idx="0"/>
-    <cs:fillRef idx="0"/>
-    <cs:effectRef idx="0"/>
-    <cs:fontRef idx="minor">
-      <a:schemeClr val="dk1">
-        <a:lumMod val="65000"/>
-        <a:lumOff val="35000"/>
-      </a:schemeClr>
-    </cs:fontRef>
-    <cs:spPr>
-      <a:solidFill>
-        <a:schemeClr val="lt1"/>
-      </a:solidFill>
-      <a:ln>
-        <a:solidFill>
-          <a:schemeClr val="dk1">
-            <a:lumMod val="25000"/>
-            <a:lumOff val="75000"/>
-          </a:schemeClr>
-        </a:solidFill>
-      </a:ln>
-    </cs:spPr>
-    <cs:defRPr sz="1197" kern="1200"/>
-    <cs:bodyPr rot="0" spcFirstLastPara="1" vertOverflow="clip" horzOverflow="clip" vert="horz" wrap="square" lIns="36576" tIns="18288" rIns="36576" bIns="18288" anchor="ctr" anchorCtr="1">
-      <a:spAutoFit/>
-    </cs:bodyPr>
-  </cs:dataLabelCallout>
-  <cs:dataPoint>
-    <cs:lnRef idx="0"/>
-    <cs:fillRef idx="1">
-      <cs:styleClr val="auto"/>
-    </cs:fillRef>
-    <cs:effectRef idx="0"/>
-    <cs:fontRef idx="minor">
-      <a:schemeClr val="tx1"/>
-    </cs:fontRef>
-    <cs:spPr>
-      <a:solidFill>
-        <a:schemeClr val="phClr"/>
-      </a:solidFill>
-    </cs:spPr>
-  </cs:dataPoint>
-  <cs:dataPoint3D>
-    <cs:lnRef idx="0"/>
-    <cs:fillRef idx="1">
-      <cs:styleClr val="auto"/>
-    </cs:fillRef>
-    <cs:effectRef idx="0"/>
-    <cs:fontRef idx="minor">
-      <a:schemeClr val="tx1"/>
-    </cs:fontRef>
-    <cs:spPr>
-      <a:solidFill>
-        <a:schemeClr val="phClr"/>
-      </a:solidFill>
-    </cs:spPr>
-  </cs:dataPoint3D>
-  <cs:dataPointLine>
-    <cs:lnRef idx="0">
-      <cs:styleClr val="auto"/>
-    </cs:lnRef>
-    <cs:fillRef idx="1"/>
-    <cs:effectRef idx="0"/>
-    <cs:fontRef idx="minor">
-      <a:schemeClr val="tx1"/>
-    </cs:fontRef>
-    <cs:spPr>
-      <a:ln w="28575" cap="rnd">
-        <a:solidFill>
-          <a:schemeClr val="phClr"/>
-        </a:solidFill>
-        <a:round/>
-      </a:ln>
-    </cs:spPr>
-  </cs:dataPointLine>
-  <cs:dataPointMarker>
-    <cs:lnRef idx="0">
-      <cs:styleClr val="auto"/>
-    </cs:lnRef>
-    <cs:fillRef idx="1">
-      <cs:styleClr val="auto"/>
-    </cs:fillRef>
-    <cs:effectRef idx="0"/>
-    <cs:fontRef idx="minor">
-      <a:schemeClr val="tx1"/>
-    </cs:fontRef>
-    <cs:spPr>
-      <a:solidFill>
-        <a:schemeClr val="phClr"/>
-      </a:solidFill>
-      <a:ln w="9525">
-        <a:solidFill>
-          <a:schemeClr val="phClr"/>
-        </a:solidFill>
-      </a:ln>
-    </cs:spPr>
-  </cs:dataPointMarker>
-  <cs:dataPointMarkerLayout symbol="circle" size="5"/>
-  <cs:dataPointWireframe>
-    <cs:lnRef idx="0">
-      <cs:styleClr val="auto"/>
-    </cs:lnRef>
-    <cs:fillRef idx="1"/>
-    <cs:effectRef idx="0"/>
-    <cs:fontRef idx="minor">
-      <a:schemeClr val="tx1"/>
-    </cs:fontRef>
-    <cs:spPr>
-      <a:ln w="9525" cap="rnd">
-        <a:solidFill>
-          <a:schemeClr val="phClr"/>
-        </a:solidFill>
-        <a:round/>
-      </a:ln>
-    </cs:spPr>
-  </cs:dataPointWireframe>
-  <cs:dataTable>
-    <cs:lnRef idx="0"/>
-    <cs:fillRef idx="0"/>
-    <cs:effectRef idx="0"/>
-    <cs:fontRef idx="minor">
-      <a:schemeClr val="tx1">
-        <a:lumMod val="65000"/>
-        <a:lumOff val="35000"/>
-      </a:schemeClr>
-    </cs:fontRef>
-    <cs:spPr>
-      <a:noFill/>
-      <a:ln w="9525" cap="flat" cmpd="sng" algn="ctr">
-        <a:solidFill>
-          <a:schemeClr val="tx1">
-            <a:lumMod val="15000"/>
-            <a:lumOff val="85000"/>
-          </a:schemeClr>
-        </a:solidFill>
-        <a:round/>
-      </a:ln>
-    </cs:spPr>
-    <cs:defRPr sz="1197" kern="1200"/>
-  </cs:dataTable>
-  <cs:downBar>
-    <cs:lnRef idx="0"/>
-    <cs:fillRef idx="0"/>
-    <cs:effectRef idx="0"/>
-    <cs:fontRef idx="minor">
-      <a:schemeClr val="dk1"/>
-    </cs:fontRef>
-    <cs:spPr>
-      <a:solidFill>
-        <a:schemeClr val="dk1">
-          <a:lumMod val="65000"/>
-          <a:lumOff val="35000"/>
-        </a:schemeClr>
-      </a:solidFill>
-      <a:ln w="9525">
-        <a:solidFill>
-          <a:schemeClr val="tx1">
-            <a:lumMod val="65000"/>
-            <a:lumOff val="35000"/>
-          </a:schemeClr>
-        </a:solidFill>
-      </a:ln>
-    </cs:spPr>
-  </cs:downBar>
-  <cs:dropLine>
-    <cs:lnRef idx="0"/>
-    <cs:fillRef idx="0"/>
-    <cs:effectRef idx="0"/>
-    <cs:fontRef idx="minor">
-      <a:schemeClr val="tx1"/>
-    </cs:fontRef>
-    <cs:spPr>
-      <a:ln w="9525" cap="flat" cmpd="sng" algn="ctr">
-        <a:solidFill>
-          <a:schemeClr val="tx1">
-            <a:lumMod val="35000"/>
-            <a:lumOff val="65000"/>
-          </a:schemeClr>
-        </a:solidFill>
-        <a:round/>
-      </a:ln>
-    </cs:spPr>
-  </cs:dropLine>
-  <cs:errorBar>
-    <cs:lnRef idx="0"/>
-    <cs:fillRef idx="0"/>
-    <cs:effectRef idx="0"/>
-    <cs:fontRef idx="minor">
-      <a:schemeClr val="tx1"/>
-    </cs:fontRef>
-    <cs:spPr>
-      <a:ln w="9525" cap="flat" cmpd="sng" algn="ctr">
-        <a:solidFill>
-          <a:schemeClr val="tx1">
-            <a:lumMod val="65000"/>
-            <a:lumOff val="35000"/>
-          </a:schemeClr>
-        </a:solidFill>
-        <a:round/>
-      </a:ln>
-    </cs:spPr>
-  </cs:errorBar>
-  <cs:floor>
-    <cs:lnRef idx="0"/>
-    <cs:fillRef idx="0"/>
-    <cs:effectRef idx="0"/>
-    <cs:fontRef idx="minor">
-      <a:schemeClr val="tx1"/>
-    </cs:fontRef>
-    <cs:spPr>
-      <a:noFill/>
-      <a:ln>
-        <a:noFill/>
-      </a:ln>
-    </cs:spPr>
-  </cs:floor>
-  <cs:gridlineMajor>
-    <cs:lnRef idx="0"/>
-    <cs:fillRef idx="0"/>
-    <cs:effectRef idx="0"/>
-    <cs:fontRef idx="minor">
-      <a:schemeClr val="tx1"/>
-    </cs:fontRef>
-    <cs:spPr>
-      <a:ln w="9525" cap="flat" cmpd="sng" algn="ctr">
-        <a:solidFill>
-          <a:schemeClr val="tx1">
-            <a:lumMod val="15000"/>
-            <a:lumOff val="85000"/>
-          </a:schemeClr>
-        </a:solidFill>
-        <a:round/>
-      </a:ln>
-    </cs:spPr>
-  </cs:gridlineMajor>
-  <cs:gridlineMinor>
-    <cs:lnRef idx="0"/>
-    <cs:fillRef idx="0"/>
-    <cs:effectRef idx="0"/>
-    <cs:fontRef idx="minor">
-      <a:schemeClr val="tx1"/>
-    </cs:fontRef>
-    <cs:spPr>
-      <a:ln w="9525" cap="flat" cmpd="sng" algn="ctr">
-        <a:solidFill>
-          <a:schemeClr val="tx1">
-            <a:lumMod val="5000"/>
-            <a:lumOff val="95000"/>
-          </a:schemeClr>
-        </a:solidFill>
-        <a:round/>
-      </a:ln>
-    </cs:spPr>
-  </cs:gridlineMinor>
-  <cs:hiLoLine>
-    <cs:lnRef idx="0"/>
-    <cs:fillRef idx="0"/>
-    <cs:effectRef idx="0"/>
-    <cs:fontRef idx="minor">
-      <a:schemeClr val="tx1"/>
-    </cs:fontRef>
-    <cs:spPr>
-      <a:ln w="9525" cap="flat" cmpd="sng" algn="ctr">
-        <a:solidFill>
-          <a:schemeClr val="tx1">
-            <a:lumMod val="75000"/>
-            <a:lumOff val="25000"/>
-          </a:schemeClr>
-        </a:solidFill>
-        <a:round/>
-      </a:ln>
-    </cs:spPr>
-  </cs:hiLoLine>
-  <cs:leaderLine>
-    <cs:lnRef idx="0"/>
-    <cs:fillRef idx="0"/>
-    <cs:effectRef idx="0"/>
-    <cs:fontRef idx="minor">
-      <a:schemeClr val="tx1"/>
-    </cs:fontRef>
-    <cs:spPr>
-      <a:ln w="9525" cap="flat" cmpd="sng" algn="ctr">
-        <a:solidFill>
-          <a:schemeClr val="tx1">
-            <a:lumMod val="35000"/>
-            <a:lumOff val="65000"/>
-          </a:schemeClr>
-        </a:solidFill>
-        <a:round/>
-      </a:ln>
-    </cs:spPr>
-  </cs:leaderLine>
-  <cs:legend>
-    <cs:lnRef idx="0"/>
-    <cs:fillRef idx="0"/>
-    <cs:effectRef idx="0"/>
-    <cs:fontRef idx="minor">
-      <a:schemeClr val="tx1">
-        <a:lumMod val="65000"/>
-        <a:lumOff val="35000"/>
-      </a:schemeClr>
-    </cs:fontRef>
-    <cs:defRPr sz="1197" kern="1200"/>
-  </cs:legend>
-  <cs:plotArea mods="allowNoFillOverride allowNoLineOverride">
-    <cs:lnRef idx="0"/>
-    <cs:fillRef idx="0"/>
-    <cs:effectRef idx="0"/>
-    <cs:fontRef idx="minor">
-      <a:schemeClr val="tx1"/>
-    </cs:fontRef>
-  </cs:plotArea>
-  <cs:plotArea3D mods="allowNoFillOverride allowNoLineOverride">
-    <cs:lnRef idx="0"/>
-    <cs:fillRef idx="0"/>
-    <cs:effectRef idx="0"/>
-    <cs:fontRef idx="minor">
-      <a:schemeClr val="tx1"/>
-    </cs:fontRef>
-  </cs:plotArea3D>
-  <cs:seriesAxis>
-    <cs:lnRef idx="0"/>
-    <cs:fillRef idx="0"/>
-    <cs:effectRef idx="0"/>
-    <cs:fontRef idx="minor">
-      <a:schemeClr val="tx1">
-        <a:lumMod val="65000"/>
-        <a:lumOff val="35000"/>
-      </a:schemeClr>
-    </cs:fontRef>
-    <cs:defRPr sz="1197" kern="1200"/>
-  </cs:seriesAxis>
-  <cs:seriesLine>
-    <cs:lnRef idx="0"/>
-    <cs:fillRef idx="0"/>
-    <cs:effectRef idx="0"/>
-    <cs:fontRef idx="minor">
-      <a:schemeClr val="tx1"/>
-    </cs:fontRef>
-    <cs:spPr>
-      <a:ln w="9525" cap="flat" cmpd="sng" algn="ctr">
-        <a:solidFill>
-          <a:schemeClr val="tx1">
-            <a:lumMod val="35000"/>
-            <a:lumOff val="65000"/>
-          </a:schemeClr>
-        </a:solidFill>
-        <a:round/>
-      </a:ln>
-    </cs:spPr>
-  </cs:seriesLine>
-  <cs:title>
-    <cs:lnRef idx="0"/>
-    <cs:fillRef idx="0"/>
-    <cs:effectRef idx="0"/>
-    <cs:fontRef idx="minor">
-      <a:schemeClr val="tx1">
-        <a:lumMod val="65000"/>
-        <a:lumOff val="35000"/>
-      </a:schemeClr>
-    </cs:fontRef>
-    <cs:defRPr sz="1862" b="0" kern="1200" spc="0" baseline="0"/>
-  </cs:title>
-  <cs:trendline>
-    <cs:lnRef idx="0">
-      <cs:styleClr val="auto"/>
-    </cs:lnRef>
-    <cs:fillRef idx="0"/>
-    <cs:effectRef idx="0"/>
-    <cs:fontRef idx="minor">
-      <a:schemeClr val="tx1"/>
-    </cs:fontRef>
-    <cs:spPr>
-      <a:ln w="19050" cap="rnd">
-        <a:solidFill>
-          <a:schemeClr val="phClr"/>
-        </a:solidFill>
-        <a:prstDash val="sysDot"/>
-      </a:ln>
-    </cs:spPr>
-  </cs:trendline>
-  <cs:trendlineLabel>
-    <cs:lnRef idx="0"/>
-    <cs:fillRef idx="0"/>
-    <cs:effectRef idx="0"/>
-    <cs:fontRef idx="minor">
-      <a:schemeClr val="tx1">
-        <a:lumMod val="65000"/>
-        <a:lumOff val="35000"/>
-      </a:schemeClr>
-    </cs:fontRef>
-    <cs:defRPr sz="1197" kern="1200"/>
-  </cs:trendlineLabel>
-  <cs:upBar>
-    <cs:lnRef idx="0"/>
-    <cs:fillRef idx="0"/>
-    <cs:effectRef idx="0"/>
-    <cs:fontRef idx="minor">
-      <a:schemeClr val="dk1"/>
-    </cs:fontRef>
-    <cs:spPr>
-      <a:solidFill>
-        <a:schemeClr val="lt1"/>
-      </a:solidFill>
-      <a:ln w="9525">
-        <a:solidFill>
-          <a:schemeClr val="tx1">
-            <a:lumMod val="15000"/>
-            <a:lumOff val="85000"/>
-          </a:schemeClr>
-        </a:solidFill>
-      </a:ln>
-    </cs:spPr>
-  </cs:upBar>
-  <cs:valueAxis>
-    <cs:lnRef idx="0"/>
-    <cs:fillRef idx="0"/>
-    <cs:effectRef idx="0"/>
-    <cs:fontRef idx="minor">
-      <a:schemeClr val="tx1">
-        <a:lumMod val="65000"/>
-        <a:lumOff val="35000"/>
-      </a:schemeClr>
-    </cs:fontRef>
-    <cs:defRPr sz="1197" kern="1200"/>
-  </cs:valueAxis>
-  <cs:wall>
-    <cs:lnRef idx="0"/>
-    <cs:fillRef idx="0"/>
-    <cs:effectRef idx="0"/>
-    <cs:fontRef idx="minor">
-      <a:schemeClr val="tx1"/>
-    </cs:fontRef>
-    <cs:spPr>
-      <a:noFill/>
-      <a:ln>
-        <a:noFill/>
-      </a:ln>
-    </cs:spPr>
-  </cs:wall>
-</cs:chartStyle>
-</file>
-
-<file path=ppt/charts/style3.xml><?xml version="1.0" encoding="utf-8"?>
-<cs:chartStyle xmlns:cs="http://schemas.microsoft.com/office/drawing/2012/chartStyle" xmlns:a="http://schemas.openxmlformats.org/drawingml/2006/main" id="227">
-  <cs:axisTitle>
-    <cs:lnRef idx="0"/>
-    <cs:fillRef idx="0"/>
-    <cs:effectRef idx="0"/>
-    <cs:fontRef idx="minor">
-      <a:schemeClr val="tx1">
-        <a:lumMod val="65000"/>
-        <a:lumOff val="35000"/>
-      </a:schemeClr>
-    </cs:fontRef>
-    <cs:defRPr sz="1330" kern="1200"/>
-  </cs:axisTitle>
-  <cs:categoryAxis>
-    <cs:lnRef idx="0"/>
-    <cs:fillRef idx="0"/>
-    <cs:effectRef idx="0"/>
-    <cs:fontRef idx="minor">
-      <a:schemeClr val="tx1">
-        <a:lumMod val="65000"/>
-        <a:lumOff val="35000"/>
-      </a:schemeClr>
-    </cs:fontRef>
-    <cs:spPr>
-      <a:ln w="9525" cap="flat" cmpd="sng" algn="ctr">
-        <a:solidFill>
-          <a:schemeClr val="tx1">
-            <a:lumMod val="15000"/>
-            <a:lumOff val="85000"/>
-          </a:schemeClr>
-        </a:solidFill>
-        <a:round/>
-      </a:ln>
-    </cs:spPr>
-    <cs:defRPr sz="1197" kern="1200"/>
-  </cs:categoryAxis>
-  <cs:chartArea mods="allowNoFillOverride allowNoLineOverride">
-    <cs:lnRef idx="0"/>
-    <cs:fillRef idx="0"/>
-    <cs:effectRef idx="0"/>
-    <cs:fontRef idx="minor">
-      <a:schemeClr val="tx1"/>
-    </cs:fontRef>
-    <cs:spPr>
-      <a:solidFill>
-        <a:schemeClr val="bg1"/>
-      </a:solidFill>
-      <a:ln w="9525" cap="flat" cmpd="sng" algn="ctr">
-        <a:solidFill>
-          <a:schemeClr val="tx1">
-            <a:lumMod val="15000"/>
-            <a:lumOff val="85000"/>
-          </a:schemeClr>
-        </a:solidFill>
-        <a:round/>
-      </a:ln>
-    </cs:spPr>
-    <cs:defRPr sz="1330" kern="1200"/>
-  </cs:chartArea>
-  <cs:dataLabel>
-    <cs:lnRef idx="0"/>
-    <cs:fillRef idx="0"/>
-    <cs:effectRef idx="0"/>
-    <cs:fontRef idx="minor">
-      <a:schemeClr val="tx1">
-        <a:lumMod val="75000"/>
-        <a:lumOff val="25000"/>
-      </a:schemeClr>
-    </cs:fontRef>
-    <cs:defRPr sz="1197" kern="1200"/>
-  </cs:dataLabel>
-  <cs:dataLabelCallout>
-    <cs:lnRef idx="0"/>
-    <cs:fillRef idx="0"/>
-    <cs:effectRef idx="0"/>
-    <cs:fontRef idx="minor">
-      <a:schemeClr val="dk1">
-        <a:lumMod val="65000"/>
-        <a:lumOff val="35000"/>
-      </a:schemeClr>
-    </cs:fontRef>
-    <cs:spPr>
-      <a:solidFill>
-        <a:schemeClr val="lt1"/>
-      </a:solidFill>
-      <a:ln>
-        <a:solidFill>
-          <a:schemeClr val="dk1">
-            <a:lumMod val="25000"/>
-            <a:lumOff val="75000"/>
-          </a:schemeClr>
-        </a:solidFill>
-      </a:ln>
-    </cs:spPr>
-    <cs:defRPr sz="1197" kern="1200"/>
-    <cs:bodyPr rot="0" spcFirstLastPara="1" vertOverflow="clip" horzOverflow="clip" vert="horz" wrap="square" lIns="36576" tIns="18288" rIns="36576" bIns="18288" anchor="ctr" anchorCtr="1">
-      <a:spAutoFit/>
-    </cs:bodyPr>
-  </cs:dataLabelCallout>
-  <cs:dataPoint>
-    <cs:lnRef idx="0"/>
-    <cs:fillRef idx="1">
-      <cs:styleClr val="auto"/>
-    </cs:fillRef>
-    <cs:effectRef idx="0"/>
-    <cs:fontRef idx="minor">
-      <a:schemeClr val="tx1"/>
-    </cs:fontRef>
-    <cs:spPr>
-      <a:solidFill>
-        <a:schemeClr val="phClr"/>
-      </a:solidFill>
-    </cs:spPr>
-  </cs:dataPoint>
-  <cs:dataPoint3D>
-    <cs:lnRef idx="0"/>
-    <cs:fillRef idx="1">
-      <cs:styleClr val="auto"/>
-    </cs:fillRef>
-    <cs:effectRef idx="0"/>
-    <cs:fontRef idx="minor">
-      <a:schemeClr val="tx1"/>
-    </cs:fontRef>
-    <cs:spPr>
-      <a:solidFill>
-        <a:schemeClr val="phClr"/>
-      </a:solidFill>
-    </cs:spPr>
-  </cs:dataPoint3D>
-  <cs:dataPointLine>
-    <cs:lnRef idx="0">
-      <cs:styleClr val="auto"/>
-    </cs:lnRef>
-    <cs:fillRef idx="1"/>
-    <cs:effectRef idx="0"/>
-    <cs:fontRef idx="minor">
-      <a:schemeClr val="tx1"/>
-    </cs:fontRef>
-    <cs:spPr>
-      <a:ln w="28575" cap="rnd">
-        <a:solidFill>
-          <a:schemeClr val="phClr"/>
-        </a:solidFill>
-        <a:round/>
-      </a:ln>
-    </cs:spPr>
-  </cs:dataPointLine>
-  <cs:dataPointMarker>
-    <cs:lnRef idx="0">
-      <cs:styleClr val="auto"/>
-    </cs:lnRef>
-    <cs:fillRef idx="1">
-      <cs:styleClr val="auto"/>
-    </cs:fillRef>
-    <cs:effectRef idx="0"/>
-    <cs:fontRef idx="minor">
-      <a:schemeClr val="tx1"/>
-    </cs:fontRef>
-    <cs:spPr>
-      <a:solidFill>
-        <a:schemeClr val="phClr"/>
-      </a:solidFill>
-      <a:ln w="9525">
-        <a:solidFill>
-          <a:schemeClr val="phClr"/>
-        </a:solidFill>
-      </a:ln>
-    </cs:spPr>
-  </cs:dataPointMarker>
-  <cs:dataPointMarkerLayout symbol="circle" size="5"/>
-  <cs:dataPointWireframe>
-    <cs:lnRef idx="0">
-      <cs:styleClr val="auto"/>
-    </cs:lnRef>
-    <cs:fillRef idx="1"/>
-    <cs:effectRef idx="0"/>
-    <cs:fontRef idx="minor">
-      <a:schemeClr val="tx1"/>
-    </cs:fontRef>
-    <cs:spPr>
-      <a:ln w="9525" cap="rnd">
-        <a:solidFill>
-          <a:schemeClr val="phClr"/>
-        </a:solidFill>
-        <a:round/>
-      </a:ln>
-    </cs:spPr>
-  </cs:dataPointWireframe>
-  <cs:dataTable>
-    <cs:lnRef idx="0"/>
-    <cs:fillRef idx="0"/>
-    <cs:effectRef idx="0"/>
-    <cs:fontRef idx="minor">
-      <a:schemeClr val="tx1">
-        <a:lumMod val="65000"/>
-        <a:lumOff val="35000"/>
-      </a:schemeClr>
-    </cs:fontRef>
-    <cs:spPr>
-      <a:noFill/>
-      <a:ln w="9525" cap="flat" cmpd="sng" algn="ctr">
-        <a:solidFill>
-          <a:schemeClr val="tx1">
-            <a:lumMod val="15000"/>
-            <a:lumOff val="85000"/>
-          </a:schemeClr>
-        </a:solidFill>
-        <a:round/>
-      </a:ln>
-    </cs:spPr>
-    <cs:defRPr sz="1197" kern="1200"/>
-  </cs:dataTable>
-  <cs:downBar>
-    <cs:lnRef idx="0"/>
-    <cs:fillRef idx="0"/>
-    <cs:effectRef idx="0"/>
-    <cs:fontRef idx="minor">
-      <a:schemeClr val="dk1"/>
-    </cs:fontRef>
-    <cs:spPr>
-      <a:solidFill>
-        <a:schemeClr val="dk1">
-          <a:lumMod val="65000"/>
-          <a:lumOff val="35000"/>
-        </a:schemeClr>
-      </a:solidFill>
-      <a:ln w="9525">
-        <a:solidFill>
-          <a:schemeClr val="tx1">
-            <a:lumMod val="65000"/>
-            <a:lumOff val="35000"/>
-          </a:schemeClr>
-        </a:solidFill>
-      </a:ln>
-    </cs:spPr>
-  </cs:downBar>
-  <cs:dropLine>
-    <cs:lnRef idx="0"/>
-    <cs:fillRef idx="0"/>
-    <cs:effectRef idx="0"/>
-    <cs:fontRef idx="minor">
-      <a:schemeClr val="tx1"/>
-    </cs:fontRef>
-    <cs:spPr>
-      <a:ln w="9525" cap="flat" cmpd="sng" algn="ctr">
-        <a:solidFill>
-          <a:schemeClr val="tx1">
-            <a:lumMod val="35000"/>
-            <a:lumOff val="65000"/>
-          </a:schemeClr>
-        </a:solidFill>
-        <a:round/>
-      </a:ln>
-    </cs:spPr>
-  </cs:dropLine>
-  <cs:errorBar>
-    <cs:lnRef idx="0"/>
-    <cs:fillRef idx="0"/>
-    <cs:effectRef idx="0"/>
-    <cs:fontRef idx="minor">
-      <a:schemeClr val="tx1"/>
-    </cs:fontRef>
-    <cs:spPr>
-      <a:ln w="9525" cap="flat" cmpd="sng" algn="ctr">
-        <a:solidFill>
-          <a:schemeClr val="tx1">
-            <a:lumMod val="65000"/>
-            <a:lumOff val="35000"/>
-          </a:schemeClr>
-        </a:solidFill>
-        <a:round/>
-      </a:ln>
-    </cs:spPr>
-  </cs:errorBar>
-  <cs:floor>
-    <cs:lnRef idx="0"/>
-    <cs:fillRef idx="0"/>
-    <cs:effectRef idx="0"/>
-    <cs:fontRef idx="minor">
-      <a:schemeClr val="tx1"/>
-    </cs:fontRef>
-    <cs:spPr>
-      <a:noFill/>
-      <a:ln>
-        <a:noFill/>
-      </a:ln>
-    </cs:spPr>
-  </cs:floor>
-  <cs:gridlineMajor>
-    <cs:lnRef idx="0"/>
-    <cs:fillRef idx="0"/>
-    <cs:effectRef idx="0"/>
-    <cs:fontRef idx="minor">
-      <a:schemeClr val="tx1"/>
-    </cs:fontRef>
-    <cs:spPr>
-      <a:ln w="9525" cap="flat" cmpd="sng" algn="ctr">
-        <a:solidFill>
-          <a:schemeClr val="tx1">
-            <a:lumMod val="15000"/>
-            <a:lumOff val="85000"/>
-          </a:schemeClr>
-        </a:solidFill>
-        <a:round/>
-      </a:ln>
-    </cs:spPr>
-  </cs:gridlineMajor>
-  <cs:gridlineMinor>
-    <cs:lnRef idx="0"/>
-    <cs:fillRef idx="0"/>
-    <cs:effectRef idx="0"/>
-    <cs:fontRef idx="minor">
-      <a:schemeClr val="tx1"/>
-    </cs:fontRef>
-    <cs:spPr>
-      <a:ln w="9525" cap="flat" cmpd="sng" algn="ctr">
-        <a:solidFill>
-          <a:schemeClr val="tx1">
-            <a:lumMod val="5000"/>
-            <a:lumOff val="95000"/>
-          </a:schemeClr>
-        </a:solidFill>
-        <a:round/>
-      </a:ln>
-    </cs:spPr>
-  </cs:gridlineMinor>
-  <cs:hiLoLine>
-    <cs:lnRef idx="0"/>
-    <cs:fillRef idx="0"/>
-    <cs:effectRef idx="0"/>
-    <cs:fontRef idx="minor">
-      <a:schemeClr val="tx1"/>
-    </cs:fontRef>
-    <cs:spPr>
-      <a:ln w="9525" cap="flat" cmpd="sng" algn="ctr">
-        <a:solidFill>
-          <a:schemeClr val="tx1">
-            <a:lumMod val="75000"/>
-            <a:lumOff val="25000"/>
-          </a:schemeClr>
-        </a:solidFill>
-        <a:round/>
-      </a:ln>
-    </cs:spPr>
-  </cs:hiLoLine>
-  <cs:leaderLine>
-    <cs:lnRef idx="0"/>
-    <cs:fillRef idx="0"/>
-    <cs:effectRef idx="0"/>
-    <cs:fontRef idx="minor">
-      <a:schemeClr val="tx1"/>
-    </cs:fontRef>
-    <cs:spPr>
-      <a:ln w="9525" cap="flat" cmpd="sng" algn="ctr">
-        <a:solidFill>
-          <a:schemeClr val="tx1">
-            <a:lumMod val="35000"/>
-            <a:lumOff val="65000"/>
-          </a:schemeClr>
-        </a:solidFill>
-        <a:round/>
-      </a:ln>
-    </cs:spPr>
-  </cs:leaderLine>
-  <cs:legend>
-    <cs:lnRef idx="0"/>
-    <cs:fillRef idx="0"/>
-    <cs:effectRef idx="0"/>
-    <cs:fontRef idx="minor">
-      <a:schemeClr val="tx1">
-        <a:lumMod val="65000"/>
-        <a:lumOff val="35000"/>
-      </a:schemeClr>
-    </cs:fontRef>
-    <cs:defRPr sz="1197" kern="1200"/>
-  </cs:legend>
-  <cs:plotArea mods="allowNoFillOverride allowNoLineOverride">
-    <cs:lnRef idx="0"/>
-    <cs:fillRef idx="0"/>
-    <cs:effectRef idx="0"/>
-    <cs:fontRef idx="minor">
-      <a:schemeClr val="tx1"/>
-    </cs:fontRef>
-  </cs:plotArea>
-  <cs:plotArea3D mods="allowNoFillOverride allowNoLineOverride">
-    <cs:lnRef idx="0"/>
-    <cs:fillRef idx="0"/>
-    <cs:effectRef idx="0"/>
-    <cs:fontRef idx="minor">
-      <a:schemeClr val="tx1"/>
-    </cs:fontRef>
-  </cs:plotArea3D>
-  <cs:seriesAxis>
-    <cs:lnRef idx="0"/>
-    <cs:fillRef idx="0"/>
-    <cs:effectRef idx="0"/>
-    <cs:fontRef idx="minor">
-      <a:schemeClr val="tx1">
-        <a:lumMod val="65000"/>
-        <a:lumOff val="35000"/>
-      </a:schemeClr>
-    </cs:fontRef>
-    <cs:defRPr sz="1197" kern="1200"/>
-  </cs:seriesAxis>
-  <cs:seriesLine>
-    <cs:lnRef idx="0"/>
-    <cs:fillRef idx="0"/>
-    <cs:effectRef idx="0"/>
-    <cs:fontRef idx="minor">
-      <a:schemeClr val="tx1"/>
-    </cs:fontRef>
-    <cs:spPr>
-      <a:ln w="9525" cap="flat" cmpd="sng" algn="ctr">
-        <a:solidFill>
-          <a:schemeClr val="tx1">
-            <a:lumMod val="35000"/>
-            <a:lumOff val="65000"/>
-          </a:schemeClr>
-        </a:solidFill>
-        <a:round/>
-      </a:ln>
-    </cs:spPr>
-  </cs:seriesLine>
-  <cs:title>
-    <cs:lnRef idx="0"/>
-    <cs:fillRef idx="0"/>
-    <cs:effectRef idx="0"/>
-    <cs:fontRef idx="minor">
-      <a:schemeClr val="tx1">
-        <a:lumMod val="65000"/>
-        <a:lumOff val="35000"/>
-      </a:schemeClr>
-    </cs:fontRef>
-    <cs:defRPr sz="1862" b="0" kern="1200" spc="0" baseline="0"/>
-  </cs:title>
-  <cs:trendline>
-    <cs:lnRef idx="0">
-      <cs:styleClr val="auto"/>
-    </cs:lnRef>
-    <cs:fillRef idx="0"/>
-    <cs:effectRef idx="0"/>
-    <cs:fontRef idx="minor">
-      <a:schemeClr val="tx1"/>
-    </cs:fontRef>
-    <cs:spPr>
-      <a:ln w="19050" cap="rnd">
-        <a:solidFill>
-          <a:schemeClr val="phClr"/>
-        </a:solidFill>
-        <a:prstDash val="sysDot"/>
-      </a:ln>
-    </cs:spPr>
-  </cs:trendline>
-  <cs:trendlineLabel>
-    <cs:lnRef idx="0"/>
-    <cs:fillRef idx="0"/>
-    <cs:effectRef idx="0"/>
-    <cs:fontRef idx="minor">
-      <a:schemeClr val="tx1">
-        <a:lumMod val="65000"/>
-        <a:lumOff val="35000"/>
-      </a:schemeClr>
-    </cs:fontRef>
-    <cs:defRPr sz="1197" kern="1200"/>
-  </cs:trendlineLabel>
-  <cs:upBar>
-    <cs:lnRef idx="0"/>
-    <cs:fillRef idx="0"/>
-    <cs:effectRef idx="0"/>
-    <cs:fontRef idx="minor">
-      <a:schemeClr val="dk1"/>
-    </cs:fontRef>
-    <cs:spPr>
-      <a:solidFill>
-        <a:schemeClr val="lt1"/>
-      </a:solidFill>
-      <a:ln w="9525">
-        <a:solidFill>
-          <a:schemeClr val="tx1">
-            <a:lumMod val="15000"/>
-            <a:lumOff val="85000"/>
-          </a:schemeClr>
-        </a:solidFill>
-      </a:ln>
-    </cs:spPr>
-  </cs:upBar>
-  <cs:valueAxis>
-    <cs:lnRef idx="0"/>
-    <cs:fillRef idx="0"/>
-    <cs:effectRef idx="0"/>
-    <cs:fontRef idx="minor">
-      <a:schemeClr val="tx1">
-        <a:lumMod val="65000"/>
-        <a:lumOff val="35000"/>
-      </a:schemeClr>
-    </cs:fontRef>
-    <cs:defRPr sz="1197" kern="1200"/>
-  </cs:valueAxis>
-  <cs:wall>
-    <cs:lnRef idx="0"/>
-    <cs:fillRef idx="0"/>
-    <cs:effectRef idx="0"/>
-    <cs:fontRef idx="minor">
-      <a:schemeClr val="tx1"/>
-    </cs:fontRef>
-    <cs:spPr>
-      <a:noFill/>
-      <a:ln>
-        <a:noFill/>
-      </a:ln>
-    </cs:spPr>
-  </cs:wall>
-</cs:chartStyle>
-</file>
-
 <file path=ppt/notesMasters/notesMaster1.xml><?xml version="1.0" encoding="utf-8"?>
 <p:notesMaster xmlns:a="http://schemas.openxmlformats.org/drawingml/2006/main" xmlns:r="http://schemas.openxmlformats.org/officeDocument/2006/relationships" xmlns:p="http://schemas.openxmlformats.org/presentationml/2006/main">
   <p:cSld>
@@ -3200,7 +207,7 @@
           <a:p>
             <a:fld id="{B1E5340B-A185-9840-A330-97877DFCEF3C}" type="datetimeFigureOut">
               <a:rPr lang="en-US" smtClean="0"/>
-              <a:t>5/30/2025</a:t>
+              <a:t>5/30/25</a:t>
             </a:fld>
             <a:endParaRPr lang="en-US"/>
           </a:p>
@@ -3358,7 +365,7 @@
           <a:p>
             <a:fld id="{171632A9-F944-274E-8DDC-519AD0441DB0}" type="slidenum">
               <a:rPr lang="en-US" smtClean="0"/>
-              <a:t>‹N°›</a:t>
+              <a:t>‹#›</a:t>
             </a:fld>
             <a:endParaRPr lang="en-US"/>
           </a:p>
@@ -3622,34 +629,7 @@
           <a:bodyPr/>
           <a:lstStyle/>
           <a:p>
-            <a:pPr marL="171450" indent="-171450">
-              <a:buFontTx/>
-              <a:buChar char="-"/>
-            </a:pPr>
-            <a:r>
-              <a:rPr lang="en-US" dirty="0"/>
-              <a:t> 2 or 3 points</a:t>
-            </a:r>
-          </a:p>
-          <a:p>
-            <a:pPr marL="171450" indent="-171450">
-              <a:buFontTx/>
-              <a:buChar char="-"/>
-            </a:pPr>
-            <a:r>
-              <a:rPr lang="en-US" dirty="0"/>
-              <a:t>One slide on the classical</a:t>
-            </a:r>
-          </a:p>
-          <a:p>
-            <a:pPr marL="171450" indent="-171450">
-              <a:buFontTx/>
-              <a:buChar char="-"/>
-            </a:pPr>
-            <a:r>
-              <a:rPr lang="en-US" dirty="0"/>
-              <a:t>One for the embedded</a:t>
-            </a:r>
+            <a:endParaRPr lang="en-US" dirty="0"/>
           </a:p>
         </p:txBody>
       </p:sp>
@@ -3835,7 +815,7 @@
           <a:lstStyle/>
           <a:p>
             <a:fld id="{83F8789F-F040-1246-9F38-E63023A0164B}" type="datetimeFigureOut">
-              <a:t>30/05/2025</a:t>
+              <a:t>5/30/25</a:t>
             </a:fld>
             <a:endParaRPr lang="en-US"/>
           </a:p>
@@ -3888,7 +868,7 @@
           <a:lstStyle/>
           <a:p>
             <a:fld id="{68C28C03-D10A-AE46-9567-8D9AA2376AB0}" type="slidenum">
-              <a:t>‹N°›</a:t>
+              <a:t>‹#›</a:t>
             </a:fld>
             <a:endParaRPr lang="en-US"/>
           </a:p>
@@ -4031,7 +1011,7 @@
           <a:lstStyle/>
           <a:p>
             <a:fld id="{83F8789F-F040-1246-9F38-E63023A0164B}" type="datetimeFigureOut">
-              <a:t>30/05/2025</a:t>
+              <a:t>5/30/25</a:t>
             </a:fld>
             <a:endParaRPr lang="en-US"/>
           </a:p>
@@ -4084,7 +1064,7 @@
           <a:lstStyle/>
           <a:p>
             <a:fld id="{68C28C03-D10A-AE46-9567-8D9AA2376AB0}" type="slidenum">
-              <a:t>‹N°›</a:t>
+              <a:t>‹#›</a:t>
             </a:fld>
             <a:endParaRPr lang="en-US"/>
           </a:p>
@@ -4237,7 +1217,7 @@
           <a:lstStyle/>
           <a:p>
             <a:fld id="{83F8789F-F040-1246-9F38-E63023A0164B}" type="datetimeFigureOut">
-              <a:t>30/05/2025</a:t>
+              <a:t>5/30/25</a:t>
             </a:fld>
             <a:endParaRPr lang="en-US"/>
           </a:p>
@@ -4290,7 +1270,7 @@
           <a:lstStyle/>
           <a:p>
             <a:fld id="{68C28C03-D10A-AE46-9567-8D9AA2376AB0}" type="slidenum">
-              <a:t>‹N°›</a:t>
+              <a:t>‹#›</a:t>
             </a:fld>
             <a:endParaRPr lang="en-US"/>
           </a:p>
@@ -4433,7 +1413,7 @@
           <a:lstStyle/>
           <a:p>
             <a:fld id="{83F8789F-F040-1246-9F38-E63023A0164B}" type="datetimeFigureOut">
-              <a:t>30/05/2025</a:t>
+              <a:t>5/30/25</a:t>
             </a:fld>
             <a:endParaRPr lang="en-US"/>
           </a:p>
@@ -4486,7 +1466,7 @@
           <a:lstStyle/>
           <a:p>
             <a:fld id="{68C28C03-D10A-AE46-9567-8D9AA2376AB0}" type="slidenum">
-              <a:t>‹N°›</a:t>
+              <a:t>‹#›</a:t>
             </a:fld>
             <a:endParaRPr lang="en-US"/>
           </a:p>
@@ -4706,7 +1686,7 @@
           <a:lstStyle/>
           <a:p>
             <a:fld id="{83F8789F-F040-1246-9F38-E63023A0164B}" type="datetimeFigureOut">
-              <a:t>30/05/2025</a:t>
+              <a:t>5/30/25</a:t>
             </a:fld>
             <a:endParaRPr lang="en-US"/>
           </a:p>
@@ -4759,7 +1739,7 @@
           <a:lstStyle/>
           <a:p>
             <a:fld id="{68C28C03-D10A-AE46-9567-8D9AA2376AB0}" type="slidenum">
-              <a:t>‹N°›</a:t>
+              <a:t>‹#›</a:t>
             </a:fld>
             <a:endParaRPr lang="en-US"/>
           </a:p>
@@ -4969,7 +1949,7 @@
           <a:lstStyle/>
           <a:p>
             <a:fld id="{83F8789F-F040-1246-9F38-E63023A0164B}" type="datetimeFigureOut">
-              <a:t>30/05/2025</a:t>
+              <a:t>5/30/25</a:t>
             </a:fld>
             <a:endParaRPr lang="en-US"/>
           </a:p>
@@ -5022,7 +2002,7 @@
           <a:lstStyle/>
           <a:p>
             <a:fld id="{68C28C03-D10A-AE46-9567-8D9AA2376AB0}" type="slidenum">
-              <a:t>‹N°›</a:t>
+              <a:t>‹#›</a:t>
             </a:fld>
             <a:endParaRPr lang="en-US"/>
           </a:p>
@@ -5379,7 +2359,7 @@
           <a:lstStyle/>
           <a:p>
             <a:fld id="{83F8789F-F040-1246-9F38-E63023A0164B}" type="datetimeFigureOut">
-              <a:t>30/05/2025</a:t>
+              <a:t>5/30/25</a:t>
             </a:fld>
             <a:endParaRPr lang="en-US"/>
           </a:p>
@@ -5432,7 +2412,7 @@
           <a:lstStyle/>
           <a:p>
             <a:fld id="{68C28C03-D10A-AE46-9567-8D9AA2376AB0}" type="slidenum">
-              <a:t>‹N°›</a:t>
+              <a:t>‹#›</a:t>
             </a:fld>
             <a:endParaRPr lang="en-US"/>
           </a:p>
@@ -5518,7 +2498,7 @@
           <a:lstStyle/>
           <a:p>
             <a:fld id="{83F8789F-F040-1246-9F38-E63023A0164B}" type="datetimeFigureOut">
-              <a:t>30/05/2025</a:t>
+              <a:t>5/30/25</a:t>
             </a:fld>
             <a:endParaRPr lang="en-US"/>
           </a:p>
@@ -5571,7 +2551,7 @@
           <a:lstStyle/>
           <a:p>
             <a:fld id="{68C28C03-D10A-AE46-9567-8D9AA2376AB0}" type="slidenum">
-              <a:t>‹N°›</a:t>
+              <a:t>‹#›</a:t>
             </a:fld>
             <a:endParaRPr lang="en-US"/>
           </a:p>
@@ -5629,7 +2609,7 @@
           <a:lstStyle/>
           <a:p>
             <a:fld id="{83F8789F-F040-1246-9F38-E63023A0164B}" type="datetimeFigureOut">
-              <a:t>30/05/2025</a:t>
+              <a:t>5/30/25</a:t>
             </a:fld>
             <a:endParaRPr lang="en-US"/>
           </a:p>
@@ -5682,7 +2662,7 @@
           <a:lstStyle/>
           <a:p>
             <a:fld id="{68C28C03-D10A-AE46-9567-8D9AA2376AB0}" type="slidenum">
-              <a:t>‹N°›</a:t>
+              <a:t>‹#›</a:t>
             </a:fld>
             <a:endParaRPr lang="en-US"/>
           </a:p>
@@ -5938,7 +2918,7 @@
           <a:lstStyle/>
           <a:p>
             <a:fld id="{83F8789F-F040-1246-9F38-E63023A0164B}" type="datetimeFigureOut">
-              <a:t>30/05/2025</a:t>
+              <a:t>5/30/25</a:t>
             </a:fld>
             <a:endParaRPr lang="en-US"/>
           </a:p>
@@ -5991,7 +2971,7 @@
           <a:lstStyle/>
           <a:p>
             <a:fld id="{68C28C03-D10A-AE46-9567-8D9AA2376AB0}" type="slidenum">
-              <a:t>‹N°›</a:t>
+              <a:t>‹#›</a:t>
             </a:fld>
             <a:endParaRPr lang="en-US"/>
           </a:p>
@@ -6224,7 +3204,7 @@
           <a:lstStyle/>
           <a:p>
             <a:fld id="{83F8789F-F040-1246-9F38-E63023A0164B}" type="datetimeFigureOut">
-              <a:t>30/05/2025</a:t>
+              <a:t>5/30/25</a:t>
             </a:fld>
             <a:endParaRPr lang="en-US"/>
           </a:p>
@@ -6277,7 +3257,7 @@
           <a:lstStyle/>
           <a:p>
             <a:fld id="{68C28C03-D10A-AE46-9567-8D9AA2376AB0}" type="slidenum">
-              <a:t>‹N°›</a:t>
+              <a:t>‹#›</a:t>
             </a:fld>
             <a:endParaRPr lang="en-US"/>
           </a:p>
@@ -6463,7 +3443,7 @@
           </a:lstStyle>
           <a:p>
             <a:fld id="{83F8789F-F040-1246-9F38-E63023A0164B}" type="datetimeFigureOut">
-              <a:t>30/05/2025</a:t>
+              <a:t>5/30/25</a:t>
             </a:fld>
             <a:endParaRPr lang="en-US"/>
           </a:p>
@@ -6552,7 +3532,7 @@
           </a:lstStyle>
           <a:p>
             <a:fld id="{68C28C03-D10A-AE46-9567-8D9AA2376AB0}" type="slidenum">
-              <a:t>‹N°›</a:t>
+              <a:t>‹#›</a:t>
             </a:fld>
             <a:endParaRPr lang="en-US"/>
           </a:p>
@@ -7322,7 +4302,7 @@
           <a:lstStyle/>
           <a:p>
             <a:r>
-              <a:rPr lang="en-US"/>
+              <a:rPr lang="en-US" dirty="0"/>
               <a:t>Executive summary</a:t>
             </a:r>
           </a:p>
@@ -7346,67 +4326,122 @@
         </p:nvSpPr>
         <p:spPr>
           <a:xfrm>
-            <a:off x="838200" y="1825625"/>
-            <a:ext cx="5257800" cy="4351338"/>
+            <a:off x="365760" y="1762851"/>
+            <a:ext cx="5730240" cy="5095149"/>
           </a:xfrm>
         </p:spPr>
         <p:txBody>
-          <a:bodyPr/>
-          <a:lstStyle/>
-          <a:p>
-            <a:r>
-              <a:rPr lang="en-US"/>
-              <a:t>Final result (i.e. accuracy achieved) </a:t>
-            </a:r>
-          </a:p>
-          <a:p>
-            <a:r>
-              <a:rPr lang="en-US"/>
-              <a:t>Model used</a:t>
-            </a:r>
-          </a:p>
-          <a:p>
-            <a:r>
-              <a:rPr lang="en-US"/>
-              <a:t>Quick recap of alternatives considered</a:t>
-            </a:r>
-          </a:p>
-          <a:p>
-            <a:r>
-              <a:rPr lang="en-US"/>
-              <a:t>Other important methodology or considerations</a:t>
-            </a:r>
-          </a:p>
-        </p:txBody>
-      </p:sp>
-      <p:graphicFrame>
-        <p:nvGraphicFramePr>
-          <p:cNvPr id="5" name="Chart 4">
-            <a:extLst>
-              <a:ext uri="{FF2B5EF4-FFF2-40B4-BE49-F238E27FC236}">
-                <a16:creationId xmlns:a16="http://schemas.microsoft.com/office/drawing/2014/main" id="{F165D083-605B-0A17-EA37-54164DAED92B}"/>
-              </a:ext>
-            </a:extLst>
-          </p:cNvPr>
-          <p:cNvGraphicFramePr/>
-          <p:nvPr>
-            <p:extLst>
-              <p:ext uri="{D42A27DB-BD31-4B8C-83A1-F6EECF244321}">
-                <p14:modId xmlns:p14="http://schemas.microsoft.com/office/powerpoint/2010/main" val="3905673951"/>
-              </p:ext>
-            </p:extLst>
-          </p:nvPr>
-        </p:nvGraphicFramePr>
-        <p:xfrm>
-          <a:off x="6400800" y="1690688"/>
-          <a:ext cx="4652579" cy="4262237"/>
-        </p:xfrm>
-        <a:graphic>
-          <a:graphicData uri="http://schemas.openxmlformats.org/drawingml/2006/chart">
-            <c:chart xmlns:c="http://schemas.openxmlformats.org/drawingml/2006/chart" xmlns:r="http://schemas.openxmlformats.org/officeDocument/2006/relationships" r:id="rId2"/>
-          </a:graphicData>
-        </a:graphic>
-      </p:graphicFrame>
+          <a:bodyPr>
+            <a:normAutofit fontScale="70000" lnSpcReduction="20000"/>
+          </a:bodyPr>
+          <a:lstStyle/>
+          <a:p>
+            <a:pPr marL="0" indent="0">
+              <a:buNone/>
+            </a:pPr>
+            <a:r>
+              <a:rPr lang="en-US" b="1" dirty="0"/>
+              <a:t>Final Result: 98.76% accuracy</a:t>
+            </a:r>
+          </a:p>
+          <a:p>
+            <a:pPr marL="231775" indent="0">
+              <a:buNone/>
+            </a:pPr>
+            <a:r>
+              <a:rPr lang="en-US" dirty="0"/>
+              <a:t>Production-ready fake news detection</a:t>
+            </a:r>
+          </a:p>
+          <a:p>
+            <a:pPr marL="0" indent="0">
+              <a:buNone/>
+            </a:pPr>
+            <a:r>
+              <a:rPr lang="en-US" b="1" dirty="0"/>
+              <a:t>Model Performance:</a:t>
+            </a:r>
+            <a:endParaRPr lang="en-US" dirty="0"/>
+          </a:p>
+          <a:p>
+            <a:pPr marL="465138" indent="-219075"/>
+            <a:r>
+              <a:rPr lang="en-US" dirty="0"/>
+              <a:t>Traditional ML: 95.4% (TF-IDF + </a:t>
+            </a:r>
+            <a:r>
+              <a:rPr lang="en-US" dirty="0" err="1"/>
+              <a:t>GridSearchCV</a:t>
+            </a:r>
+            <a:r>
+              <a:rPr lang="en-US" dirty="0"/>
+              <a:t>)</a:t>
+            </a:r>
+          </a:p>
+          <a:p>
+            <a:pPr marL="465138" indent="-219075"/>
+            <a:r>
+              <a:rPr lang="en-US" dirty="0"/>
+              <a:t>Simple BERT: 95.9% (frozen features)</a:t>
+            </a:r>
+          </a:p>
+          <a:p>
+            <a:pPr marL="465138" indent="-219075"/>
+            <a:r>
+              <a:rPr lang="en-US" b="1" dirty="0"/>
+              <a:t>Full BERT Fine-tuned: 98.8%</a:t>
+            </a:r>
+            <a:r>
+              <a:rPr lang="en-US" dirty="0"/>
+              <a:t> (end-to-end training)</a:t>
+            </a:r>
+          </a:p>
+          <a:p>
+            <a:pPr marL="0" indent="0">
+              <a:buNone/>
+            </a:pPr>
+            <a:r>
+              <a:rPr lang="en-US" b="1" dirty="0"/>
+              <a:t>Key Breakthrough:</a:t>
+            </a:r>
+            <a:r>
+              <a:rPr lang="en-US" dirty="0"/>
+              <a:t> Fine-tuning vs. feature extraction</a:t>
+            </a:r>
+          </a:p>
+          <a:p>
+            <a:pPr marL="465138" indent="-219075"/>
+            <a:r>
+              <a:rPr lang="en-US" dirty="0" err="1"/>
+              <a:t>Unfrozing</a:t>
+            </a:r>
+            <a:r>
+              <a:rPr lang="en-US" dirty="0"/>
+              <a:t> all 109M BERT parameters for task-specific learning</a:t>
+            </a:r>
+          </a:p>
+          <a:p>
+            <a:pPr marL="465138" indent="-219075"/>
+            <a:r>
+              <a:rPr lang="en-US" dirty="0"/>
+              <a:t>+2.9% accuracy gain through end-to-end optimization</a:t>
+            </a:r>
+          </a:p>
+          <a:p>
+            <a:pPr marL="0" indent="0">
+              <a:buNone/>
+            </a:pPr>
+            <a:r>
+              <a:rPr lang="en-US" b="1" dirty="0"/>
+              <a:t>Bottom Line:</a:t>
+            </a:r>
+            <a:r>
+              <a:rPr lang="en-US" dirty="0"/>
+              <a:t> BERT fine-tuning delivers state-of-the-art performance - the extra training investment pays off for production deployment</a:t>
+            </a:r>
+          </a:p>
+        </p:txBody>
+      </p:sp>
       <p:sp>
         <p:nvSpPr>
           <p:cNvPr id="4" name="TextBox 3">
@@ -7442,6 +4477,36 @@
           </a:p>
         </p:txBody>
       </p:sp>
+      <p:pic>
+        <p:nvPicPr>
+          <p:cNvPr id="6" name="Picture 5">
+            <a:extLst>
+              <a:ext uri="{FF2B5EF4-FFF2-40B4-BE49-F238E27FC236}">
+                <a16:creationId xmlns:a16="http://schemas.microsoft.com/office/drawing/2014/main" id="{883F8E5B-F0F2-D2C3-ACDB-9933F3586E8C}"/>
+              </a:ext>
+            </a:extLst>
+          </p:cNvPr>
+          <p:cNvPicPr>
+            <a:picLocks noChangeAspect="1"/>
+          </p:cNvPicPr>
+          <p:nvPr/>
+        </p:nvPicPr>
+        <p:blipFill>
+          <a:blip r:embed="rId2"/>
+          <a:stretch>
+            <a:fillRect/>
+          </a:stretch>
+        </p:blipFill>
+        <p:spPr>
+          <a:xfrm>
+            <a:off x="6329676" y="1547445"/>
+            <a:ext cx="5862323" cy="3507881"/>
+          </a:xfrm>
+          <a:prstGeom prst="rect">
+            <a:avLst/>
+          </a:prstGeom>
+        </p:spPr>
+      </p:pic>
     </p:spTree>
     <p:extLst>
       <p:ext uri="{BB962C8B-B14F-4D97-AF65-F5344CB8AC3E}">
@@ -8400,129 +5465,155 @@
             <p:ph type="title"/>
           </p:nvPr>
         </p:nvSpPr>
-        <p:spPr/>
-        <p:txBody>
-          <a:bodyPr/>
-          <a:lstStyle/>
-          <a:p>
-            <a:r>
-              <a:rPr lang="en-US" dirty="0"/>
-              <a:t>Methods (models) – 1 or 2 slides</a:t>
-            </a:r>
-          </a:p>
-        </p:txBody>
-      </p:sp>
-      <p:sp>
-        <p:nvSpPr>
-          <p:cNvPr id="3" name="Content Placeholder 2">
-            <a:extLst>
-              <a:ext uri="{FF2B5EF4-FFF2-40B4-BE49-F238E27FC236}">
-                <a16:creationId xmlns:a16="http://schemas.microsoft.com/office/drawing/2014/main" id="{F9085543-BAEE-863C-37C8-06656B914EC0}"/>
-              </a:ext>
-            </a:extLst>
-          </p:cNvPr>
-          <p:cNvSpPr>
-            <a:spLocks noGrp="1"/>
-          </p:cNvSpPr>
-          <p:nvPr>
-            <p:ph idx="1"/>
-          </p:nvPr>
-        </p:nvSpPr>
-        <p:spPr/>
-        <p:txBody>
-          <a:bodyPr/>
-          <a:lstStyle/>
-          <a:p>
-            <a:r>
-              <a:rPr lang="en-US"/>
-              <a:t>Explain the models you tried and why</a:t>
-            </a:r>
-          </a:p>
-          <a:p>
-            <a:r>
-              <a:rPr lang="en-US"/>
-              <a:t>Chart comparing them. </a:t>
-            </a:r>
-          </a:p>
-          <a:p>
-            <a:pPr lvl="1"/>
-            <a:r>
-              <a:rPr lang="en-US"/>
-              <a:t>Try to capture subtleties but don’t make it too complicated. </a:t>
-            </a:r>
-          </a:p>
-          <a:p>
-            <a:pPr lvl="1"/>
-            <a:r>
-              <a:rPr lang="en-US"/>
-              <a:t>For example, if a model didn’t improve with preprocessing then don’t include it. But if a model was very affected by preprocessing/hyperparameters then it’s interesting to see how</a:t>
-            </a:r>
-          </a:p>
-        </p:txBody>
-      </p:sp>
-      <p:graphicFrame>
-        <p:nvGraphicFramePr>
-          <p:cNvPr id="4" name="Chart 3">
-            <a:extLst>
-              <a:ext uri="{FF2B5EF4-FFF2-40B4-BE49-F238E27FC236}">
-                <a16:creationId xmlns:a16="http://schemas.microsoft.com/office/drawing/2014/main" id="{6A9C027C-ADBD-953C-5C24-6FC7F9F59C03}"/>
-              </a:ext>
-            </a:extLst>
-          </p:cNvPr>
-          <p:cNvGraphicFramePr/>
-          <p:nvPr>
-            <p:extLst>
-              <p:ext uri="{D42A27DB-BD31-4B8C-83A1-F6EECF244321}">
-                <p14:modId xmlns:p14="http://schemas.microsoft.com/office/powerpoint/2010/main" val="3965728679"/>
-              </p:ext>
-            </p:extLst>
-          </p:nvPr>
-        </p:nvGraphicFramePr>
-        <p:xfrm>
-          <a:off x="3111062" y="4100220"/>
-          <a:ext cx="5262179" cy="2757780"/>
-        </p:xfrm>
-        <a:graphic>
-          <a:graphicData uri="http://schemas.openxmlformats.org/drawingml/2006/chart">
-            <c:chart xmlns:c="http://schemas.openxmlformats.org/drawingml/2006/chart" xmlns:r="http://schemas.openxmlformats.org/officeDocument/2006/relationships" r:id="rId3"/>
-          </a:graphicData>
-        </a:graphic>
-      </p:graphicFrame>
-      <p:sp>
-        <p:nvSpPr>
-          <p:cNvPr id="5" name="TextBox 4">
-            <a:extLst>
-              <a:ext uri="{FF2B5EF4-FFF2-40B4-BE49-F238E27FC236}">
-                <a16:creationId xmlns:a16="http://schemas.microsoft.com/office/drawing/2014/main" id="{9029F6EC-8A9B-5A14-6D5B-D9D053688737}"/>
-              </a:ext>
-            </a:extLst>
-          </p:cNvPr>
-          <p:cNvSpPr txBox="1"/>
-          <p:nvPr/>
-        </p:nvSpPr>
         <p:spPr>
           <a:xfrm>
-            <a:off x="11258731" y="45522"/>
-            <a:ext cx="401072" cy="369332"/>
+            <a:off x="439270" y="25546"/>
+            <a:ext cx="11313459" cy="1325563"/>
+          </a:xfrm>
+        </p:spPr>
+        <p:txBody>
+          <a:bodyPr/>
+          <a:lstStyle/>
+          <a:p>
+            <a:r>
+              <a:rPr lang="en-US" dirty="0"/>
+              <a:t>Deep Learning Breakthrough - Full BERT Model</a:t>
+            </a:r>
+          </a:p>
+        </p:txBody>
+      </p:sp>
+      <p:sp>
+        <p:nvSpPr>
+          <p:cNvPr id="3" name="Content Placeholder 2">
+            <a:extLst>
+              <a:ext uri="{FF2B5EF4-FFF2-40B4-BE49-F238E27FC236}">
+                <a16:creationId xmlns:a16="http://schemas.microsoft.com/office/drawing/2014/main" id="{F9085543-BAEE-863C-37C8-06656B914EC0}"/>
+              </a:ext>
+            </a:extLst>
+          </p:cNvPr>
+          <p:cNvSpPr>
+            <a:spLocks noGrp="1"/>
+          </p:cNvSpPr>
+          <p:nvPr>
+            <p:ph idx="1"/>
+          </p:nvPr>
+        </p:nvSpPr>
+        <p:spPr>
+          <a:xfrm>
+            <a:off x="838199" y="1084863"/>
+            <a:ext cx="10515600" cy="2318656"/>
+          </a:xfrm>
+        </p:spPr>
+        <p:txBody>
+          <a:bodyPr numCol="2">
+            <a:normAutofit/>
+          </a:bodyPr>
+          <a:lstStyle/>
+          <a:p>
+            <a:pPr marL="0" indent="0">
+              <a:buNone/>
+            </a:pPr>
+            <a:r>
+              <a:rPr lang="en-US" sz="2000" b="1" dirty="0"/>
+              <a:t>Key Results &amp; Why It Was Effective:</a:t>
+            </a:r>
+            <a:endParaRPr lang="en-US" sz="2000" dirty="0"/>
+          </a:p>
+          <a:p>
+            <a:r>
+              <a:rPr lang="en-US" sz="2000" dirty="0"/>
+              <a:t>98.76% accuracy</a:t>
+            </a:r>
+          </a:p>
+          <a:p>
+            <a:r>
+              <a:rPr lang="en-US" sz="2000" dirty="0"/>
+              <a:t>Fine-tuning breakthrough</a:t>
+            </a:r>
+          </a:p>
+          <a:p>
+            <a:r>
+              <a:rPr lang="en-US" sz="2000" dirty="0"/>
+              <a:t>End-to-end learning</a:t>
+            </a:r>
+          </a:p>
+          <a:p>
+            <a:r>
+              <a:rPr lang="en-US" sz="2000" dirty="0"/>
+              <a:t>Contextual understanding</a:t>
+            </a:r>
+          </a:p>
+          <a:p>
+            <a:pPr marL="0" indent="0">
+              <a:buNone/>
+            </a:pPr>
+            <a:r>
+              <a:rPr lang="en-US" sz="2000" b="1" dirty="0" err="1"/>
+              <a:t>Whate</a:t>
+            </a:r>
+            <a:r>
+              <a:rPr lang="en-US" sz="2000" b="1" dirty="0"/>
+              <a:t> Made the Big Jump from Simple BERT:</a:t>
+            </a:r>
+            <a:endParaRPr lang="en-US" sz="2000" dirty="0"/>
+          </a:p>
+          <a:p>
+            <a:r>
+              <a:rPr lang="en-US" sz="2000" dirty="0"/>
+              <a:t>Unfroze BERT parameters</a:t>
+            </a:r>
+          </a:p>
+          <a:p>
+            <a:r>
+              <a:rPr lang="en-US" sz="2000" dirty="0"/>
+              <a:t>Task-specific adaptation</a:t>
+            </a:r>
+          </a:p>
+          <a:p>
+            <a:r>
+              <a:rPr lang="en-US" sz="2000" dirty="0"/>
+              <a:t>Gradient flow optimization</a:t>
+            </a:r>
+          </a:p>
+          <a:p>
+            <a:r>
+              <a:rPr lang="en-US" sz="2000" dirty="0"/>
+              <a:t>Training time investment</a:t>
+            </a:r>
+          </a:p>
+        </p:txBody>
+      </p:sp>
+      <p:pic>
+        <p:nvPicPr>
+          <p:cNvPr id="6" name="Image 6">
+            <a:extLst>
+              <a:ext uri="{FF2B5EF4-FFF2-40B4-BE49-F238E27FC236}">
+                <a16:creationId xmlns:a16="http://schemas.microsoft.com/office/drawing/2014/main" id="{A9ECDFDD-83D8-BECD-667D-3CCD627395AF}"/>
+              </a:ext>
+            </a:extLst>
+          </p:cNvPr>
+          <p:cNvPicPr>
+            <a:picLocks noChangeAspect="1"/>
+          </p:cNvPicPr>
+          <p:nvPr/>
+        </p:nvPicPr>
+        <p:blipFill>
+          <a:blip r:embed="rId3"/>
+          <a:srcRect t="6130"/>
+          <a:stretch>
+            <a:fillRect/>
+          </a:stretch>
+        </p:blipFill>
+        <p:spPr>
+          <a:xfrm>
+            <a:off x="618566" y="3083859"/>
+            <a:ext cx="10515599" cy="3245223"/>
           </a:xfrm>
           <a:prstGeom prst="rect">
             <a:avLst/>
           </a:prstGeom>
-          <a:noFill/>
         </p:spPr>
-        <p:txBody>
-          <a:bodyPr wrap="none" rtlCol="0">
-            <a:spAutoFit/>
-          </a:bodyPr>
-          <a:lstStyle/>
-          <a:p>
-            <a:r>
-              <a:rPr lang="en-US" dirty="0"/>
-              <a:t>JD</a:t>
-            </a:r>
-          </a:p>
-        </p:txBody>
-      </p:sp>
+      </p:pic>
     </p:spTree>
     <p:extLst>
       <p:ext uri="{BB962C8B-B14F-4D97-AF65-F5344CB8AC3E}">
@@ -8575,74 +5666,12 @@
           <a:lstStyle/>
           <a:p>
             <a:r>
-              <a:rPr lang="en-US"/>
-              <a:t>Testing vs Validation accuracy</a:t>
-            </a:r>
-          </a:p>
-        </p:txBody>
-      </p:sp>
-      <p:sp>
-        <p:nvSpPr>
-          <p:cNvPr id="3" name="Content Placeholder 2">
-            <a:extLst>
-              <a:ext uri="{FF2B5EF4-FFF2-40B4-BE49-F238E27FC236}">
-                <a16:creationId xmlns:a16="http://schemas.microsoft.com/office/drawing/2014/main" id="{F9085543-BAEE-863C-37C8-06656B914EC0}"/>
-              </a:ext>
-            </a:extLst>
-          </p:cNvPr>
-          <p:cNvSpPr>
-            <a:spLocks noGrp="1"/>
-          </p:cNvSpPr>
-          <p:nvPr>
-            <p:ph idx="1"/>
-          </p:nvPr>
-        </p:nvSpPr>
-        <p:spPr/>
-        <p:txBody>
-          <a:bodyPr/>
-          <a:lstStyle/>
-          <a:p>
-            <a:r>
-              <a:rPr lang="en-US"/>
-              <a:t>Compare both numbers</a:t>
-            </a:r>
-          </a:p>
-          <a:p>
-            <a:r>
-              <a:rPr lang="en-US"/>
-              <a:t>If they are very different, explain why</a:t>
-            </a:r>
-          </a:p>
-        </p:txBody>
-      </p:sp>
-      <p:graphicFrame>
-        <p:nvGraphicFramePr>
-          <p:cNvPr id="4" name="Chart 3">
-            <a:extLst>
-              <a:ext uri="{FF2B5EF4-FFF2-40B4-BE49-F238E27FC236}">
-                <a16:creationId xmlns:a16="http://schemas.microsoft.com/office/drawing/2014/main" id="{6A9C027C-ADBD-953C-5C24-6FC7F9F59C03}"/>
-              </a:ext>
-            </a:extLst>
-          </p:cNvPr>
-          <p:cNvGraphicFramePr/>
-          <p:nvPr>
-            <p:extLst>
-              <p:ext uri="{D42A27DB-BD31-4B8C-83A1-F6EECF244321}">
-                <p14:modId xmlns:p14="http://schemas.microsoft.com/office/powerpoint/2010/main" val="799440586"/>
-              </p:ext>
-            </p:extLst>
-          </p:nvPr>
-        </p:nvGraphicFramePr>
-        <p:xfrm>
-          <a:off x="8573530" y="1282380"/>
-          <a:ext cx="2780270" cy="2757780"/>
-        </p:xfrm>
-        <a:graphic>
-          <a:graphicData uri="http://schemas.openxmlformats.org/drawingml/2006/chart">
-            <c:chart xmlns:c="http://schemas.openxmlformats.org/drawingml/2006/chart" xmlns:r="http://schemas.openxmlformats.org/officeDocument/2006/relationships" r:id="rId2"/>
-          </a:graphicData>
-        </a:graphic>
-      </p:graphicFrame>
+              <a:rPr lang="en-US" dirty="0"/>
+              <a:t>BERT Model Architecture &amp; Learning</a:t>
+            </a:r>
+          </a:p>
+        </p:txBody>
+      </p:sp>
       <p:sp>
         <p:nvSpPr>
           <p:cNvPr id="5" name="TextBox 4">
@@ -8678,6 +5707,119 @@
           </a:p>
         </p:txBody>
       </p:sp>
+      <p:sp>
+        <p:nvSpPr>
+          <p:cNvPr id="7" name="Content Placeholder 6">
+            <a:extLst>
+              <a:ext uri="{FF2B5EF4-FFF2-40B4-BE49-F238E27FC236}">
+                <a16:creationId xmlns:a16="http://schemas.microsoft.com/office/drawing/2014/main" id="{192EF94C-312C-1A5D-37AC-A5624933E053}"/>
+              </a:ext>
+            </a:extLst>
+          </p:cNvPr>
+          <p:cNvSpPr>
+            <a:spLocks noGrp="1"/>
+          </p:cNvSpPr>
+          <p:nvPr>
+            <p:ph idx="1"/>
+          </p:nvPr>
+        </p:nvSpPr>
+        <p:spPr>
+          <a:xfrm>
+            <a:off x="1084384" y="1528057"/>
+            <a:ext cx="10515600" cy="964467"/>
+          </a:xfrm>
+        </p:spPr>
+        <p:txBody>
+          <a:bodyPr numCol="2">
+            <a:normAutofit lnSpcReduction="10000"/>
+          </a:bodyPr>
+          <a:lstStyle/>
+          <a:p>
+            <a:r>
+              <a:rPr lang="en-US" dirty="0"/>
+              <a:t>Bidirectional context</a:t>
+            </a:r>
+          </a:p>
+          <a:p>
+            <a:r>
+              <a:rPr lang="en-US" dirty="0"/>
+              <a:t>Attention mechanism</a:t>
+            </a:r>
+          </a:p>
+          <a:p>
+            <a:r>
+              <a:rPr lang="en-US" dirty="0"/>
+              <a:t>109M parameters</a:t>
+            </a:r>
+          </a:p>
+          <a:p>
+            <a:r>
+              <a:rPr lang="en-US" dirty="0"/>
+              <a:t>Fine-tuning approach</a:t>
+            </a:r>
+          </a:p>
+        </p:txBody>
+      </p:sp>
+      <p:pic>
+        <p:nvPicPr>
+          <p:cNvPr id="8" name="Image 6">
+            <a:extLst>
+              <a:ext uri="{FF2B5EF4-FFF2-40B4-BE49-F238E27FC236}">
+                <a16:creationId xmlns:a16="http://schemas.microsoft.com/office/drawing/2014/main" id="{12042FA3-16CB-A805-D545-C8B9DB9987F2}"/>
+              </a:ext>
+            </a:extLst>
+          </p:cNvPr>
+          <p:cNvPicPr>
+            <a:picLocks noChangeAspect="1"/>
+          </p:cNvPicPr>
+          <p:nvPr/>
+        </p:nvPicPr>
+        <p:blipFill>
+          <a:blip r:embed="rId2"/>
+          <a:stretch>
+            <a:fillRect/>
+          </a:stretch>
+        </p:blipFill>
+        <p:spPr>
+          <a:xfrm>
+            <a:off x="838200" y="2468874"/>
+            <a:ext cx="4938741" cy="4285084"/>
+          </a:xfrm>
+          <a:prstGeom prst="rect">
+            <a:avLst/>
+          </a:prstGeom>
+        </p:spPr>
+      </p:pic>
+      <p:pic>
+        <p:nvPicPr>
+          <p:cNvPr id="9" name="Image 8">
+            <a:extLst>
+              <a:ext uri="{FF2B5EF4-FFF2-40B4-BE49-F238E27FC236}">
+                <a16:creationId xmlns:a16="http://schemas.microsoft.com/office/drawing/2014/main" id="{64BAB566-9058-56BE-1755-6C38F9ACB2C5}"/>
+              </a:ext>
+            </a:extLst>
+          </p:cNvPr>
+          <p:cNvPicPr>
+            <a:picLocks noChangeAspect="1"/>
+          </p:cNvPicPr>
+          <p:nvPr/>
+        </p:nvPicPr>
+        <p:blipFill>
+          <a:blip r:embed="rId3"/>
+          <a:stretch>
+            <a:fillRect/>
+          </a:stretch>
+        </p:blipFill>
+        <p:spPr>
+          <a:xfrm>
+            <a:off x="6319990" y="2492524"/>
+            <a:ext cx="4938741" cy="4224939"/>
+          </a:xfrm>
+          <a:prstGeom prst="rect">
+            <a:avLst/>
+          </a:prstGeom>
+        </p:spPr>
+      </p:pic>
     </p:spTree>
     <p:extLst>
       <p:ext uri="{BB962C8B-B14F-4D97-AF65-F5344CB8AC3E}">

</xml_diff>

<commit_message>
Presentation finalised and cleaned
</commit_message>
<xml_diff>
--- a/g2_presentation.pptx
+++ b/g2_presentation.pptx
@@ -5,20 +5,18 @@
     <p:sldMasterId id="2147483648" r:id="rId1"/>
   </p:sldMasterIdLst>
   <p:notesMasterIdLst>
-    <p:notesMasterId r:id="rId13"/>
+    <p:notesMasterId r:id="rId11"/>
   </p:notesMasterIdLst>
   <p:sldIdLst>
     <p:sldId id="256" r:id="rId2"/>
     <p:sldId id="257" r:id="rId3"/>
     <p:sldId id="265" r:id="rId4"/>
-    <p:sldId id="264" r:id="rId5"/>
-    <p:sldId id="266" r:id="rId6"/>
-    <p:sldId id="259" r:id="rId7"/>
-    <p:sldId id="260" r:id="rId8"/>
-    <p:sldId id="269" r:id="rId9"/>
-    <p:sldId id="268" r:id="rId10"/>
-    <p:sldId id="267" r:id="rId11"/>
-    <p:sldId id="262" r:id="rId12"/>
+    <p:sldId id="270" r:id="rId5"/>
+    <p:sldId id="264" r:id="rId6"/>
+    <p:sldId id="266" r:id="rId7"/>
+    <p:sldId id="259" r:id="rId8"/>
+    <p:sldId id="260" r:id="rId9"/>
+    <p:sldId id="267" r:id="rId10"/>
   </p:sldIdLst>
   <p:sldSz cx="12192000" cy="6858000"/>
   <p:notesSz cx="6858000" cy="9144000"/>
@@ -207,7 +205,7 @@
           <a:p>
             <a:fld id="{B1E5340B-A185-9840-A330-97877DFCEF3C}" type="datetimeFigureOut">
               <a:rPr lang="en-US" smtClean="0"/>
-              <a:t>5/30/25</a:t>
+              <a:t>5/30/2025</a:t>
             </a:fld>
             <a:endParaRPr lang="en-US"/>
           </a:p>
@@ -365,7 +363,7 @@
           <a:p>
             <a:fld id="{171632A9-F944-274E-8DDC-519AD0441DB0}" type="slidenum">
               <a:rPr lang="en-US" smtClean="0"/>
-              <a:t>‹#›</a:t>
+              <a:t>‹N°›</a:t>
             </a:fld>
             <a:endParaRPr lang="en-US"/>
           </a:p>
@@ -650,7 +648,7 @@
           <a:p>
             <a:fld id="{171632A9-F944-274E-8DDC-519AD0441DB0}" type="slidenum">
               <a:rPr lang="en-US" smtClean="0"/>
-              <a:t>6</a:t>
+              <a:t>7</a:t>
             </a:fld>
             <a:endParaRPr lang="en-US"/>
           </a:p>
@@ -815,7 +813,7 @@
           <a:lstStyle/>
           <a:p>
             <a:fld id="{83F8789F-F040-1246-9F38-E63023A0164B}" type="datetimeFigureOut">
-              <a:t>5/30/25</a:t>
+              <a:t>30/05/2025</a:t>
             </a:fld>
             <a:endParaRPr lang="en-US"/>
           </a:p>
@@ -868,7 +866,7 @@
           <a:lstStyle/>
           <a:p>
             <a:fld id="{68C28C03-D10A-AE46-9567-8D9AA2376AB0}" type="slidenum">
-              <a:t>‹#›</a:t>
+              <a:t>‹N°›</a:t>
             </a:fld>
             <a:endParaRPr lang="en-US"/>
           </a:p>
@@ -1011,7 +1009,7 @@
           <a:lstStyle/>
           <a:p>
             <a:fld id="{83F8789F-F040-1246-9F38-E63023A0164B}" type="datetimeFigureOut">
-              <a:t>5/30/25</a:t>
+              <a:t>30/05/2025</a:t>
             </a:fld>
             <a:endParaRPr lang="en-US"/>
           </a:p>
@@ -1064,7 +1062,7 @@
           <a:lstStyle/>
           <a:p>
             <a:fld id="{68C28C03-D10A-AE46-9567-8D9AA2376AB0}" type="slidenum">
-              <a:t>‹#›</a:t>
+              <a:t>‹N°›</a:t>
             </a:fld>
             <a:endParaRPr lang="en-US"/>
           </a:p>
@@ -1217,7 +1215,7 @@
           <a:lstStyle/>
           <a:p>
             <a:fld id="{83F8789F-F040-1246-9F38-E63023A0164B}" type="datetimeFigureOut">
-              <a:t>5/30/25</a:t>
+              <a:t>30/05/2025</a:t>
             </a:fld>
             <a:endParaRPr lang="en-US"/>
           </a:p>
@@ -1270,7 +1268,7 @@
           <a:lstStyle/>
           <a:p>
             <a:fld id="{68C28C03-D10A-AE46-9567-8D9AA2376AB0}" type="slidenum">
-              <a:t>‹#›</a:t>
+              <a:t>‹N°›</a:t>
             </a:fld>
             <a:endParaRPr lang="en-US"/>
           </a:p>
@@ -1413,7 +1411,7 @@
           <a:lstStyle/>
           <a:p>
             <a:fld id="{83F8789F-F040-1246-9F38-E63023A0164B}" type="datetimeFigureOut">
-              <a:t>5/30/25</a:t>
+              <a:t>30/05/2025</a:t>
             </a:fld>
             <a:endParaRPr lang="en-US"/>
           </a:p>
@@ -1466,7 +1464,7 @@
           <a:lstStyle/>
           <a:p>
             <a:fld id="{68C28C03-D10A-AE46-9567-8D9AA2376AB0}" type="slidenum">
-              <a:t>‹#›</a:t>
+              <a:t>‹N°›</a:t>
             </a:fld>
             <a:endParaRPr lang="en-US"/>
           </a:p>
@@ -1686,7 +1684,7 @@
           <a:lstStyle/>
           <a:p>
             <a:fld id="{83F8789F-F040-1246-9F38-E63023A0164B}" type="datetimeFigureOut">
-              <a:t>5/30/25</a:t>
+              <a:t>30/05/2025</a:t>
             </a:fld>
             <a:endParaRPr lang="en-US"/>
           </a:p>
@@ -1739,7 +1737,7 @@
           <a:lstStyle/>
           <a:p>
             <a:fld id="{68C28C03-D10A-AE46-9567-8D9AA2376AB0}" type="slidenum">
-              <a:t>‹#›</a:t>
+              <a:t>‹N°›</a:t>
             </a:fld>
             <a:endParaRPr lang="en-US"/>
           </a:p>
@@ -1949,7 +1947,7 @@
           <a:lstStyle/>
           <a:p>
             <a:fld id="{83F8789F-F040-1246-9F38-E63023A0164B}" type="datetimeFigureOut">
-              <a:t>5/30/25</a:t>
+              <a:t>30/05/2025</a:t>
             </a:fld>
             <a:endParaRPr lang="en-US"/>
           </a:p>
@@ -2002,7 +2000,7 @@
           <a:lstStyle/>
           <a:p>
             <a:fld id="{68C28C03-D10A-AE46-9567-8D9AA2376AB0}" type="slidenum">
-              <a:t>‹#›</a:t>
+              <a:t>‹N°›</a:t>
             </a:fld>
             <a:endParaRPr lang="en-US"/>
           </a:p>
@@ -2359,7 +2357,7 @@
           <a:lstStyle/>
           <a:p>
             <a:fld id="{83F8789F-F040-1246-9F38-E63023A0164B}" type="datetimeFigureOut">
-              <a:t>5/30/25</a:t>
+              <a:t>30/05/2025</a:t>
             </a:fld>
             <a:endParaRPr lang="en-US"/>
           </a:p>
@@ -2412,7 +2410,7 @@
           <a:lstStyle/>
           <a:p>
             <a:fld id="{68C28C03-D10A-AE46-9567-8D9AA2376AB0}" type="slidenum">
-              <a:t>‹#›</a:t>
+              <a:t>‹N°›</a:t>
             </a:fld>
             <a:endParaRPr lang="en-US"/>
           </a:p>
@@ -2498,7 +2496,7 @@
           <a:lstStyle/>
           <a:p>
             <a:fld id="{83F8789F-F040-1246-9F38-E63023A0164B}" type="datetimeFigureOut">
-              <a:t>5/30/25</a:t>
+              <a:t>30/05/2025</a:t>
             </a:fld>
             <a:endParaRPr lang="en-US"/>
           </a:p>
@@ -2551,7 +2549,7 @@
           <a:lstStyle/>
           <a:p>
             <a:fld id="{68C28C03-D10A-AE46-9567-8D9AA2376AB0}" type="slidenum">
-              <a:t>‹#›</a:t>
+              <a:t>‹N°›</a:t>
             </a:fld>
             <a:endParaRPr lang="en-US"/>
           </a:p>
@@ -2609,7 +2607,7 @@
           <a:lstStyle/>
           <a:p>
             <a:fld id="{83F8789F-F040-1246-9F38-E63023A0164B}" type="datetimeFigureOut">
-              <a:t>5/30/25</a:t>
+              <a:t>30/05/2025</a:t>
             </a:fld>
             <a:endParaRPr lang="en-US"/>
           </a:p>
@@ -2662,7 +2660,7 @@
           <a:lstStyle/>
           <a:p>
             <a:fld id="{68C28C03-D10A-AE46-9567-8D9AA2376AB0}" type="slidenum">
-              <a:t>‹#›</a:t>
+              <a:t>‹N°›</a:t>
             </a:fld>
             <a:endParaRPr lang="en-US"/>
           </a:p>
@@ -2918,7 +2916,7 @@
           <a:lstStyle/>
           <a:p>
             <a:fld id="{83F8789F-F040-1246-9F38-E63023A0164B}" type="datetimeFigureOut">
-              <a:t>5/30/25</a:t>
+              <a:t>30/05/2025</a:t>
             </a:fld>
             <a:endParaRPr lang="en-US"/>
           </a:p>
@@ -2971,7 +2969,7 @@
           <a:lstStyle/>
           <a:p>
             <a:fld id="{68C28C03-D10A-AE46-9567-8D9AA2376AB0}" type="slidenum">
-              <a:t>‹#›</a:t>
+              <a:t>‹N°›</a:t>
             </a:fld>
             <a:endParaRPr lang="en-US"/>
           </a:p>
@@ -3204,7 +3202,7 @@
           <a:lstStyle/>
           <a:p>
             <a:fld id="{83F8789F-F040-1246-9F38-E63023A0164B}" type="datetimeFigureOut">
-              <a:t>5/30/25</a:t>
+              <a:t>30/05/2025</a:t>
             </a:fld>
             <a:endParaRPr lang="en-US"/>
           </a:p>
@@ -3257,7 +3255,7 @@
           <a:lstStyle/>
           <a:p>
             <a:fld id="{68C28C03-D10A-AE46-9567-8D9AA2376AB0}" type="slidenum">
-              <a:t>‹#›</a:t>
+              <a:t>‹N°›</a:t>
             </a:fld>
             <a:endParaRPr lang="en-US"/>
           </a:p>
@@ -3443,7 +3441,7 @@
           </a:lstStyle>
           <a:p>
             <a:fld id="{83F8789F-F040-1246-9F38-E63023A0164B}" type="datetimeFigureOut">
-              <a:t>5/30/25</a:t>
+              <a:t>30/05/2025</a:t>
             </a:fld>
             <a:endParaRPr lang="en-US"/>
           </a:p>
@@ -3532,7 +3530,7 @@
           </a:lstStyle>
           <a:p>
             <a:fld id="{68C28C03-D10A-AE46-9567-8D9AA2376AB0}" type="slidenum">
-              <a:t>‹#›</a:t>
+              <a:t>‹N°›</a:t>
             </a:fld>
             <a:endParaRPr lang="en-US"/>
           </a:p>
@@ -3915,345 +3913,40 @@
           </a:p>
         </p:txBody>
       </p:sp>
+      <p:pic>
+        <p:nvPicPr>
+          <p:cNvPr id="5" name="Image 4">
+            <a:extLst>
+              <a:ext uri="{FF2B5EF4-FFF2-40B4-BE49-F238E27FC236}">
+                <a16:creationId xmlns:a16="http://schemas.microsoft.com/office/drawing/2014/main" id="{0287D15A-EC60-FFE2-3FB9-DB936C378856}"/>
+              </a:ext>
+            </a:extLst>
+          </p:cNvPr>
+          <p:cNvPicPr>
+            <a:picLocks noChangeAspect="1"/>
+          </p:cNvPicPr>
+          <p:nvPr/>
+        </p:nvPicPr>
+        <p:blipFill>
+          <a:blip r:embed="rId2"/>
+          <a:stretch>
+            <a:fillRect/>
+          </a:stretch>
+        </p:blipFill>
+        <p:spPr>
+          <a:xfrm>
+            <a:off x="0" y="0"/>
+            <a:ext cx="12192000" cy="6858000"/>
+          </a:xfrm>
+          <a:prstGeom prst="rect">
+            <a:avLst/>
+          </a:prstGeom>
+        </p:spPr>
+      </p:pic>
     </p:spTree>
     <p:extLst>
       <p:ext uri="{BB962C8B-B14F-4D97-AF65-F5344CB8AC3E}">
         <p14:creationId xmlns:p14="http://schemas.microsoft.com/office/powerpoint/2010/main" val="2735999561"/>
-      </p:ext>
-    </p:extLst>
-  </p:cSld>
-  <p:clrMapOvr>
-    <a:masterClrMapping/>
-  </p:clrMapOvr>
-</p:sld>
-</file>
-
-<file path=ppt/slides/slide10.xml><?xml version="1.0" encoding="utf-8"?>
-<p:sld xmlns:a="http://schemas.openxmlformats.org/drawingml/2006/main" xmlns:r="http://schemas.openxmlformats.org/officeDocument/2006/relationships" xmlns:p="http://schemas.openxmlformats.org/presentationml/2006/main">
-  <p:cSld>
-    <p:spTree>
-      <p:nvGrpSpPr>
-        <p:cNvPr id="1" name=""/>
-        <p:cNvGrpSpPr/>
-        <p:nvPr/>
-      </p:nvGrpSpPr>
-      <p:grpSpPr>
-        <a:xfrm>
-          <a:off x="0" y="0"/>
-          <a:ext cx="0" cy="0"/>
-          <a:chOff x="0" y="0"/>
-          <a:chExt cx="0" cy="0"/>
-        </a:xfrm>
-      </p:grpSpPr>
-      <p:sp>
-        <p:nvSpPr>
-          <p:cNvPr id="2" name="Title 1">
-            <a:extLst>
-              <a:ext uri="{FF2B5EF4-FFF2-40B4-BE49-F238E27FC236}">
-                <a16:creationId xmlns:a16="http://schemas.microsoft.com/office/drawing/2014/main" id="{9CDA37DD-20C1-5C1C-B2D4-9B1040AB4E14}"/>
-              </a:ext>
-            </a:extLst>
-          </p:cNvPr>
-          <p:cNvSpPr>
-            <a:spLocks noGrp="1"/>
-          </p:cNvSpPr>
-          <p:nvPr>
-            <p:ph type="title"/>
-          </p:nvPr>
-        </p:nvSpPr>
-        <p:spPr/>
-        <p:txBody>
-          <a:bodyPr/>
-          <a:lstStyle/>
-          <a:p>
-            <a:r>
-              <a:rPr lang="en-US" dirty="0"/>
-              <a:t>Takeaways</a:t>
-            </a:r>
-          </a:p>
-        </p:txBody>
-      </p:sp>
-      <p:sp>
-        <p:nvSpPr>
-          <p:cNvPr id="3" name="Content Placeholder 2">
-            <a:extLst>
-              <a:ext uri="{FF2B5EF4-FFF2-40B4-BE49-F238E27FC236}">
-                <a16:creationId xmlns:a16="http://schemas.microsoft.com/office/drawing/2014/main" id="{F9085543-BAEE-863C-37C8-06656B914EC0}"/>
-              </a:ext>
-            </a:extLst>
-          </p:cNvPr>
-          <p:cNvSpPr>
-            <a:spLocks noGrp="1"/>
-          </p:cNvSpPr>
-          <p:nvPr>
-            <p:ph idx="1"/>
-          </p:nvPr>
-        </p:nvSpPr>
-        <p:spPr/>
-        <p:txBody>
-          <a:bodyPr>
-            <a:normAutofit/>
-          </a:bodyPr>
-          <a:lstStyle/>
-          <a:p>
-            <a:r>
-              <a:rPr lang="en-US" dirty="0"/>
-              <a:t>Simple models can still perform well with proper tuning</a:t>
-            </a:r>
-          </a:p>
-          <a:p>
-            <a:r>
-              <a:rPr lang="en-US" dirty="0"/>
-              <a:t>Embeddings (BERT) bring performance at the cost of training time</a:t>
-            </a:r>
-          </a:p>
-          <a:p>
-            <a:r>
-              <a:rPr lang="en-US" dirty="0"/>
-              <a:t>Data cleaning was crucial: garbage in, garbage out</a:t>
-            </a:r>
-          </a:p>
-          <a:p>
-            <a:r>
-              <a:rPr lang="en-US" dirty="0"/>
-              <a:t>Learned to balance model performance, interpretability, and compute cost</a:t>
-            </a:r>
-          </a:p>
-          <a:p>
-            <a:r>
-              <a:rPr lang="en-US" dirty="0"/>
-              <a:t>Improve collaboration skills, version code with git and </a:t>
-            </a:r>
-            <a:r>
-              <a:rPr lang="en-US" dirty="0" err="1"/>
-              <a:t>github</a:t>
-            </a:r>
-            <a:r>
-              <a:rPr lang="en-US" dirty="0"/>
-              <a:t>, and structure an ML workflow (reusable functions)</a:t>
-            </a:r>
-          </a:p>
-        </p:txBody>
-      </p:sp>
-    </p:spTree>
-    <p:extLst>
-      <p:ext uri="{BB962C8B-B14F-4D97-AF65-F5344CB8AC3E}">
-        <p14:creationId xmlns:p14="http://schemas.microsoft.com/office/powerpoint/2010/main" val="3540792297"/>
-      </p:ext>
-    </p:extLst>
-  </p:cSld>
-  <p:clrMapOvr>
-    <a:masterClrMapping/>
-  </p:clrMapOvr>
-</p:sld>
-</file>
-
-<file path=ppt/slides/slide11.xml><?xml version="1.0" encoding="utf-8"?>
-<p:sld xmlns:a="http://schemas.openxmlformats.org/drawingml/2006/main" xmlns:r="http://schemas.openxmlformats.org/officeDocument/2006/relationships" xmlns:p="http://schemas.openxmlformats.org/presentationml/2006/main">
-  <p:cSld>
-    <p:bg>
-      <p:bgPr>
-        <a:solidFill>
-          <a:schemeClr val="accent4">
-            <a:lumMod val="20000"/>
-            <a:lumOff val="80000"/>
-          </a:schemeClr>
-        </a:solidFill>
-        <a:effectLst/>
-      </p:bgPr>
-    </p:bg>
-    <p:spTree>
-      <p:nvGrpSpPr>
-        <p:cNvPr id="1" name=""/>
-        <p:cNvGrpSpPr/>
-        <p:nvPr/>
-      </p:nvGrpSpPr>
-      <p:grpSpPr>
-        <a:xfrm>
-          <a:off x="0" y="0"/>
-          <a:ext cx="0" cy="0"/>
-          <a:chOff x="0" y="0"/>
-          <a:chExt cx="0" cy="0"/>
-        </a:xfrm>
-      </p:grpSpPr>
-      <p:sp>
-        <p:nvSpPr>
-          <p:cNvPr id="2" name="Title 1">
-            <a:extLst>
-              <a:ext uri="{FF2B5EF4-FFF2-40B4-BE49-F238E27FC236}">
-                <a16:creationId xmlns:a16="http://schemas.microsoft.com/office/drawing/2014/main" id="{9CDA37DD-20C1-5C1C-B2D4-9B1040AB4E14}"/>
-              </a:ext>
-            </a:extLst>
-          </p:cNvPr>
-          <p:cNvSpPr>
-            <a:spLocks noGrp="1"/>
-          </p:cNvSpPr>
-          <p:nvPr>
-            <p:ph type="title"/>
-          </p:nvPr>
-        </p:nvSpPr>
-        <p:spPr/>
-        <p:txBody>
-          <a:bodyPr/>
-          <a:lstStyle/>
-          <a:p>
-            <a:r>
-              <a:rPr lang="en-US"/>
-              <a:t>Instructions</a:t>
-            </a:r>
-          </a:p>
-        </p:txBody>
-      </p:sp>
-      <p:sp>
-        <p:nvSpPr>
-          <p:cNvPr id="3" name="Content Placeholder 2">
-            <a:extLst>
-              <a:ext uri="{FF2B5EF4-FFF2-40B4-BE49-F238E27FC236}">
-                <a16:creationId xmlns:a16="http://schemas.microsoft.com/office/drawing/2014/main" id="{F9085543-BAEE-863C-37C8-06656B914EC0}"/>
-              </a:ext>
-            </a:extLst>
-          </p:cNvPr>
-          <p:cNvSpPr>
-            <a:spLocks noGrp="1"/>
-          </p:cNvSpPr>
-          <p:nvPr>
-            <p:ph idx="1"/>
-          </p:nvPr>
-        </p:nvSpPr>
-        <p:spPr/>
-        <p:txBody>
-          <a:bodyPr>
-            <a:normAutofit fontScale="77500" lnSpcReduction="20000"/>
-          </a:bodyPr>
-          <a:lstStyle/>
-          <a:p>
-            <a:pPr>
-              <a:lnSpc>
-                <a:spcPct val="120000"/>
-              </a:lnSpc>
-            </a:pPr>
-            <a:r>
-              <a:rPr lang="en-US"/>
-              <a:t>All team members must </a:t>
-            </a:r>
-            <a:r>
-              <a:rPr lang="en-US" b="1"/>
-              <a:t>participate</a:t>
-            </a:r>
-            <a:r>
-              <a:rPr lang="en-US"/>
-              <a:t> (either split the slides, or discuss the part that you did for each slide)</a:t>
-            </a:r>
-          </a:p>
-          <a:p>
-            <a:pPr>
-              <a:lnSpc>
-                <a:spcPct val="120000"/>
-              </a:lnSpc>
-            </a:pPr>
-            <a:r>
-              <a:rPr lang="en-US" b="1"/>
-              <a:t>7 minutes </a:t>
-            </a:r>
-            <a:r>
-              <a:rPr lang="en-US"/>
-              <a:t>for presentation (HARD limit) + 3 minutes for questions</a:t>
-            </a:r>
-          </a:p>
-          <a:p>
-            <a:pPr>
-              <a:lnSpc>
-                <a:spcPct val="120000"/>
-              </a:lnSpc>
-            </a:pPr>
-            <a:r>
-              <a:rPr lang="en-US"/>
-              <a:t>Tip: </a:t>
-            </a:r>
-            <a:r>
-              <a:rPr lang="en-US" b="1"/>
-              <a:t>Rehearse</a:t>
-            </a:r>
-            <a:r>
-              <a:rPr lang="en-US"/>
-              <a:t> the presentation at least once</a:t>
-            </a:r>
-          </a:p>
-          <a:p>
-            <a:pPr marL="0" indent="0">
-              <a:lnSpc>
-                <a:spcPct val="120000"/>
-              </a:lnSpc>
-              <a:buNone/>
-            </a:pPr>
-            <a:endParaRPr lang="en-US"/>
-          </a:p>
-          <a:p>
-            <a:pPr>
-              <a:lnSpc>
-                <a:spcPct val="120000"/>
-              </a:lnSpc>
-            </a:pPr>
-            <a:r>
-              <a:rPr lang="en-US" b="1"/>
-              <a:t>Submit</a:t>
-            </a:r>
-            <a:r>
-              <a:rPr lang="en-US"/>
-              <a:t>: code + ppt + predictions csv on a github repo</a:t>
-            </a:r>
-          </a:p>
-          <a:p>
-            <a:pPr>
-              <a:lnSpc>
-                <a:spcPct val="120000"/>
-              </a:lnSpc>
-            </a:pPr>
-            <a:r>
-              <a:rPr lang="en-US" b="1"/>
-              <a:t>Deadline</a:t>
-            </a:r>
-            <a:r>
-              <a:rPr lang="en-US"/>
-              <a:t>: Friday 5pm. Presentations will start around that time so we have a 30-min buffer to account for technical issues</a:t>
-            </a:r>
-          </a:p>
-          <a:p>
-            <a:pPr>
-              <a:lnSpc>
-                <a:spcPct val="120000"/>
-              </a:lnSpc>
-            </a:pPr>
-            <a:r>
-              <a:rPr lang="en-US"/>
-              <a:t>Each student must </a:t>
-            </a:r>
-            <a:r>
-              <a:rPr lang="en-US" b="1"/>
-              <a:t>submit their own repo </a:t>
-            </a:r>
-            <a:r>
-              <a:rPr lang="en-US"/>
-              <a:t>to the Ironhack portal</a:t>
-            </a:r>
-          </a:p>
-          <a:p>
-            <a:pPr lvl="1">
-              <a:lnSpc>
-                <a:spcPct val="120000"/>
-              </a:lnSpc>
-            </a:pPr>
-            <a:r>
-              <a:rPr lang="en-US"/>
-              <a:t>Group members may submit the same files – but each on their own repo</a:t>
-            </a:r>
-          </a:p>
-        </p:txBody>
-      </p:sp>
-    </p:spTree>
-    <p:extLst>
-      <p:ext uri="{BB962C8B-B14F-4D97-AF65-F5344CB8AC3E}">
-        <p14:creationId xmlns:p14="http://schemas.microsoft.com/office/powerpoint/2010/main" val="3760480868"/>
       </p:ext>
     </p:extLst>
   </p:cSld>
@@ -4438,41 +4131,6 @@
             <a:r>
               <a:rPr lang="en-US" dirty="0"/>
               <a:t> BERT fine-tuning delivers state-of-the-art performance - the extra training investment pays off for production deployment</a:t>
-            </a:r>
-          </a:p>
-        </p:txBody>
-      </p:sp>
-      <p:sp>
-        <p:nvSpPr>
-          <p:cNvPr id="4" name="TextBox 3">
-            <a:extLst>
-              <a:ext uri="{FF2B5EF4-FFF2-40B4-BE49-F238E27FC236}">
-                <a16:creationId xmlns:a16="http://schemas.microsoft.com/office/drawing/2014/main" id="{56D0DD34-45E6-31F1-6E7F-4D77E88C0F6F}"/>
-              </a:ext>
-            </a:extLst>
-          </p:cNvPr>
-          <p:cNvSpPr txBox="1"/>
-          <p:nvPr/>
-        </p:nvSpPr>
-        <p:spPr>
-          <a:xfrm>
-            <a:off x="11258731" y="45522"/>
-            <a:ext cx="933269" cy="369332"/>
-          </a:xfrm>
-          <a:prstGeom prst="rect">
-            <a:avLst/>
-          </a:prstGeom>
-          <a:noFill/>
-        </p:spPr>
-        <p:txBody>
-          <a:bodyPr wrap="none" rtlCol="0">
-            <a:spAutoFit/>
-          </a:bodyPr>
-          <a:lstStyle/>
-          <a:p>
-            <a:r>
-              <a:rPr lang="en-US" dirty="0"/>
-              <a:t>Michael</a:t>
             </a:r>
           </a:p>
         </p:txBody>
@@ -4634,41 +4292,6 @@
           </a:p>
         </p:txBody>
       </p:sp>
-      <p:sp>
-        <p:nvSpPr>
-          <p:cNvPr id="5" name="TextBox 4">
-            <a:extLst>
-              <a:ext uri="{FF2B5EF4-FFF2-40B4-BE49-F238E27FC236}">
-                <a16:creationId xmlns:a16="http://schemas.microsoft.com/office/drawing/2014/main" id="{9029F6EC-8A9B-5A14-6D5B-D9D053688737}"/>
-              </a:ext>
-            </a:extLst>
-          </p:cNvPr>
-          <p:cNvSpPr txBox="1"/>
-          <p:nvPr/>
-        </p:nvSpPr>
-        <p:spPr>
-          <a:xfrm>
-            <a:off x="11258731" y="45522"/>
-            <a:ext cx="401072" cy="369332"/>
-          </a:xfrm>
-          <a:prstGeom prst="rect">
-            <a:avLst/>
-          </a:prstGeom>
-          <a:noFill/>
-        </p:spPr>
-        <p:txBody>
-          <a:bodyPr wrap="none" rtlCol="0">
-            <a:spAutoFit/>
-          </a:bodyPr>
-          <a:lstStyle/>
-          <a:p>
-            <a:r>
-              <a:rPr lang="en-US" dirty="0"/>
-              <a:t>JD</a:t>
-            </a:r>
-          </a:p>
-        </p:txBody>
-      </p:sp>
       <p:pic>
         <p:nvPicPr>
           <p:cNvPr id="7" name="Image 6">
@@ -4761,10 +4384,10 @@
       </p:grpSpPr>
       <p:sp>
         <p:nvSpPr>
-          <p:cNvPr id="2" name="Title 1">
-            <a:extLst>
-              <a:ext uri="{FF2B5EF4-FFF2-40B4-BE49-F238E27FC236}">
-                <a16:creationId xmlns:a16="http://schemas.microsoft.com/office/drawing/2014/main" id="{9CDA37DD-20C1-5C1C-B2D4-9B1040AB4E14}"/>
+          <p:cNvPr id="2" name="Titre 1">
+            <a:extLst>
+              <a:ext uri="{FF2B5EF4-FFF2-40B4-BE49-F238E27FC236}">
+                <a16:creationId xmlns:a16="http://schemas.microsoft.com/office/drawing/2014/main" id="{3A5F1F6B-CEE0-AD53-8057-49913EE5626F}"/>
               </a:ext>
             </a:extLst>
           </p:cNvPr>
@@ -4775,24 +4398,98 @@
             <p:ph type="title"/>
           </p:nvPr>
         </p:nvSpPr>
-        <p:spPr/>
+        <p:spPr>
+          <a:xfrm>
+            <a:off x="135211" y="332682"/>
+            <a:ext cx="10515600" cy="1325563"/>
+          </a:xfrm>
+        </p:spPr>
         <p:txBody>
           <a:bodyPr/>
           <a:lstStyle/>
           <a:p>
             <a:r>
-              <a:rPr lang="en-US" dirty="0"/>
-              <a:t>Preprocessing and Tuning</a:t>
-            </a:r>
-          </a:p>
-        </p:txBody>
-      </p:sp>
-      <p:sp>
-        <p:nvSpPr>
-          <p:cNvPr id="8" name="TextBox 7">
-            <a:extLst>
-              <a:ext uri="{FF2B5EF4-FFF2-40B4-BE49-F238E27FC236}">
-                <a16:creationId xmlns:a16="http://schemas.microsoft.com/office/drawing/2014/main" id="{BAAF13D4-4DE7-9366-AD9E-E26E316C285F}"/>
+              <a:rPr lang="fr-FR" dirty="0" err="1"/>
+              <a:t>GridSearchCV</a:t>
+            </a:r>
+            <a:r>
+              <a:rPr lang="fr-FR" dirty="0"/>
+              <a:t> </a:t>
+            </a:r>
+            <a:r>
+              <a:rPr lang="fr-FR" dirty="0" err="1"/>
+              <a:t>parameters</a:t>
+            </a:r>
+            <a:endParaRPr lang="fr-FR" dirty="0"/>
+          </a:p>
+        </p:txBody>
+      </p:sp>
+      <p:pic>
+        <p:nvPicPr>
+          <p:cNvPr id="5" name="Image 4">
+            <a:extLst>
+              <a:ext uri="{FF2B5EF4-FFF2-40B4-BE49-F238E27FC236}">
+                <a16:creationId xmlns:a16="http://schemas.microsoft.com/office/drawing/2014/main" id="{B6D631D4-5C03-5657-DCED-989C8BC57237}"/>
+              </a:ext>
+            </a:extLst>
+          </p:cNvPr>
+          <p:cNvPicPr>
+            <a:picLocks noChangeAspect="1"/>
+          </p:cNvPicPr>
+          <p:nvPr/>
+        </p:nvPicPr>
+        <p:blipFill>
+          <a:blip r:embed="rId2"/>
+          <a:stretch>
+            <a:fillRect/>
+          </a:stretch>
+        </p:blipFill>
+        <p:spPr>
+          <a:xfrm>
+            <a:off x="6798990" y="365125"/>
+            <a:ext cx="5393010" cy="6492875"/>
+          </a:xfrm>
+          <a:prstGeom prst="rect">
+            <a:avLst/>
+          </a:prstGeom>
+        </p:spPr>
+      </p:pic>
+      <p:pic>
+        <p:nvPicPr>
+          <p:cNvPr id="7" name="Image 6">
+            <a:extLst>
+              <a:ext uri="{FF2B5EF4-FFF2-40B4-BE49-F238E27FC236}">
+                <a16:creationId xmlns:a16="http://schemas.microsoft.com/office/drawing/2014/main" id="{F22D0169-5C53-3AA4-8D3C-68BE1DFC9356}"/>
+              </a:ext>
+            </a:extLst>
+          </p:cNvPr>
+          <p:cNvPicPr>
+            <a:picLocks noChangeAspect="1"/>
+          </p:cNvPicPr>
+          <p:nvPr/>
+        </p:nvPicPr>
+        <p:blipFill>
+          <a:blip r:embed="rId3"/>
+          <a:stretch>
+            <a:fillRect/>
+          </a:stretch>
+        </p:blipFill>
+        <p:spPr>
+          <a:xfrm>
+            <a:off x="647656" y="2960203"/>
+            <a:ext cx="4412779" cy="2079447"/>
+          </a:xfrm>
+          <a:prstGeom prst="rect">
+            <a:avLst/>
+          </a:prstGeom>
+        </p:spPr>
+      </p:pic>
+      <p:sp>
+        <p:nvSpPr>
+          <p:cNvPr id="8" name="ZoneTexte 7">
+            <a:extLst>
+              <a:ext uri="{FF2B5EF4-FFF2-40B4-BE49-F238E27FC236}">
+                <a16:creationId xmlns:a16="http://schemas.microsoft.com/office/drawing/2014/main" id="{58C8B651-F0B8-ABC1-56C0-24D7F0983DEA}"/>
               </a:ext>
             </a:extLst>
           </p:cNvPr>
@@ -4801,8 +4498,8 @@
         </p:nvSpPr>
         <p:spPr>
           <a:xfrm>
-            <a:off x="11258731" y="45522"/>
-            <a:ext cx="775982" cy="369332"/>
+            <a:off x="1017824" y="2393287"/>
+            <a:ext cx="4042611" cy="400110"/>
           </a:xfrm>
           <a:prstGeom prst="rect">
             <a:avLst/>
@@ -4810,14 +4507,184 @@
           <a:noFill/>
         </p:spPr>
         <p:txBody>
-          <a:bodyPr wrap="none" rtlCol="0">
+          <a:bodyPr wrap="square" rtlCol="0">
             <a:spAutoFit/>
           </a:bodyPr>
           <a:lstStyle/>
           <a:p>
             <a:r>
+              <a:rPr lang="fr-FR" sz="2000" dirty="0"/>
+              <a:t>Best </a:t>
+            </a:r>
+            <a:r>
+              <a:rPr lang="fr-FR" sz="2000" dirty="0" err="1"/>
+              <a:t>Logistic</a:t>
+            </a:r>
+            <a:r>
+              <a:rPr lang="fr-FR" sz="2000" dirty="0"/>
+              <a:t> </a:t>
+            </a:r>
+            <a:r>
+              <a:rPr lang="fr-FR" sz="2000" dirty="0" err="1"/>
+              <a:t>Regression</a:t>
+            </a:r>
+            <a:r>
+              <a:rPr lang="fr-FR" sz="2000" dirty="0"/>
+              <a:t> </a:t>
+            </a:r>
+            <a:r>
+              <a:rPr lang="fr-FR" sz="2000" dirty="0" err="1"/>
+              <a:t>parameters</a:t>
+            </a:r>
+            <a:r>
+              <a:rPr lang="fr-FR" sz="2000" dirty="0"/>
+              <a:t>:</a:t>
+            </a:r>
+          </a:p>
+        </p:txBody>
+      </p:sp>
+      <p:sp>
+        <p:nvSpPr>
+          <p:cNvPr id="9" name="Rectangle 8">
+            <a:extLst>
+              <a:ext uri="{FF2B5EF4-FFF2-40B4-BE49-F238E27FC236}">
+                <a16:creationId xmlns:a16="http://schemas.microsoft.com/office/drawing/2014/main" id="{E8EACE93-CFCA-4FED-02D8-40FFEAF3B3EC}"/>
+              </a:ext>
+            </a:extLst>
+          </p:cNvPr>
+          <p:cNvSpPr/>
+          <p:nvPr/>
+        </p:nvSpPr>
+        <p:spPr>
+          <a:xfrm>
+            <a:off x="7315200" y="1239253"/>
+            <a:ext cx="4559968" cy="938853"/>
+          </a:xfrm>
+          <a:prstGeom prst="rect">
+            <a:avLst/>
+          </a:prstGeom>
+          <a:noFill/>
+        </p:spPr>
+        <p:style>
+          <a:lnRef idx="2">
+            <a:schemeClr val="accent4"/>
+          </a:lnRef>
+          <a:fillRef idx="1">
+            <a:schemeClr val="lt1"/>
+          </a:fillRef>
+          <a:effectRef idx="0">
+            <a:schemeClr val="accent4"/>
+          </a:effectRef>
+          <a:fontRef idx="minor">
+            <a:schemeClr val="dk1"/>
+          </a:fontRef>
+        </p:style>
+        <p:txBody>
+          <a:bodyPr rtlCol="0" anchor="ctr"/>
+          <a:lstStyle/>
+          <a:p>
+            <a:pPr algn="ctr"/>
+            <a:endParaRPr lang="fr-FR"/>
+          </a:p>
+        </p:txBody>
+      </p:sp>
+      <p:cxnSp>
+        <p:nvCxnSpPr>
+          <p:cNvPr id="11" name="Connecteur droit avec flèche 10">
+            <a:extLst>
+              <a:ext uri="{FF2B5EF4-FFF2-40B4-BE49-F238E27FC236}">
+                <a16:creationId xmlns:a16="http://schemas.microsoft.com/office/drawing/2014/main" id="{95221289-FD06-330E-31A2-16A7BFCF396E}"/>
+              </a:ext>
+            </a:extLst>
+          </p:cNvPr>
+          <p:cNvCxnSpPr>
+            <a:cxnSpLocks/>
+            <a:stCxn id="9" idx="1"/>
+            <a:endCxn id="7" idx="3"/>
+          </p:cNvCxnSpPr>
+          <p:nvPr/>
+        </p:nvCxnSpPr>
+        <p:spPr>
+          <a:xfrm flipH="1">
+            <a:off x="5060435" y="1708680"/>
+            <a:ext cx="2254765" cy="2291247"/>
+          </a:xfrm>
+          <a:prstGeom prst="straightConnector1">
+            <a:avLst/>
+          </a:prstGeom>
+          <a:ln>
+            <a:tailEnd type="triangle"/>
+          </a:ln>
+        </p:spPr>
+        <p:style>
+          <a:lnRef idx="3">
+            <a:schemeClr val="accent4"/>
+          </a:lnRef>
+          <a:fillRef idx="0">
+            <a:schemeClr val="accent4"/>
+          </a:fillRef>
+          <a:effectRef idx="2">
+            <a:schemeClr val="accent4"/>
+          </a:effectRef>
+          <a:fontRef idx="minor">
+            <a:schemeClr val="tx1"/>
+          </a:fontRef>
+        </p:style>
+      </p:cxnSp>
+    </p:spTree>
+    <p:extLst>
+      <p:ext uri="{BB962C8B-B14F-4D97-AF65-F5344CB8AC3E}">
+        <p14:creationId xmlns:p14="http://schemas.microsoft.com/office/powerpoint/2010/main" val="1608471888"/>
+      </p:ext>
+    </p:extLst>
+  </p:cSld>
+  <p:clrMapOvr>
+    <a:masterClrMapping/>
+  </p:clrMapOvr>
+</p:sld>
+</file>
+
+<file path=ppt/slides/slide5.xml><?xml version="1.0" encoding="utf-8"?>
+<p:sld xmlns:a="http://schemas.openxmlformats.org/drawingml/2006/main" xmlns:r="http://schemas.openxmlformats.org/officeDocument/2006/relationships" xmlns:p="http://schemas.openxmlformats.org/presentationml/2006/main">
+  <p:cSld>
+    <p:spTree>
+      <p:nvGrpSpPr>
+        <p:cNvPr id="1" name=""/>
+        <p:cNvGrpSpPr/>
+        <p:nvPr/>
+      </p:nvGrpSpPr>
+      <p:grpSpPr>
+        <a:xfrm>
+          <a:off x="0" y="0"/>
+          <a:ext cx="0" cy="0"/>
+          <a:chOff x="0" y="0"/>
+          <a:chExt cx="0" cy="0"/>
+        </a:xfrm>
+      </p:grpSpPr>
+      <p:sp>
+        <p:nvSpPr>
+          <p:cNvPr id="2" name="Title 1">
+            <a:extLst>
+              <a:ext uri="{FF2B5EF4-FFF2-40B4-BE49-F238E27FC236}">
+                <a16:creationId xmlns:a16="http://schemas.microsoft.com/office/drawing/2014/main" id="{9CDA37DD-20C1-5C1C-B2D4-9B1040AB4E14}"/>
+              </a:ext>
+            </a:extLst>
+          </p:cNvPr>
+          <p:cNvSpPr>
+            <a:spLocks noGrp="1"/>
+          </p:cNvSpPr>
+          <p:nvPr>
+            <p:ph type="title"/>
+          </p:nvPr>
+        </p:nvSpPr>
+        <p:spPr/>
+        <p:txBody>
+          <a:bodyPr/>
+          <a:lstStyle/>
+          <a:p>
+            <a:r>
               <a:rPr lang="en-US" dirty="0"/>
-              <a:t>Mercy</a:t>
+              <a:t>Preprocessing and Tuning</a:t>
             </a:r>
           </a:p>
         </p:txBody>
@@ -5214,7 +5081,7 @@
 </p:sld>
 </file>
 
-<file path=ppt/slides/slide5.xml><?xml version="1.0" encoding="utf-8"?>
+<file path=ppt/slides/slide6.xml><?xml version="1.0" encoding="utf-8"?>
 <p:sld xmlns:a="http://schemas.openxmlformats.org/drawingml/2006/main" xmlns:r="http://schemas.openxmlformats.org/officeDocument/2006/relationships" xmlns:p="http://schemas.openxmlformats.org/presentationml/2006/main">
   <p:cSld>
     <p:spTree>
@@ -5350,41 +5217,6 @@
             <a:r>
               <a:rPr lang="en-US" dirty="0"/>
               <a:t>Simple BERT : Contextual embeddings with minimal preprocessing.</a:t>
-            </a:r>
-          </a:p>
-        </p:txBody>
-      </p:sp>
-      <p:sp>
-        <p:nvSpPr>
-          <p:cNvPr id="4" name="TextBox 3">
-            <a:extLst>
-              <a:ext uri="{FF2B5EF4-FFF2-40B4-BE49-F238E27FC236}">
-                <a16:creationId xmlns:a16="http://schemas.microsoft.com/office/drawing/2014/main" id="{270A5073-CEC1-DE0B-844D-D3CCC64066FF}"/>
-              </a:ext>
-            </a:extLst>
-          </p:cNvPr>
-          <p:cNvSpPr txBox="1"/>
-          <p:nvPr/>
-        </p:nvSpPr>
-        <p:spPr>
-          <a:xfrm>
-            <a:off x="11258731" y="45522"/>
-            <a:ext cx="401072" cy="369332"/>
-          </a:xfrm>
-          <a:prstGeom prst="rect">
-            <a:avLst/>
-          </a:prstGeom>
-          <a:noFill/>
-        </p:spPr>
-        <p:txBody>
-          <a:bodyPr wrap="none" rtlCol="0">
-            <a:spAutoFit/>
-          </a:bodyPr>
-          <a:lstStyle/>
-          <a:p>
-            <a:r>
-              <a:rPr lang="en-US" dirty="0"/>
-              <a:t>JD</a:t>
             </a:r>
           </a:p>
         </p:txBody>
@@ -5432,7 +5264,7 @@
 </p:sld>
 </file>
 
-<file path=ppt/slides/slide6.xml><?xml version="1.0" encoding="utf-8"?>
+<file path=ppt/slides/slide7.xml><?xml version="1.0" encoding="utf-8"?>
 <p:sld xmlns:a="http://schemas.openxmlformats.org/drawingml/2006/main" xmlns:r="http://schemas.openxmlformats.org/officeDocument/2006/relationships" xmlns:p="http://schemas.openxmlformats.org/presentationml/2006/main">
   <p:cSld>
     <p:spTree>
@@ -5627,7 +5459,7 @@
 </p:sld>
 </file>
 
-<file path=ppt/slides/slide7.xml><?xml version="1.0" encoding="utf-8"?>
+<file path=ppt/slides/slide8.xml><?xml version="1.0" encoding="utf-8"?>
 <p:sld xmlns:a="http://schemas.openxmlformats.org/drawingml/2006/main" xmlns:r="http://schemas.openxmlformats.org/officeDocument/2006/relationships" xmlns:p="http://schemas.openxmlformats.org/presentationml/2006/main">
   <p:cSld>
     <p:spTree>
@@ -5668,41 +5500,6 @@
             <a:r>
               <a:rPr lang="en-US" dirty="0"/>
               <a:t>BERT Model Architecture &amp; Learning</a:t>
-            </a:r>
-          </a:p>
-        </p:txBody>
-      </p:sp>
-      <p:sp>
-        <p:nvSpPr>
-          <p:cNvPr id="5" name="TextBox 4">
-            <a:extLst>
-              <a:ext uri="{FF2B5EF4-FFF2-40B4-BE49-F238E27FC236}">
-                <a16:creationId xmlns:a16="http://schemas.microsoft.com/office/drawing/2014/main" id="{0C05A9D7-8C6F-CFC3-0D55-7C1C88740D6F}"/>
-              </a:ext>
-            </a:extLst>
-          </p:cNvPr>
-          <p:cNvSpPr txBox="1"/>
-          <p:nvPr/>
-        </p:nvSpPr>
-        <p:spPr>
-          <a:xfrm>
-            <a:off x="11258731" y="45522"/>
-            <a:ext cx="933269" cy="369332"/>
-          </a:xfrm>
-          <a:prstGeom prst="rect">
-            <a:avLst/>
-          </a:prstGeom>
-          <a:noFill/>
-        </p:spPr>
-        <p:txBody>
-          <a:bodyPr wrap="none" rtlCol="0">
-            <a:spAutoFit/>
-          </a:bodyPr>
-          <a:lstStyle/>
-          <a:p>
-            <a:r>
-              <a:rPr lang="en-US" dirty="0"/>
-              <a:t>Michael</a:t>
             </a:r>
           </a:p>
         </p:txBody>
@@ -5833,66 +5630,6 @@
 </p:sld>
 </file>
 
-<file path=ppt/slides/slide8.xml><?xml version="1.0" encoding="utf-8"?>
-<p:sld xmlns:a="http://schemas.openxmlformats.org/drawingml/2006/main" xmlns:r="http://schemas.openxmlformats.org/officeDocument/2006/relationships" xmlns:p="http://schemas.openxmlformats.org/presentationml/2006/main">
-  <p:cSld>
-    <p:spTree>
-      <p:nvGrpSpPr>
-        <p:cNvPr id="1" name=""/>
-        <p:cNvGrpSpPr/>
-        <p:nvPr/>
-      </p:nvGrpSpPr>
-      <p:grpSpPr>
-        <a:xfrm>
-          <a:off x="0" y="0"/>
-          <a:ext cx="0" cy="0"/>
-          <a:chOff x="0" y="0"/>
-          <a:chExt cx="0" cy="0"/>
-        </a:xfrm>
-      </p:grpSpPr>
-      <p:pic>
-        <p:nvPicPr>
-          <p:cNvPr id="7" name="Image 6">
-            <a:extLst>
-              <a:ext uri="{FF2B5EF4-FFF2-40B4-BE49-F238E27FC236}">
-                <a16:creationId xmlns:a16="http://schemas.microsoft.com/office/drawing/2014/main" id="{FA35D399-9E5B-364C-6AD8-92F0FB5D20AA}"/>
-              </a:ext>
-            </a:extLst>
-          </p:cNvPr>
-          <p:cNvPicPr>
-            <a:picLocks noChangeAspect="1"/>
-          </p:cNvPicPr>
-          <p:nvPr/>
-        </p:nvPicPr>
-        <p:blipFill>
-          <a:blip r:embed="rId2"/>
-          <a:stretch>
-            <a:fillRect/>
-          </a:stretch>
-        </p:blipFill>
-        <p:spPr>
-          <a:xfrm>
-            <a:off x="134314" y="0"/>
-            <a:ext cx="11923372" cy="6858000"/>
-          </a:xfrm>
-          <a:prstGeom prst="rect">
-            <a:avLst/>
-          </a:prstGeom>
-        </p:spPr>
-      </p:pic>
-    </p:spTree>
-    <p:extLst>
-      <p:ext uri="{BB962C8B-B14F-4D97-AF65-F5344CB8AC3E}">
-        <p14:creationId xmlns:p14="http://schemas.microsoft.com/office/powerpoint/2010/main" val="3690581016"/>
-      </p:ext>
-    </p:extLst>
-  </p:cSld>
-  <p:clrMapOvr>
-    <a:masterClrMapping/>
-  </p:clrMapOvr>
-</p:sld>
-</file>
-
 <file path=ppt/slides/slide9.xml><?xml version="1.0" encoding="utf-8"?>
 <p:sld xmlns:a="http://schemas.openxmlformats.org/drawingml/2006/main" xmlns:r="http://schemas.openxmlformats.org/officeDocument/2006/relationships" xmlns:p="http://schemas.openxmlformats.org/presentationml/2006/main">
   <p:cSld>
@@ -5912,10 +5649,10 @@
       </p:grpSpPr>
       <p:sp>
         <p:nvSpPr>
-          <p:cNvPr id="2" name="Titre 1">
-            <a:extLst>
-              <a:ext uri="{FF2B5EF4-FFF2-40B4-BE49-F238E27FC236}">
-                <a16:creationId xmlns:a16="http://schemas.microsoft.com/office/drawing/2014/main" id="{CA4D12FF-E23C-FB36-4268-5145C6B2114C}"/>
+          <p:cNvPr id="2" name="Title 1">
+            <a:extLst>
+              <a:ext uri="{FF2B5EF4-FFF2-40B4-BE49-F238E27FC236}">
+                <a16:creationId xmlns:a16="http://schemas.microsoft.com/office/drawing/2014/main" id="{9CDA37DD-20C1-5C1C-B2D4-9B1040AB4E14}"/>
               </a:ext>
             </a:extLst>
           </p:cNvPr>
@@ -5932,145 +5669,90 @@
           <a:lstStyle/>
           <a:p>
             <a:r>
-              <a:rPr lang="fr-FR" dirty="0"/>
-              <a:t>Confusion matrix </a:t>
-            </a:r>
-            <a:r>
-              <a:rPr lang="fr-FR" dirty="0" err="1"/>
-              <a:t>comparison</a:t>
-            </a:r>
-            <a:r>
-              <a:rPr lang="fr-FR" dirty="0"/>
-              <a:t> </a:t>
-            </a:r>
-            <a:r>
-              <a:rPr lang="fr-FR" dirty="0" err="1"/>
-              <a:t>between</a:t>
-            </a:r>
-            <a:r>
-              <a:rPr lang="fr-FR" dirty="0"/>
-              <a:t> </a:t>
-            </a:r>
-            <a:r>
-              <a:rPr lang="fr-FR" dirty="0" err="1"/>
-              <a:t>GridSearchCV</a:t>
-            </a:r>
-            <a:r>
-              <a:rPr lang="fr-FR" dirty="0"/>
-              <a:t> LR and Full BERT</a:t>
-            </a:r>
-          </a:p>
-        </p:txBody>
-      </p:sp>
-      <p:sp>
-        <p:nvSpPr>
-          <p:cNvPr id="4" name="AutoShape 2">
-            <a:extLst>
-              <a:ext uri="{FF2B5EF4-FFF2-40B4-BE49-F238E27FC236}">
-                <a16:creationId xmlns:a16="http://schemas.microsoft.com/office/drawing/2014/main" id="{FDBBE4C7-BB09-00B9-5560-2D5256131BF0}"/>
-              </a:ext>
-            </a:extLst>
-          </p:cNvPr>
-          <p:cNvSpPr>
-            <a:spLocks noChangeAspect="1" noChangeArrowheads="1"/>
-          </p:cNvSpPr>
-          <p:nvPr/>
-        </p:nvSpPr>
-        <p:spPr bwMode="auto">
-          <a:xfrm>
-            <a:off x="5943600" y="3276600"/>
-            <a:ext cx="304800" cy="304800"/>
-          </a:xfrm>
-          <a:prstGeom prst="rect">
-            <a:avLst/>
-          </a:prstGeom>
-          <a:noFill/>
-          <a:extLst>
-            <a:ext uri="{909E8E84-426E-40DD-AFC4-6F175D3DCCD1}">
-              <a14:hiddenFill xmlns:a14="http://schemas.microsoft.com/office/drawing/2010/main">
-                <a:solidFill>
-                  <a:srgbClr val="FFFFFF"/>
-                </a:solidFill>
-              </a14:hiddenFill>
-            </a:ext>
-          </a:extLst>
-        </p:spPr>
-        <p:txBody>
-          <a:bodyPr vert="horz" wrap="square" lIns="91440" tIns="45720" rIns="91440" bIns="45720" numCol="1" anchor="t" anchorCtr="0" compatLnSpc="1">
-            <a:prstTxWarp prst="textNoShape">
-              <a:avLst/>
-            </a:prstTxWarp>
+              <a:rPr lang="en-US" dirty="0"/>
+              <a:t>Takeaways</a:t>
+            </a:r>
+          </a:p>
+        </p:txBody>
+      </p:sp>
+      <p:sp>
+        <p:nvSpPr>
+          <p:cNvPr id="3" name="Content Placeholder 2">
+            <a:extLst>
+              <a:ext uri="{FF2B5EF4-FFF2-40B4-BE49-F238E27FC236}">
+                <a16:creationId xmlns:a16="http://schemas.microsoft.com/office/drawing/2014/main" id="{F9085543-BAEE-863C-37C8-06656B914EC0}"/>
+              </a:ext>
+            </a:extLst>
+          </p:cNvPr>
+          <p:cNvSpPr>
+            <a:spLocks noGrp="1"/>
+          </p:cNvSpPr>
+          <p:nvPr>
+            <p:ph idx="1"/>
+          </p:nvPr>
+        </p:nvSpPr>
+        <p:spPr/>
+        <p:txBody>
+          <a:bodyPr>
+            <a:normAutofit/>
           </a:bodyPr>
           <a:lstStyle/>
           <a:p>
-            <a:endParaRPr lang="fr-FR"/>
-          </a:p>
-        </p:txBody>
-      </p:sp>
-      <p:pic>
-        <p:nvPicPr>
-          <p:cNvPr id="7" name="Image 6">
-            <a:extLst>
-              <a:ext uri="{FF2B5EF4-FFF2-40B4-BE49-F238E27FC236}">
-                <a16:creationId xmlns:a16="http://schemas.microsoft.com/office/drawing/2014/main" id="{31AEC6C3-1329-F77D-9DF0-5A35213817B7}"/>
-              </a:ext>
-            </a:extLst>
-          </p:cNvPr>
-          <p:cNvPicPr>
-            <a:picLocks noChangeAspect="1"/>
-          </p:cNvPicPr>
-          <p:nvPr/>
-        </p:nvPicPr>
-        <p:blipFill>
-          <a:blip r:embed="rId2"/>
-          <a:stretch>
-            <a:fillRect/>
-          </a:stretch>
-        </p:blipFill>
-        <p:spPr>
-          <a:xfrm>
-            <a:off x="288931" y="1690686"/>
-            <a:ext cx="5421499" cy="4703947"/>
-          </a:xfrm>
-          <a:prstGeom prst="rect">
-            <a:avLst/>
-          </a:prstGeom>
-        </p:spPr>
-      </p:pic>
-      <p:pic>
-        <p:nvPicPr>
-          <p:cNvPr id="9" name="Image 8">
-            <a:extLst>
-              <a:ext uri="{FF2B5EF4-FFF2-40B4-BE49-F238E27FC236}">
-                <a16:creationId xmlns:a16="http://schemas.microsoft.com/office/drawing/2014/main" id="{DA3E81CB-E101-80DD-26B6-809D76AD8862}"/>
-              </a:ext>
-            </a:extLst>
-          </p:cNvPr>
-          <p:cNvPicPr>
-            <a:picLocks noChangeAspect="1"/>
-          </p:cNvPicPr>
-          <p:nvPr/>
-        </p:nvPicPr>
-        <p:blipFill>
-          <a:blip r:embed="rId3"/>
-          <a:stretch>
-            <a:fillRect/>
-          </a:stretch>
-        </p:blipFill>
-        <p:spPr>
-          <a:xfrm>
-            <a:off x="6399441" y="1690687"/>
-            <a:ext cx="5421499" cy="4637923"/>
-          </a:xfrm>
-          <a:prstGeom prst="rect">
-            <a:avLst/>
-          </a:prstGeom>
-        </p:spPr>
-      </p:pic>
+            <a:r>
+              <a:rPr lang="en-US" dirty="0"/>
+              <a:t>Simple models can still perform well with proper tuning</a:t>
+            </a:r>
+          </a:p>
+          <a:p>
+            <a:r>
+              <a:rPr lang="en-US" dirty="0"/>
+              <a:t>Embeddings (BERT) bring performance at the cost of training time</a:t>
+            </a:r>
+          </a:p>
+          <a:p>
+            <a:r>
+              <a:rPr lang="en-US" dirty="0"/>
+              <a:t>Data cleaning was crucial: garbage in, garbage out</a:t>
+            </a:r>
+          </a:p>
+          <a:p>
+            <a:r>
+              <a:rPr lang="en-US" dirty="0"/>
+              <a:t>Learned to balance model performance, interpretability, and compute cost</a:t>
+            </a:r>
+          </a:p>
+          <a:p>
+            <a:r>
+              <a:rPr lang="en-US" dirty="0"/>
+              <a:t>Improve collaboration skills, version code with git and </a:t>
+            </a:r>
+            <a:r>
+              <a:rPr lang="en-US" dirty="0" err="1"/>
+              <a:t>github</a:t>
+            </a:r>
+            <a:r>
+              <a:rPr lang="en-US" dirty="0"/>
+              <a:t>, and structure an ML workflow (reusable functions)</a:t>
+            </a:r>
+          </a:p>
+          <a:p>
+            <a:endParaRPr lang="en-US" dirty="0"/>
+          </a:p>
+          <a:p>
+            <a:pPr marL="0" indent="0" algn="ctr">
+              <a:buNone/>
+            </a:pPr>
+            <a:r>
+              <a:rPr lang="en-US" dirty="0"/>
+              <a:t>Thank you for listening</a:t>
+            </a:r>
+          </a:p>
+        </p:txBody>
+      </p:sp>
     </p:spTree>
     <p:extLst>
       <p:ext uri="{BB962C8B-B14F-4D97-AF65-F5344CB8AC3E}">
-        <p14:creationId xmlns:p14="http://schemas.microsoft.com/office/powerpoint/2010/main" val="2563928342"/>
+        <p14:creationId xmlns:p14="http://schemas.microsoft.com/office/powerpoint/2010/main" val="3540792297"/>
       </p:ext>
     </p:extLst>
   </p:cSld>

</xml_diff>